<commit_message>
patched up documentation, tidy up time series univariate ARIMA and VAR prediction fittings, removing evaluation for training data set in time series, revise answers for consolidated_answers.pptx
</commit_message>
<xml_diff>
--- a/q2_fraud_detection/results/confusion_matrices.pptx
+++ b/q2_fraud_detection/results/confusion_matrices.pptx
@@ -266,7 +266,7 @@
           <a:p>
             <a:fld id="{02D6A8D5-80ED-4BA4-89C7-1F55AC1402EC}" type="datetimeFigureOut">
               <a:rPr lang="en-MY" smtClean="0"/>
-              <a:t>19/8/2020</a:t>
+              <a:t>21/8/2020</a:t>
             </a:fld>
             <a:endParaRPr lang="en-MY"/>
           </a:p>
@@ -466,7 +466,7 @@
           <a:p>
             <a:fld id="{02D6A8D5-80ED-4BA4-89C7-1F55AC1402EC}" type="datetimeFigureOut">
               <a:rPr lang="en-MY" smtClean="0"/>
-              <a:t>19/8/2020</a:t>
+              <a:t>21/8/2020</a:t>
             </a:fld>
             <a:endParaRPr lang="en-MY"/>
           </a:p>
@@ -676,7 +676,7 @@
           <a:p>
             <a:fld id="{02D6A8D5-80ED-4BA4-89C7-1F55AC1402EC}" type="datetimeFigureOut">
               <a:rPr lang="en-MY" smtClean="0"/>
-              <a:t>19/8/2020</a:t>
+              <a:t>21/8/2020</a:t>
             </a:fld>
             <a:endParaRPr lang="en-MY"/>
           </a:p>
@@ -876,7 +876,7 @@
           <a:p>
             <a:fld id="{02D6A8D5-80ED-4BA4-89C7-1F55AC1402EC}" type="datetimeFigureOut">
               <a:rPr lang="en-MY" smtClean="0"/>
-              <a:t>19/8/2020</a:t>
+              <a:t>21/8/2020</a:t>
             </a:fld>
             <a:endParaRPr lang="en-MY"/>
           </a:p>
@@ -1152,7 +1152,7 @@
           <a:p>
             <a:fld id="{02D6A8D5-80ED-4BA4-89C7-1F55AC1402EC}" type="datetimeFigureOut">
               <a:rPr lang="en-MY" smtClean="0"/>
-              <a:t>19/8/2020</a:t>
+              <a:t>21/8/2020</a:t>
             </a:fld>
             <a:endParaRPr lang="en-MY"/>
           </a:p>
@@ -1420,7 +1420,7 @@
           <a:p>
             <a:fld id="{02D6A8D5-80ED-4BA4-89C7-1F55AC1402EC}" type="datetimeFigureOut">
               <a:rPr lang="en-MY" smtClean="0"/>
-              <a:t>19/8/2020</a:t>
+              <a:t>21/8/2020</a:t>
             </a:fld>
             <a:endParaRPr lang="en-MY"/>
           </a:p>
@@ -1835,7 +1835,7 @@
           <a:p>
             <a:fld id="{02D6A8D5-80ED-4BA4-89C7-1F55AC1402EC}" type="datetimeFigureOut">
               <a:rPr lang="en-MY" smtClean="0"/>
-              <a:t>19/8/2020</a:t>
+              <a:t>21/8/2020</a:t>
             </a:fld>
             <a:endParaRPr lang="en-MY"/>
           </a:p>
@@ -1977,7 +1977,7 @@
           <a:p>
             <a:fld id="{02D6A8D5-80ED-4BA4-89C7-1F55AC1402EC}" type="datetimeFigureOut">
               <a:rPr lang="en-MY" smtClean="0"/>
-              <a:t>19/8/2020</a:t>
+              <a:t>21/8/2020</a:t>
             </a:fld>
             <a:endParaRPr lang="en-MY"/>
           </a:p>
@@ -2090,7 +2090,7 @@
           <a:p>
             <a:fld id="{02D6A8D5-80ED-4BA4-89C7-1F55AC1402EC}" type="datetimeFigureOut">
               <a:rPr lang="en-MY" smtClean="0"/>
-              <a:t>19/8/2020</a:t>
+              <a:t>21/8/2020</a:t>
             </a:fld>
             <a:endParaRPr lang="en-MY"/>
           </a:p>
@@ -2403,7 +2403,7 @@
           <a:p>
             <a:fld id="{02D6A8D5-80ED-4BA4-89C7-1F55AC1402EC}" type="datetimeFigureOut">
               <a:rPr lang="en-MY" smtClean="0"/>
-              <a:t>19/8/2020</a:t>
+              <a:t>21/8/2020</a:t>
             </a:fld>
             <a:endParaRPr lang="en-MY"/>
           </a:p>
@@ -2692,7 +2692,7 @@
           <a:p>
             <a:fld id="{02D6A8D5-80ED-4BA4-89C7-1F55AC1402EC}" type="datetimeFigureOut">
               <a:rPr lang="en-MY" smtClean="0"/>
-              <a:t>19/8/2020</a:t>
+              <a:t>21/8/2020</a:t>
             </a:fld>
             <a:endParaRPr lang="en-MY"/>
           </a:p>
@@ -2935,7 +2935,7 @@
           <a:p>
             <a:fld id="{02D6A8D5-80ED-4BA4-89C7-1F55AC1402EC}" type="datetimeFigureOut">
               <a:rPr lang="en-MY" smtClean="0"/>
-              <a:t>19/8/2020</a:t>
+              <a:t>21/8/2020</a:t>
             </a:fld>
             <a:endParaRPr lang="en-MY"/>
           </a:p>
@@ -3432,7 +3432,7 @@
           <p:nvPr>
             <p:extLst>
               <p:ext uri="{D42A27DB-BD31-4B8C-83A1-F6EECF244321}">
-                <p14:modId xmlns:p14="http://schemas.microsoft.com/office/powerpoint/2010/main" val="3955428074"/>
+                <p14:modId xmlns:p14="http://schemas.microsoft.com/office/powerpoint/2010/main" val="1883473755"/>
               </p:ext>
             </p:extLst>
           </p:nvPr>
@@ -3553,7 +3553,7 @@
                     <a:p>
                       <a:pPr algn="l" fontAlgn="b"/>
                       <a:r>
-                        <a:rPr lang="en-MY" sz="800" b="1" i="0" u="none" strike="noStrike" dirty="0">
+                        <a:rPr lang="en-MY" sz="800" b="0" i="0" u="none" strike="noStrike">
                           <a:solidFill>
                             <a:srgbClr val="000000"/>
                           </a:solidFill>
@@ -3616,7 +3616,7 @@
                     <a:p>
                       <a:pPr algn="l" fontAlgn="b"/>
                       <a:r>
-                        <a:rPr lang="en-MY" sz="800" b="1" i="0" u="none" strike="noStrike" dirty="0" err="1">
+                        <a:rPr lang="en-MY" sz="800" b="0" i="0" u="none" strike="noStrike">
                           <a:solidFill>
                             <a:srgbClr val="000000"/>
                           </a:solidFill>
@@ -3625,13 +3625,6 @@
                         </a:rPr>
                         <a:t>auc_train</a:t>
                       </a:r>
-                      <a:endParaRPr lang="en-MY" sz="800" b="1" i="0" u="none" strike="noStrike" dirty="0">
-                        <a:solidFill>
-                          <a:srgbClr val="000000"/>
-                        </a:solidFill>
-                        <a:effectLst/>
-                        <a:latin typeface="Calibri" panose="020F0502020204030204" pitchFamily="34" charset="0"/>
-                      </a:endParaRPr>
                     </a:p>
                   </a:txBody>
                   <a:tcPr marL="9525" marR="9525" marT="9525" marB="0" anchor="b">
@@ -3686,7 +3679,7 @@
                     <a:p>
                       <a:pPr algn="l" fontAlgn="b"/>
                       <a:r>
-                        <a:rPr lang="en-MY" sz="800" b="1" i="0" u="none" strike="noStrike" dirty="0" err="1">
+                        <a:rPr lang="en-MY" sz="800" b="0" i="0" u="none" strike="noStrike">
                           <a:solidFill>
                             <a:srgbClr val="000000"/>
                           </a:solidFill>
@@ -3695,13 +3688,6 @@
                         </a:rPr>
                         <a:t>auc_valid</a:t>
                       </a:r>
-                      <a:endParaRPr lang="en-MY" sz="800" b="1" i="0" u="none" strike="noStrike" dirty="0">
-                        <a:solidFill>
-                          <a:srgbClr val="000000"/>
-                        </a:solidFill>
-                        <a:effectLst/>
-                        <a:latin typeface="Calibri" panose="020F0502020204030204" pitchFamily="34" charset="0"/>
-                      </a:endParaRPr>
                     </a:p>
                   </a:txBody>
                   <a:tcPr marL="9525" marR="9525" marT="9525" marB="0" anchor="b">
@@ -3756,7 +3742,7 @@
                     <a:p>
                       <a:pPr algn="l" fontAlgn="b"/>
                       <a:r>
-                        <a:rPr lang="en-MY" sz="800" b="1" i="0" u="none" strike="noStrike" dirty="0" err="1">
+                        <a:rPr lang="en-MY" sz="800" b="0" i="0" u="none" strike="noStrike">
                           <a:solidFill>
                             <a:srgbClr val="000000"/>
                           </a:solidFill>
@@ -3765,13 +3751,6 @@
                         </a:rPr>
                         <a:t>acc_train</a:t>
                       </a:r>
-                      <a:endParaRPr lang="en-MY" sz="800" b="1" i="0" u="none" strike="noStrike" dirty="0">
-                        <a:solidFill>
-                          <a:srgbClr val="000000"/>
-                        </a:solidFill>
-                        <a:effectLst/>
-                        <a:latin typeface="Calibri" panose="020F0502020204030204" pitchFamily="34" charset="0"/>
-                      </a:endParaRPr>
                     </a:p>
                   </a:txBody>
                   <a:tcPr marL="9525" marR="9525" marT="9525" marB="0" anchor="b">
@@ -3826,7 +3805,7 @@
                     <a:p>
                       <a:pPr algn="l" fontAlgn="b"/>
                       <a:r>
-                        <a:rPr lang="en-MY" sz="800" b="1" i="0" u="none" strike="noStrike" dirty="0" err="1">
+                        <a:rPr lang="en-MY" sz="800" b="0" i="0" u="none" strike="noStrike">
                           <a:solidFill>
                             <a:srgbClr val="000000"/>
                           </a:solidFill>
@@ -3835,13 +3814,6 @@
                         </a:rPr>
                         <a:t>acc_valid</a:t>
                       </a:r>
-                      <a:endParaRPr lang="en-MY" sz="800" b="1" i="0" u="none" strike="noStrike" dirty="0">
-                        <a:solidFill>
-                          <a:srgbClr val="000000"/>
-                        </a:solidFill>
-                        <a:effectLst/>
-                        <a:latin typeface="Calibri" panose="020F0502020204030204" pitchFamily="34" charset="0"/>
-                      </a:endParaRPr>
                     </a:p>
                   </a:txBody>
                   <a:tcPr marL="9525" marR="9525" marT="9525" marB="0" anchor="b">
@@ -3896,7 +3868,7 @@
                     <a:p>
                       <a:pPr algn="l" fontAlgn="b"/>
                       <a:r>
-                        <a:rPr lang="en-MY" sz="800" b="1" i="0" u="none" strike="noStrike" dirty="0" err="1">
+                        <a:rPr lang="en-MY" sz="800" b="0" i="0" u="none" strike="noStrike">
                           <a:solidFill>
                             <a:srgbClr val="000000"/>
                           </a:solidFill>
@@ -3905,13 +3877,6 @@
                         </a:rPr>
                         <a:t>matthew_corr_train</a:t>
                       </a:r>
-                      <a:endParaRPr lang="en-MY" sz="800" b="1" i="0" u="none" strike="noStrike" dirty="0">
-                        <a:solidFill>
-                          <a:srgbClr val="000000"/>
-                        </a:solidFill>
-                        <a:effectLst/>
-                        <a:latin typeface="Calibri" panose="020F0502020204030204" pitchFamily="34" charset="0"/>
-                      </a:endParaRPr>
                     </a:p>
                   </a:txBody>
                   <a:tcPr marL="9525" marR="9525" marT="9525" marB="0" anchor="b">
@@ -3966,7 +3931,7 @@
                     <a:p>
                       <a:pPr algn="l" fontAlgn="b"/>
                       <a:r>
-                        <a:rPr lang="en-MY" sz="800" b="1" i="0" u="none" strike="noStrike" dirty="0" err="1">
+                        <a:rPr lang="en-MY" sz="800" b="0" i="0" u="none" strike="noStrike">
                           <a:solidFill>
                             <a:srgbClr val="000000"/>
                           </a:solidFill>
@@ -3975,13 +3940,6 @@
                         </a:rPr>
                         <a:t>matthew_corr_valid</a:t>
                       </a:r>
-                      <a:endParaRPr lang="en-MY" sz="800" b="1" i="0" u="none" strike="noStrike" dirty="0">
-                        <a:solidFill>
-                          <a:srgbClr val="000000"/>
-                        </a:solidFill>
-                        <a:effectLst/>
-                        <a:latin typeface="Calibri" panose="020F0502020204030204" pitchFamily="34" charset="0"/>
-                      </a:endParaRPr>
                     </a:p>
                   </a:txBody>
                   <a:tcPr marL="9525" marR="9525" marT="9525" marB="0" anchor="b">
@@ -4036,7 +3994,7 @@
                     <a:p>
                       <a:pPr algn="l" fontAlgn="b"/>
                       <a:r>
-                        <a:rPr lang="en-MY" sz="800" b="1" i="0" u="none" strike="noStrike" dirty="0">
+                        <a:rPr lang="en-MY" sz="800" b="0" i="0" u="none" strike="noStrike">
                           <a:solidFill>
                             <a:srgbClr val="000000"/>
                           </a:solidFill>
@@ -4099,7 +4057,7 @@
                     <a:p>
                       <a:pPr algn="l" fontAlgn="b"/>
                       <a:r>
-                        <a:rPr lang="en-MY" sz="800" b="1" i="0" u="none" strike="noStrike" dirty="0">
+                        <a:rPr lang="en-MY" sz="800" b="0" i="0" u="none" strike="noStrike">
                           <a:solidFill>
                             <a:srgbClr val="000000"/>
                           </a:solidFill>
@@ -4162,7 +4120,7 @@
                     <a:p>
                       <a:pPr algn="l" fontAlgn="b"/>
                       <a:r>
-                        <a:rPr lang="en-MY" sz="800" b="1" i="0" u="none" strike="noStrike" dirty="0">
+                        <a:rPr lang="en-MY" sz="800" b="0" i="0" u="none" strike="noStrike">
                           <a:solidFill>
                             <a:srgbClr val="000000"/>
                           </a:solidFill>
@@ -4225,7 +4183,7 @@
                     <a:p>
                       <a:pPr algn="l" fontAlgn="b"/>
                       <a:r>
-                        <a:rPr lang="en-MY" sz="800" b="1" i="0" u="none" strike="noStrike" dirty="0">
+                        <a:rPr lang="en-MY" sz="800" b="0" i="0" u="none" strike="noStrike">
                           <a:solidFill>
                             <a:srgbClr val="000000"/>
                           </a:solidFill>
@@ -4288,7 +4246,7 @@
                     <a:p>
                       <a:pPr algn="l" fontAlgn="b"/>
                       <a:r>
-                        <a:rPr lang="en-MY" sz="800" b="1" i="0" u="none" strike="noStrike" dirty="0">
+                        <a:rPr lang="en-MY" sz="800" b="0" i="0" u="none" strike="noStrike">
                           <a:solidFill>
                             <a:srgbClr val="000000"/>
                           </a:solidFill>
@@ -4351,7 +4309,7 @@
                     <a:p>
                       <a:pPr algn="l" fontAlgn="b"/>
                       <a:r>
-                        <a:rPr lang="en-MY" sz="800" b="1" i="0" u="none" strike="noStrike" dirty="0">
+                        <a:rPr lang="en-MY" sz="800" b="0" i="0" u="none" strike="noStrike">
                           <a:solidFill>
                             <a:srgbClr val="000000"/>
                           </a:solidFill>
@@ -4484,7 +4442,7 @@
                     <a:p>
                       <a:pPr algn="l" fontAlgn="b"/>
                       <a:r>
-                        <a:rPr lang="en-MY" sz="800" b="0" i="0" u="none" strike="noStrike" dirty="0" err="1">
+                        <a:rPr lang="en-MY" sz="800" b="0" i="0" u="none" strike="noStrike">
                           <a:solidFill>
                             <a:srgbClr val="000000"/>
                           </a:solidFill>
@@ -4493,13 +4451,6 @@
                         </a:rPr>
                         <a:t>RandomForest</a:t>
                       </a:r>
-                      <a:endParaRPr lang="en-MY" sz="800" b="0" i="0" u="none" strike="noStrike" dirty="0">
-                        <a:solidFill>
-                          <a:srgbClr val="000000"/>
-                        </a:solidFill>
-                        <a:effectLst/>
-                        <a:latin typeface="Calibri" panose="020F0502020204030204" pitchFamily="34" charset="0"/>
-                      </a:endParaRPr>
                     </a:p>
                   </a:txBody>
                   <a:tcPr marL="9525" marR="9525" marT="9525" marB="0" anchor="b">
@@ -4612,7 +4563,7 @@
                           <a:effectLst/>
                           <a:latin typeface="Calibri" panose="020F0502020204030204" pitchFamily="34" charset="0"/>
                         </a:rPr>
-                        <a:t>0.8801</a:t>
+                        <a:t>0.89537</a:t>
                       </a:r>
                     </a:p>
                   </a:txBody>
@@ -4726,7 +4677,7 @@
                           <a:effectLst/>
                           <a:latin typeface="Calibri" panose="020F0502020204030204" pitchFamily="34" charset="0"/>
                         </a:rPr>
-                        <a:t>0.949158</a:t>
+                        <a:t>0.958373</a:t>
                       </a:r>
                     </a:p>
                   </a:txBody>
@@ -4840,7 +4791,7 @@
                           <a:effectLst/>
                           <a:latin typeface="Calibri" panose="020F0502020204030204" pitchFamily="34" charset="0"/>
                         </a:rPr>
-                        <a:t>0.701633</a:t>
+                        <a:t>0.747903</a:t>
                       </a:r>
                     </a:p>
                   </a:txBody>
@@ -4954,7 +4905,7 @@
                           <a:effectLst/>
                           <a:latin typeface="Calibri" panose="020F0502020204030204" pitchFamily="34" charset="0"/>
                         </a:rPr>
-                        <a:t>0.726027</a:t>
+                        <a:t>0.768959</a:t>
                       </a:r>
                     </a:p>
                   </a:txBody>
@@ -5011,7 +4962,7 @@
                           <a:effectLst/>
                           <a:latin typeface="Calibri" panose="020F0502020204030204" pitchFamily="34" charset="0"/>
                         </a:rPr>
-                        <a:t>106</a:t>
+                        <a:t>83</a:t>
                       </a:r>
                     </a:p>
                   </a:txBody>
@@ -5068,7 +5019,7 @@
                           <a:effectLst/>
                           <a:latin typeface="Calibri" panose="020F0502020204030204" pitchFamily="34" charset="0"/>
                         </a:rPr>
-                        <a:t>54</a:t>
+                        <a:t>48</a:t>
                       </a:r>
                     </a:p>
                   </a:txBody>
@@ -5125,7 +5076,7 @@
                           <a:effectLst/>
                           <a:latin typeface="Calibri" panose="020F0502020204030204" pitchFamily="34" charset="0"/>
                         </a:rPr>
-                        <a:t>212</a:t>
+                        <a:t>218</a:t>
                       </a:r>
                     </a:p>
                   </a:txBody>
@@ -5182,7 +5133,7 @@
                           <a:effectLst/>
                           <a:latin typeface="Calibri" panose="020F0502020204030204" pitchFamily="34" charset="0"/>
                         </a:rPr>
-                        <a:t>-1398000</a:t>
+                        <a:t>-1261000</a:t>
                       </a:r>
                     </a:p>
                   </a:txBody>
@@ -5296,7 +5247,7 @@
                     <a:p>
                       <a:pPr algn="l" fontAlgn="b"/>
                       <a:r>
-                        <a:rPr lang="en-MY" sz="800" b="0" i="0" u="none" strike="noStrike" dirty="0" err="1">
+                        <a:rPr lang="en-MY" sz="800" b="0" i="0" u="none" strike="noStrike">
                           <a:solidFill>
                             <a:srgbClr val="000000"/>
                           </a:solidFill>
@@ -5305,13 +5256,6 @@
                         </a:rPr>
                         <a:t>LightGBMGridSearch</a:t>
                       </a:r>
-                      <a:endParaRPr lang="en-MY" sz="800" b="0" i="0" u="none" strike="noStrike" dirty="0">
-                        <a:solidFill>
-                          <a:srgbClr val="000000"/>
-                        </a:solidFill>
-                        <a:effectLst/>
-                        <a:latin typeface="Calibri" panose="020F0502020204030204" pitchFamily="34" charset="0"/>
-                      </a:endParaRPr>
                     </a:p>
                   </a:txBody>
                   <a:tcPr marL="9525" marR="9525" marT="9525" marB="0" anchor="b">
@@ -5367,6 +5311,234 @@
                           <a:effectLst/>
                           <a:latin typeface="Calibri" panose="020F0502020204030204" pitchFamily="34" charset="0"/>
                         </a:rPr>
+                        <a:t>0.999957</a:t>
+                      </a:r>
+                    </a:p>
+                  </a:txBody>
+                  <a:tcPr marL="9525" marR="9525" marT="9525" marB="0" anchor="b">
+                    <a:lnL w="12700" cap="flat" cmpd="sng" algn="ctr">
+                      <a:solidFill>
+                        <a:schemeClr val="tx1"/>
+                      </a:solidFill>
+                      <a:prstDash val="solid"/>
+                      <a:round/>
+                      <a:headEnd type="none" w="med" len="med"/>
+                      <a:tailEnd type="none" w="med" len="med"/>
+                    </a:lnL>
+                    <a:lnR w="12700" cap="flat" cmpd="sng" algn="ctr">
+                      <a:solidFill>
+                        <a:schemeClr val="tx1"/>
+                      </a:solidFill>
+                      <a:prstDash val="solid"/>
+                      <a:round/>
+                      <a:headEnd type="none" w="med" len="med"/>
+                      <a:tailEnd type="none" w="med" len="med"/>
+                    </a:lnR>
+                    <a:lnT w="12700" cap="flat" cmpd="sng" algn="ctr">
+                      <a:solidFill>
+                        <a:schemeClr val="tx1"/>
+                      </a:solidFill>
+                      <a:prstDash val="solid"/>
+                      <a:round/>
+                      <a:headEnd type="none" w="med" len="med"/>
+                      <a:tailEnd type="none" w="med" len="med"/>
+                    </a:lnT>
+                    <a:lnB w="12700" cap="flat" cmpd="sng" algn="ctr">
+                      <a:solidFill>
+                        <a:schemeClr val="tx1"/>
+                      </a:solidFill>
+                      <a:prstDash val="solid"/>
+                      <a:round/>
+                      <a:headEnd type="none" w="med" len="med"/>
+                      <a:tailEnd type="none" w="med" len="med"/>
+                    </a:lnB>
+                  </a:tcPr>
+                </a:tc>
+                <a:tc>
+                  <a:txBody>
+                    <a:bodyPr/>
+                    <a:lstStyle/>
+                    <a:p>
+                      <a:pPr algn="r" fontAlgn="b"/>
+                      <a:r>
+                        <a:rPr lang="en-MY" sz="800" b="0" i="0" u="none" strike="noStrike">
+                          <a:solidFill>
+                            <a:srgbClr val="000000"/>
+                          </a:solidFill>
+                          <a:effectLst/>
+                          <a:latin typeface="Calibri" panose="020F0502020204030204" pitchFamily="34" charset="0"/>
+                        </a:rPr>
+                        <a:t>0.893866</a:t>
+                      </a:r>
+                    </a:p>
+                  </a:txBody>
+                  <a:tcPr marL="9525" marR="9525" marT="9525" marB="0" anchor="b">
+                    <a:lnL w="12700" cap="flat" cmpd="sng" algn="ctr">
+                      <a:solidFill>
+                        <a:schemeClr val="tx1"/>
+                      </a:solidFill>
+                      <a:prstDash val="solid"/>
+                      <a:round/>
+                      <a:headEnd type="none" w="med" len="med"/>
+                      <a:tailEnd type="none" w="med" len="med"/>
+                    </a:lnL>
+                    <a:lnR w="12700" cap="flat" cmpd="sng" algn="ctr">
+                      <a:solidFill>
+                        <a:schemeClr val="tx1"/>
+                      </a:solidFill>
+                      <a:prstDash val="solid"/>
+                      <a:round/>
+                      <a:headEnd type="none" w="med" len="med"/>
+                      <a:tailEnd type="none" w="med" len="med"/>
+                    </a:lnR>
+                    <a:lnT w="12700" cap="flat" cmpd="sng" algn="ctr">
+                      <a:solidFill>
+                        <a:schemeClr val="tx1"/>
+                      </a:solidFill>
+                      <a:prstDash val="solid"/>
+                      <a:round/>
+                      <a:headEnd type="none" w="med" len="med"/>
+                      <a:tailEnd type="none" w="med" len="med"/>
+                    </a:lnT>
+                    <a:lnB w="12700" cap="flat" cmpd="sng" algn="ctr">
+                      <a:solidFill>
+                        <a:schemeClr val="tx1"/>
+                      </a:solidFill>
+                      <a:prstDash val="solid"/>
+                      <a:round/>
+                      <a:headEnd type="none" w="med" len="med"/>
+                      <a:tailEnd type="none" w="med" len="med"/>
+                    </a:lnB>
+                  </a:tcPr>
+                </a:tc>
+                <a:tc>
+                  <a:txBody>
+                    <a:bodyPr/>
+                    <a:lstStyle/>
+                    <a:p>
+                      <a:pPr algn="r" fontAlgn="b"/>
+                      <a:r>
+                        <a:rPr lang="en-MY" sz="800" b="0" i="0" u="none" strike="noStrike">
+                          <a:solidFill>
+                            <a:srgbClr val="000000"/>
+                          </a:solidFill>
+                          <a:effectLst/>
+                          <a:latin typeface="Calibri" panose="020F0502020204030204" pitchFamily="34" charset="0"/>
+                        </a:rPr>
+                        <a:t>0.999957</a:t>
+                      </a:r>
+                    </a:p>
+                  </a:txBody>
+                  <a:tcPr marL="9525" marR="9525" marT="9525" marB="0" anchor="b">
+                    <a:lnL w="12700" cap="flat" cmpd="sng" algn="ctr">
+                      <a:solidFill>
+                        <a:schemeClr val="tx1"/>
+                      </a:solidFill>
+                      <a:prstDash val="solid"/>
+                      <a:round/>
+                      <a:headEnd type="none" w="med" len="med"/>
+                      <a:tailEnd type="none" w="med" len="med"/>
+                    </a:lnL>
+                    <a:lnR w="12700" cap="flat" cmpd="sng" algn="ctr">
+                      <a:solidFill>
+                        <a:schemeClr val="tx1"/>
+                      </a:solidFill>
+                      <a:prstDash val="solid"/>
+                      <a:round/>
+                      <a:headEnd type="none" w="med" len="med"/>
+                      <a:tailEnd type="none" w="med" len="med"/>
+                    </a:lnR>
+                    <a:lnT w="12700" cap="flat" cmpd="sng" algn="ctr">
+                      <a:solidFill>
+                        <a:schemeClr val="tx1"/>
+                      </a:solidFill>
+                      <a:prstDash val="solid"/>
+                      <a:round/>
+                      <a:headEnd type="none" w="med" len="med"/>
+                      <a:tailEnd type="none" w="med" len="med"/>
+                    </a:lnT>
+                    <a:lnB w="12700" cap="flat" cmpd="sng" algn="ctr">
+                      <a:solidFill>
+                        <a:schemeClr val="tx1"/>
+                      </a:solidFill>
+                      <a:prstDash val="solid"/>
+                      <a:round/>
+                      <a:headEnd type="none" w="med" len="med"/>
+                      <a:tailEnd type="none" w="med" len="med"/>
+                    </a:lnB>
+                  </a:tcPr>
+                </a:tc>
+                <a:tc>
+                  <a:txBody>
+                    <a:bodyPr/>
+                    <a:lstStyle/>
+                    <a:p>
+                      <a:pPr algn="r" fontAlgn="b"/>
+                      <a:r>
+                        <a:rPr lang="en-MY" sz="800" b="0" i="0" u="none" strike="noStrike">
+                          <a:solidFill>
+                            <a:srgbClr val="000000"/>
+                          </a:solidFill>
+                          <a:effectLst/>
+                          <a:latin typeface="Calibri" panose="020F0502020204030204" pitchFamily="34" charset="0"/>
+                        </a:rPr>
+                        <a:t>0.961868</a:t>
+                      </a:r>
+                    </a:p>
+                  </a:txBody>
+                  <a:tcPr marL="9525" marR="9525" marT="9525" marB="0" anchor="b">
+                    <a:lnL w="12700" cap="flat" cmpd="sng" algn="ctr">
+                      <a:solidFill>
+                        <a:schemeClr val="tx1"/>
+                      </a:solidFill>
+                      <a:prstDash val="solid"/>
+                      <a:round/>
+                      <a:headEnd type="none" w="med" len="med"/>
+                      <a:tailEnd type="none" w="med" len="med"/>
+                    </a:lnL>
+                    <a:lnR w="12700" cap="flat" cmpd="sng" algn="ctr">
+                      <a:solidFill>
+                        <a:schemeClr val="tx1"/>
+                      </a:solidFill>
+                      <a:prstDash val="solid"/>
+                      <a:round/>
+                      <a:headEnd type="none" w="med" len="med"/>
+                      <a:tailEnd type="none" w="med" len="med"/>
+                    </a:lnR>
+                    <a:lnT w="12700" cap="flat" cmpd="sng" algn="ctr">
+                      <a:solidFill>
+                        <a:schemeClr val="tx1"/>
+                      </a:solidFill>
+                      <a:prstDash val="solid"/>
+                      <a:round/>
+                      <a:headEnd type="none" w="med" len="med"/>
+                      <a:tailEnd type="none" w="med" len="med"/>
+                    </a:lnT>
+                    <a:lnB w="12700" cap="flat" cmpd="sng" algn="ctr">
+                      <a:solidFill>
+                        <a:schemeClr val="tx1"/>
+                      </a:solidFill>
+                      <a:prstDash val="solid"/>
+                      <a:round/>
+                      <a:headEnd type="none" w="med" len="med"/>
+                      <a:tailEnd type="none" w="med" len="med"/>
+                    </a:lnB>
+                  </a:tcPr>
+                </a:tc>
+                <a:tc>
+                  <a:txBody>
+                    <a:bodyPr/>
+                    <a:lstStyle/>
+                    <a:p>
+                      <a:pPr algn="r" fontAlgn="b"/>
+                      <a:r>
+                        <a:rPr lang="en-MY" sz="800" b="0" i="0" u="none" strike="noStrike">
+                          <a:solidFill>
+                            <a:srgbClr val="000000"/>
+                          </a:solidFill>
+                          <a:effectLst/>
+                          <a:latin typeface="Calibri" panose="020F0502020204030204" pitchFamily="34" charset="0"/>
+                        </a:rPr>
                         <a:t>0.999914</a:t>
                       </a:r>
                     </a:p>
@@ -5424,7 +5596,7 @@
                           <a:effectLst/>
                           <a:latin typeface="Calibri" panose="020F0502020204030204" pitchFamily="34" charset="0"/>
                         </a:rPr>
-                        <a:t>0.879956</a:t>
+                        <a:t>0.762341</a:t>
                       </a:r>
                     </a:p>
                   </a:txBody>
@@ -5481,7 +5653,7 @@
                           <a:effectLst/>
                           <a:latin typeface="Calibri" panose="020F0502020204030204" pitchFamily="34" charset="0"/>
                         </a:rPr>
-                        <a:t>0.999914</a:t>
+                        <a:t>0.999957</a:t>
                       </a:r>
                     </a:p>
                   </a:txBody>
@@ -5538,7 +5710,7 @@
                           <a:effectLst/>
                           <a:latin typeface="Calibri" panose="020F0502020204030204" pitchFamily="34" charset="0"/>
                         </a:rPr>
-                        <a:t>0.952018</a:t>
+                        <a:t>0.782609</a:t>
                       </a:r>
                     </a:p>
                   </a:txBody>
@@ -5595,7 +5767,7 @@
                           <a:effectLst/>
                           <a:latin typeface="Calibri" panose="020F0502020204030204" pitchFamily="34" charset="0"/>
                         </a:rPr>
-                        <a:t>0.999827</a:t>
+                        <a:t>70</a:t>
                       </a:r>
                     </a:p>
                   </a:txBody>
@@ -5652,7 +5824,7 @@
                           <a:effectLst/>
                           <a:latin typeface="Calibri" panose="020F0502020204030204" pitchFamily="34" charset="0"/>
                         </a:rPr>
-                        <a:t>0.712438</a:t>
+                        <a:t>50</a:t>
                       </a:r>
                     </a:p>
                   </a:txBody>
@@ -5709,7 +5881,7 @@
                           <a:effectLst/>
                           <a:latin typeface="Calibri" panose="020F0502020204030204" pitchFamily="34" charset="0"/>
                         </a:rPr>
-                        <a:t>0.999914</a:t>
+                        <a:t>216</a:t>
                       </a:r>
                     </a:p>
                   </a:txBody>
@@ -5766,235 +5938,7 @@
                           <a:effectLst/>
                           <a:latin typeface="Calibri" panose="020F0502020204030204" pitchFamily="34" charset="0"/>
                         </a:rPr>
-                        <a:t>0.736475</a:t>
-                      </a:r>
-                    </a:p>
-                  </a:txBody>
-                  <a:tcPr marL="9525" marR="9525" marT="9525" marB="0" anchor="b">
-                    <a:lnL w="12700" cap="flat" cmpd="sng" algn="ctr">
-                      <a:solidFill>
-                        <a:schemeClr val="tx1"/>
-                      </a:solidFill>
-                      <a:prstDash val="solid"/>
-                      <a:round/>
-                      <a:headEnd type="none" w="med" len="med"/>
-                      <a:tailEnd type="none" w="med" len="med"/>
-                    </a:lnL>
-                    <a:lnR w="12700" cap="flat" cmpd="sng" algn="ctr">
-                      <a:solidFill>
-                        <a:schemeClr val="tx1"/>
-                      </a:solidFill>
-                      <a:prstDash val="solid"/>
-                      <a:round/>
-                      <a:headEnd type="none" w="med" len="med"/>
-                      <a:tailEnd type="none" w="med" len="med"/>
-                    </a:lnR>
-                    <a:lnT w="12700" cap="flat" cmpd="sng" algn="ctr">
-                      <a:solidFill>
-                        <a:schemeClr val="tx1"/>
-                      </a:solidFill>
-                      <a:prstDash val="solid"/>
-                      <a:round/>
-                      <a:headEnd type="none" w="med" len="med"/>
-                      <a:tailEnd type="none" w="med" len="med"/>
-                    </a:lnT>
-                    <a:lnB w="12700" cap="flat" cmpd="sng" algn="ctr">
-                      <a:solidFill>
-                        <a:schemeClr val="tx1"/>
-                      </a:solidFill>
-                      <a:prstDash val="solid"/>
-                      <a:round/>
-                      <a:headEnd type="none" w="med" len="med"/>
-                      <a:tailEnd type="none" w="med" len="med"/>
-                    </a:lnB>
-                  </a:tcPr>
-                </a:tc>
-                <a:tc>
-                  <a:txBody>
-                    <a:bodyPr/>
-                    <a:lstStyle/>
-                    <a:p>
-                      <a:pPr algn="r" fontAlgn="b"/>
-                      <a:r>
-                        <a:rPr lang="en-MY" sz="800" b="0" i="0" u="none" strike="noStrike">
-                          <a:solidFill>
-                            <a:srgbClr val="000000"/>
-                          </a:solidFill>
-                          <a:effectLst/>
-                          <a:latin typeface="Calibri" panose="020F0502020204030204" pitchFamily="34" charset="0"/>
-                        </a:rPr>
-                        <a:t>96</a:t>
-                      </a:r>
-                    </a:p>
-                  </a:txBody>
-                  <a:tcPr marL="9525" marR="9525" marT="9525" marB="0" anchor="b">
-                    <a:lnL w="12700" cap="flat" cmpd="sng" algn="ctr">
-                      <a:solidFill>
-                        <a:schemeClr val="tx1"/>
-                      </a:solidFill>
-                      <a:prstDash val="solid"/>
-                      <a:round/>
-                      <a:headEnd type="none" w="med" len="med"/>
-                      <a:tailEnd type="none" w="med" len="med"/>
-                    </a:lnL>
-                    <a:lnR w="12700" cap="flat" cmpd="sng" algn="ctr">
-                      <a:solidFill>
-                        <a:schemeClr val="tx1"/>
-                      </a:solidFill>
-                      <a:prstDash val="solid"/>
-                      <a:round/>
-                      <a:headEnd type="none" w="med" len="med"/>
-                      <a:tailEnd type="none" w="med" len="med"/>
-                    </a:lnR>
-                    <a:lnT w="12700" cap="flat" cmpd="sng" algn="ctr">
-                      <a:solidFill>
-                        <a:schemeClr val="tx1"/>
-                      </a:solidFill>
-                      <a:prstDash val="solid"/>
-                      <a:round/>
-                      <a:headEnd type="none" w="med" len="med"/>
-                      <a:tailEnd type="none" w="med" len="med"/>
-                    </a:lnT>
-                    <a:lnB w="12700" cap="flat" cmpd="sng" algn="ctr">
-                      <a:solidFill>
-                        <a:schemeClr val="tx1"/>
-                      </a:solidFill>
-                      <a:prstDash val="solid"/>
-                      <a:round/>
-                      <a:headEnd type="none" w="med" len="med"/>
-                      <a:tailEnd type="none" w="med" len="med"/>
-                    </a:lnB>
-                  </a:tcPr>
-                </a:tc>
-                <a:tc>
-                  <a:txBody>
-                    <a:bodyPr/>
-                    <a:lstStyle/>
-                    <a:p>
-                      <a:pPr algn="r" fontAlgn="b"/>
-                      <a:r>
-                        <a:rPr lang="en-MY" sz="800" b="0" i="0" u="none" strike="noStrike">
-                          <a:solidFill>
-                            <a:srgbClr val="000000"/>
-                          </a:solidFill>
-                          <a:effectLst/>
-                          <a:latin typeface="Calibri" panose="020F0502020204030204" pitchFamily="34" charset="0"/>
-                        </a:rPr>
-                        <a:t>55</a:t>
-                      </a:r>
-                    </a:p>
-                  </a:txBody>
-                  <a:tcPr marL="9525" marR="9525" marT="9525" marB="0" anchor="b">
-                    <a:lnL w="12700" cap="flat" cmpd="sng" algn="ctr">
-                      <a:solidFill>
-                        <a:schemeClr val="tx1"/>
-                      </a:solidFill>
-                      <a:prstDash val="solid"/>
-                      <a:round/>
-                      <a:headEnd type="none" w="med" len="med"/>
-                      <a:tailEnd type="none" w="med" len="med"/>
-                    </a:lnL>
-                    <a:lnR w="12700" cap="flat" cmpd="sng" algn="ctr">
-                      <a:solidFill>
-                        <a:schemeClr val="tx1"/>
-                      </a:solidFill>
-                      <a:prstDash val="solid"/>
-                      <a:round/>
-                      <a:headEnd type="none" w="med" len="med"/>
-                      <a:tailEnd type="none" w="med" len="med"/>
-                    </a:lnR>
-                    <a:lnT w="12700" cap="flat" cmpd="sng" algn="ctr">
-                      <a:solidFill>
-                        <a:schemeClr val="tx1"/>
-                      </a:solidFill>
-                      <a:prstDash val="solid"/>
-                      <a:round/>
-                      <a:headEnd type="none" w="med" len="med"/>
-                      <a:tailEnd type="none" w="med" len="med"/>
-                    </a:lnT>
-                    <a:lnB w="12700" cap="flat" cmpd="sng" algn="ctr">
-                      <a:solidFill>
-                        <a:schemeClr val="tx1"/>
-                      </a:solidFill>
-                      <a:prstDash val="solid"/>
-                      <a:round/>
-                      <a:headEnd type="none" w="med" len="med"/>
-                      <a:tailEnd type="none" w="med" len="med"/>
-                    </a:lnB>
-                  </a:tcPr>
-                </a:tc>
-                <a:tc>
-                  <a:txBody>
-                    <a:bodyPr/>
-                    <a:lstStyle/>
-                    <a:p>
-                      <a:pPr algn="r" fontAlgn="b"/>
-                      <a:r>
-                        <a:rPr lang="en-MY" sz="800" b="0" i="0" u="none" strike="noStrike">
-                          <a:solidFill>
-                            <a:srgbClr val="000000"/>
-                          </a:solidFill>
-                          <a:effectLst/>
-                          <a:latin typeface="Calibri" panose="020F0502020204030204" pitchFamily="34" charset="0"/>
-                        </a:rPr>
-                        <a:t>211</a:t>
-                      </a:r>
-                    </a:p>
-                  </a:txBody>
-                  <a:tcPr marL="9525" marR="9525" marT="9525" marB="0" anchor="b">
-                    <a:lnL w="12700" cap="flat" cmpd="sng" algn="ctr">
-                      <a:solidFill>
-                        <a:schemeClr val="tx1"/>
-                      </a:solidFill>
-                      <a:prstDash val="solid"/>
-                      <a:round/>
-                      <a:headEnd type="none" w="med" len="med"/>
-                      <a:tailEnd type="none" w="med" len="med"/>
-                    </a:lnL>
-                    <a:lnR w="12700" cap="flat" cmpd="sng" algn="ctr">
-                      <a:solidFill>
-                        <a:schemeClr val="tx1"/>
-                      </a:solidFill>
-                      <a:prstDash val="solid"/>
-                      <a:round/>
-                      <a:headEnd type="none" w="med" len="med"/>
-                      <a:tailEnd type="none" w="med" len="med"/>
-                    </a:lnR>
-                    <a:lnT w="12700" cap="flat" cmpd="sng" algn="ctr">
-                      <a:solidFill>
-                        <a:schemeClr val="tx1"/>
-                      </a:solidFill>
-                      <a:prstDash val="solid"/>
-                      <a:round/>
-                      <a:headEnd type="none" w="med" len="med"/>
-                      <a:tailEnd type="none" w="med" len="med"/>
-                    </a:lnT>
-                    <a:lnB w="12700" cap="flat" cmpd="sng" algn="ctr">
-                      <a:solidFill>
-                        <a:schemeClr val="tx1"/>
-                      </a:solidFill>
-                      <a:prstDash val="solid"/>
-                      <a:round/>
-                      <a:headEnd type="none" w="med" len="med"/>
-                      <a:tailEnd type="none" w="med" len="med"/>
-                    </a:lnB>
-                  </a:tcPr>
-                </a:tc>
-                <a:tc>
-                  <a:txBody>
-                    <a:bodyPr/>
-                    <a:lstStyle/>
-                    <a:p>
-                      <a:pPr algn="r" fontAlgn="b"/>
-                      <a:r>
-                        <a:rPr lang="en-MY" sz="800" b="0" i="0" u="none" strike="noStrike">
-                          <a:solidFill>
-                            <a:srgbClr val="000000"/>
-                          </a:solidFill>
-                          <a:effectLst/>
-                          <a:latin typeface="Calibri" panose="020F0502020204030204" pitchFamily="34" charset="0"/>
-                        </a:rPr>
-                        <a:t>-1407000</a:t>
+                        <a:t>-1286000</a:t>
                       </a:r>
                     </a:p>
                   </a:txBody>
@@ -6279,7 +6223,7 @@
                     <a:p>
                       <a:pPr algn="r" fontAlgn="b"/>
                       <a:r>
-                        <a:rPr lang="en-MY" sz="800" b="0" i="0" u="none" strike="noStrike" dirty="0">
+                        <a:rPr lang="en-MY" sz="800" b="0" i="0" u="none" strike="noStrike">
                           <a:solidFill>
                             <a:srgbClr val="000000"/>
                           </a:solidFill>
@@ -6393,7 +6337,7 @@
                     <a:p>
                       <a:pPr algn="r" fontAlgn="b"/>
                       <a:r>
-                        <a:rPr lang="en-MY" sz="800" b="0" i="0" u="none" strike="noStrike" dirty="0">
+                        <a:rPr lang="en-MY" sz="800" b="0" i="0" u="none" strike="noStrike">
                           <a:solidFill>
                             <a:srgbClr val="000000"/>
                           </a:solidFill>
@@ -7312,7 +7256,7 @@
                     <a:p>
                       <a:pPr algn="r" fontAlgn="b"/>
                       <a:r>
-                        <a:rPr lang="en-MY" sz="800" b="0" i="0" u="none" strike="noStrike" dirty="0">
+                        <a:rPr lang="en-MY" sz="800" b="0" i="0" u="none" strike="noStrike">
                           <a:solidFill>
                             <a:srgbClr val="000000"/>
                           </a:solidFill>
@@ -8174,7 +8118,7 @@
                     <a:p>
                       <a:pPr algn="r" fontAlgn="b"/>
                       <a:r>
-                        <a:rPr lang="en-MY" sz="800" b="0" i="0" u="none" strike="noStrike" dirty="0">
+                        <a:rPr lang="en-MY" sz="800" b="0" i="0" u="none" strike="noStrike">
                           <a:solidFill>
                             <a:srgbClr val="000000"/>
                           </a:solidFill>
@@ -8288,7 +8232,7 @@
                     <a:p>
                       <a:pPr algn="r" fontAlgn="b"/>
                       <a:r>
-                        <a:rPr lang="en-MY" sz="800" b="0" i="0" u="none" strike="noStrike" dirty="0">
+                        <a:rPr lang="en-MY" sz="800" b="0" i="0" u="none" strike="noStrike">
                           <a:solidFill>
                             <a:srgbClr val="000000"/>
                           </a:solidFill>
@@ -8530,7 +8474,7 @@
                           <a:effectLst/>
                           <a:latin typeface="Calibri" panose="020F0502020204030204" pitchFamily="34" charset="0"/>
                         </a:rPr>
-                        <a:t>RandomForestGridSearch</a:t>
+                        <a:t>XGBoostGridSearch</a:t>
                       </a:r>
                     </a:p>
                   </a:txBody>
@@ -8587,7 +8531,7 @@
                           <a:effectLst/>
                           <a:latin typeface="Calibri" panose="020F0502020204030204" pitchFamily="34" charset="0"/>
                         </a:rPr>
-                        <a:t>0.884164</a:t>
+                        <a:t>0.868578</a:t>
                       </a:r>
                     </a:p>
                   </a:txBody>
@@ -8644,7 +8588,7 @@
                           <a:effectLst/>
                           <a:latin typeface="Calibri" panose="020F0502020204030204" pitchFamily="34" charset="0"/>
                         </a:rPr>
-                        <a:t>0.828008</a:t>
+                        <a:t>0.840269</a:t>
                       </a:r>
                     </a:p>
                   </a:txBody>
@@ -8701,7 +8645,7 @@
                           <a:effectLst/>
                           <a:latin typeface="Calibri" panose="020F0502020204030204" pitchFamily="34" charset="0"/>
                         </a:rPr>
-                        <a:t>0.884164</a:t>
+                        <a:t>0.868578</a:t>
                       </a:r>
                     </a:p>
                   </a:txBody>
@@ -8758,7 +8702,7 @@
                           <a:effectLst/>
                           <a:latin typeface="Calibri" panose="020F0502020204030204" pitchFamily="34" charset="0"/>
                         </a:rPr>
-                        <a:t>0.869399</a:t>
+                        <a:t>0.866857</a:t>
                       </a:r>
                     </a:p>
                   </a:txBody>
@@ -8815,7 +8759,7 @@
                           <a:effectLst/>
                           <a:latin typeface="Calibri" panose="020F0502020204030204" pitchFamily="34" charset="0"/>
                         </a:rPr>
-                        <a:t>0.768405</a:t>
+                        <a:t>0.737251</a:t>
                       </a:r>
                     </a:p>
                   </a:txBody>
@@ -8872,7 +8816,7 @@
                           <a:effectLst/>
                           <a:latin typeface="Calibri" panose="020F0502020204030204" pitchFamily="34" charset="0"/>
                         </a:rPr>
-                        <a:t>0.477462</a:t>
+                        <a:t>0.487272</a:t>
                       </a:r>
                     </a:p>
                   </a:txBody>
@@ -8929,7 +8873,7 @@
                           <a:effectLst/>
                           <a:latin typeface="Calibri" panose="020F0502020204030204" pitchFamily="34" charset="0"/>
                         </a:rPr>
-                        <a:t>0.883333</a:t>
+                        <a:t>0.867514</a:t>
                       </a:r>
                     </a:p>
                   </a:txBody>
@@ -8986,7 +8930,7 @@
                           <a:effectLst/>
                           <a:latin typeface="Calibri" panose="020F0502020204030204" pitchFamily="34" charset="0"/>
                         </a:rPr>
-                        <a:t>0.501818</a:t>
+                        <a:t>0.506478</a:t>
                       </a:r>
                     </a:p>
                   </a:txBody>
@@ -9043,7 +8987,7 @@
                           <a:effectLst/>
                           <a:latin typeface="Calibri" panose="020F0502020204030204" pitchFamily="34" charset="0"/>
                         </a:rPr>
-                        <a:t>352</a:t>
+                        <a:t>368</a:t>
                       </a:r>
                     </a:p>
                   </a:txBody>
@@ -9093,14 +9037,14 @@
                     <a:p>
                       <a:pPr algn="r" fontAlgn="b"/>
                       <a:r>
-                        <a:rPr lang="en-MY" sz="800" b="0" i="0" u="none" strike="noStrike" dirty="0">
-                          <a:solidFill>
-                            <a:srgbClr val="000000"/>
-                          </a:solidFill>
-                          <a:effectLst/>
-                          <a:latin typeface="Calibri" panose="020F0502020204030204" pitchFamily="34" charset="0"/>
-                        </a:rPr>
-                        <a:t>59</a:t>
+                        <a:rPr lang="en-MY" sz="800" b="0" i="0" u="none" strike="noStrike">
+                          <a:solidFill>
+                            <a:srgbClr val="000000"/>
+                          </a:solidFill>
+                          <a:effectLst/>
+                          <a:latin typeface="Calibri" panose="020F0502020204030204" pitchFamily="34" charset="0"/>
+                        </a:rPr>
+                        <a:t>51</a:t>
                       </a:r>
                     </a:p>
                   </a:txBody>
@@ -9150,14 +9094,14 @@
                     <a:p>
                       <a:pPr algn="r" fontAlgn="b"/>
                       <a:r>
-                        <a:rPr lang="en-MY" sz="800" b="0" i="0" u="none" strike="noStrike" dirty="0">
-                          <a:solidFill>
-                            <a:srgbClr val="000000"/>
-                          </a:solidFill>
-                          <a:effectLst/>
-                          <a:latin typeface="Calibri" panose="020F0502020204030204" pitchFamily="34" charset="0"/>
-                        </a:rPr>
-                        <a:t>207</a:t>
+                        <a:rPr lang="en-MY" sz="800" b="0" i="0" u="none" strike="noStrike">
+                          <a:solidFill>
+                            <a:srgbClr val="000000"/>
+                          </a:solidFill>
+                          <a:effectLst/>
+                          <a:latin typeface="Calibri" panose="020F0502020204030204" pitchFamily="34" charset="0"/>
+                        </a:rPr>
+                        <a:t>215</a:t>
                       </a:r>
                     </a:p>
                   </a:txBody>
@@ -9214,7 +9158,7 @@
                           <a:effectLst/>
                           <a:latin typeface="Calibri" panose="020F0502020204030204" pitchFamily="34" charset="0"/>
                         </a:rPr>
-                        <a:t>-1739000</a:t>
+                        <a:t>-1603000</a:t>
                       </a:r>
                     </a:p>
                   </a:txBody>
@@ -9335,7 +9279,7 @@
                           <a:effectLst/>
                           <a:latin typeface="Calibri" panose="020F0502020204030204" pitchFamily="34" charset="0"/>
                         </a:rPr>
-                        <a:t>DecisionTree</a:t>
+                        <a:t>RandomForestGridSearch</a:t>
                       </a:r>
                     </a:p>
                   </a:txBody>
@@ -9392,7 +9336,7 @@
                           <a:effectLst/>
                           <a:latin typeface="Calibri" panose="020F0502020204030204" pitchFamily="34" charset="0"/>
                         </a:rPr>
-                        <a:t>0.999957</a:t>
+                        <a:t>0.884164</a:t>
                       </a:r>
                     </a:p>
                   </a:txBody>
@@ -9449,7 +9393,7 @@
                           <a:effectLst/>
                           <a:latin typeface="Calibri" panose="020F0502020204030204" pitchFamily="34" charset="0"/>
                         </a:rPr>
-                        <a:t>0.837991</a:t>
+                        <a:t>0.828008</a:t>
                       </a:r>
                     </a:p>
                   </a:txBody>
@@ -9506,7 +9450,7 @@
                           <a:effectLst/>
                           <a:latin typeface="Calibri" panose="020F0502020204030204" pitchFamily="34" charset="0"/>
                         </a:rPr>
-                        <a:t>0.999957</a:t>
+                        <a:t>0.884164</a:t>
                       </a:r>
                     </a:p>
                   </a:txBody>
@@ -9563,7 +9507,7 @@
                           <a:effectLst/>
                           <a:latin typeface="Calibri" panose="020F0502020204030204" pitchFamily="34" charset="0"/>
                         </a:rPr>
-                        <a:t>0.915793</a:t>
+                        <a:t>0.869399</a:t>
                       </a:r>
                     </a:p>
                   </a:txBody>
@@ -9620,7 +9564,7 @@
                           <a:effectLst/>
                           <a:latin typeface="Calibri" panose="020F0502020204030204" pitchFamily="34" charset="0"/>
                         </a:rPr>
-                        <a:t>0.999914</a:t>
+                        <a:t>0.768405</a:t>
                       </a:r>
                     </a:p>
                   </a:txBody>
@@ -9677,7 +9621,7 @@
                           <a:effectLst/>
                           <a:latin typeface="Calibri" panose="020F0502020204030204" pitchFamily="34" charset="0"/>
                         </a:rPr>
-                        <a:t>0.567577</a:t>
+                        <a:t>0.477462</a:t>
                       </a:r>
                     </a:p>
                   </a:txBody>
@@ -9734,7 +9678,7 @@
                           <a:effectLst/>
                           <a:latin typeface="Calibri" panose="020F0502020204030204" pitchFamily="34" charset="0"/>
                         </a:rPr>
-                        <a:t>0.999957</a:t>
+                        <a:t>0.883333</a:t>
                       </a:r>
                     </a:p>
                   </a:txBody>
@@ -9791,7 +9735,7 @@
                           <a:effectLst/>
                           <a:latin typeface="Calibri" panose="020F0502020204030204" pitchFamily="34" charset="0"/>
                         </a:rPr>
-                        <a:t>0.599092</a:t>
+                        <a:t>0.501818</a:t>
                       </a:r>
                     </a:p>
                   </a:txBody>
@@ -9848,7 +9792,7 @@
                           <a:effectLst/>
                           <a:latin typeface="Calibri" panose="020F0502020204030204" pitchFamily="34" charset="0"/>
                         </a:rPr>
-                        <a:t>197</a:t>
+                        <a:t>352</a:t>
                       </a:r>
                     </a:p>
                   </a:txBody>
@@ -9905,7 +9849,7 @@
                           <a:effectLst/>
                           <a:latin typeface="Calibri" panose="020F0502020204030204" pitchFamily="34" charset="0"/>
                         </a:rPr>
-                        <a:t>68</a:t>
+                        <a:t>59</a:t>
                       </a:r>
                     </a:p>
                   </a:txBody>
@@ -9962,7 +9906,7 @@
                           <a:effectLst/>
                           <a:latin typeface="Calibri" panose="020F0502020204030204" pitchFamily="34" charset="0"/>
                         </a:rPr>
-                        <a:t>198</a:t>
+                        <a:t>207</a:t>
                       </a:r>
                     </a:p>
                   </a:txBody>
@@ -10012,14 +9956,14 @@
                     <a:p>
                       <a:pPr algn="r" fontAlgn="b"/>
                       <a:r>
-                        <a:rPr lang="en-MY" sz="800" b="0" i="0" u="none" strike="noStrike" dirty="0">
-                          <a:solidFill>
-                            <a:srgbClr val="000000"/>
-                          </a:solidFill>
-                          <a:effectLst/>
-                          <a:latin typeface="Calibri" panose="020F0502020204030204" pitchFamily="34" charset="0"/>
-                        </a:rPr>
-                        <a:t>-1755000</a:t>
+                        <a:rPr lang="en-MY" sz="800" b="0" i="0" u="none" strike="noStrike">
+                          <a:solidFill>
+                            <a:srgbClr val="000000"/>
+                          </a:solidFill>
+                          <a:effectLst/>
+                          <a:latin typeface="Calibri" panose="020F0502020204030204" pitchFamily="34" charset="0"/>
+                        </a:rPr>
+                        <a:t>-1739000</a:t>
                       </a:r>
                     </a:p>
                   </a:txBody>
@@ -10140,7 +10084,7 @@
                           <a:effectLst/>
                           <a:latin typeface="Calibri" panose="020F0502020204030204" pitchFamily="34" charset="0"/>
                         </a:rPr>
-                        <a:t>XGBoostGridSearch</a:t>
+                        <a:t>DecisionTree</a:t>
                       </a:r>
                     </a:p>
                   </a:txBody>
@@ -10197,7 +10141,7 @@
                           <a:effectLst/>
                           <a:latin typeface="Calibri" panose="020F0502020204030204" pitchFamily="34" charset="0"/>
                         </a:rPr>
-                        <a:t>0.862879</a:t>
+                        <a:t>0.999957</a:t>
                       </a:r>
                     </a:p>
                   </a:txBody>
@@ -10254,7 +10198,7 @@
                           <a:effectLst/>
                           <a:latin typeface="Calibri" panose="020F0502020204030204" pitchFamily="34" charset="0"/>
                         </a:rPr>
-                        <a:t>0.823293</a:t>
+                        <a:t>0.837991</a:t>
                       </a:r>
                     </a:p>
                   </a:txBody>
@@ -10311,7 +10255,7 @@
                           <a:effectLst/>
                           <a:latin typeface="Calibri" panose="020F0502020204030204" pitchFamily="34" charset="0"/>
                         </a:rPr>
-                        <a:t>0.862879</a:t>
+                        <a:t>0.999957</a:t>
                       </a:r>
                     </a:p>
                   </a:txBody>
@@ -10368,7 +10312,7 @@
                           <a:effectLst/>
                           <a:latin typeface="Calibri" panose="020F0502020204030204" pitchFamily="34" charset="0"/>
                         </a:rPr>
-                        <a:t>0.857642</a:t>
+                        <a:t>0.915793</a:t>
                       </a:r>
                     </a:p>
                   </a:txBody>
@@ -10425,7 +10369,7 @@
                           <a:effectLst/>
                           <a:latin typeface="Calibri" panose="020F0502020204030204" pitchFamily="34" charset="0"/>
                         </a:rPr>
-                        <a:t>0.725891</a:t>
+                        <a:t>0.999914</a:t>
                       </a:r>
                     </a:p>
                   </a:txBody>
@@ -10482,7 +10426,7 @@
                           <a:effectLst/>
                           <a:latin typeface="Calibri" panose="020F0502020204030204" pitchFamily="34" charset="0"/>
                         </a:rPr>
-                        <a:t>0.458461</a:t>
+                        <a:t>0.567577</a:t>
                       </a:r>
                     </a:p>
                   </a:txBody>
@@ -10539,7 +10483,7 @@
                           <a:effectLst/>
                           <a:latin typeface="Calibri" panose="020F0502020204030204" pitchFamily="34" charset="0"/>
                         </a:rPr>
-                        <a:t>0.861552</a:t>
+                        <a:t>0.999957</a:t>
                       </a:r>
                     </a:p>
                   </a:txBody>
@@ -10596,7 +10540,7 @@
                           <a:effectLst/>
                           <a:latin typeface="Calibri" panose="020F0502020204030204" pitchFamily="34" charset="0"/>
                         </a:rPr>
-                        <a:t>0.481481</a:t>
+                        <a:t>0.599092</a:t>
                       </a:r>
                     </a:p>
                   </a:txBody>
@@ -10653,7 +10597,7 @@
                           <a:effectLst/>
                           <a:latin typeface="Calibri" panose="020F0502020204030204" pitchFamily="34" charset="0"/>
                         </a:rPr>
-                        <a:t>391</a:t>
+                        <a:t>197</a:t>
                       </a:r>
                     </a:p>
                   </a:txBody>
@@ -10710,7 +10654,7 @@
                           <a:effectLst/>
                           <a:latin typeface="Calibri" panose="020F0502020204030204" pitchFamily="34" charset="0"/>
                         </a:rPr>
-                        <a:t>58</a:t>
+                        <a:t>68</a:t>
                       </a:r>
                     </a:p>
                   </a:txBody>
@@ -10767,7 +10711,7 @@
                           <a:effectLst/>
                           <a:latin typeface="Calibri" panose="020F0502020204030204" pitchFamily="34" charset="0"/>
                         </a:rPr>
-                        <a:t>208</a:t>
+                        <a:t>198</a:t>
                       </a:r>
                     </a:p>
                   </a:txBody>
@@ -10817,14 +10761,14 @@
                     <a:p>
                       <a:pPr algn="r" fontAlgn="b"/>
                       <a:r>
-                        <a:rPr lang="en-MY" sz="800" b="0" i="0" u="none" strike="noStrike" dirty="0">
-                          <a:solidFill>
-                            <a:srgbClr val="000000"/>
-                          </a:solidFill>
-                          <a:effectLst/>
-                          <a:latin typeface="Calibri" panose="020F0502020204030204" pitchFamily="34" charset="0"/>
-                        </a:rPr>
-                        <a:t>-1759000</a:t>
+                        <a:rPr lang="en-MY" sz="800" b="0" i="0" u="none" strike="noStrike">
+                          <a:solidFill>
+                            <a:srgbClr val="000000"/>
+                          </a:solidFill>
+                          <a:effectLst/>
+                          <a:latin typeface="Calibri" panose="020F0502020204030204" pitchFamily="34" charset="0"/>
+                        </a:rPr>
+                        <a:t>-1755000</a:t>
                       </a:r>
                     </a:p>
                   </a:txBody>
@@ -13364,7 +13308,7 @@
           <p:nvPr>
             <p:extLst>
               <p:ext uri="{D42A27DB-BD31-4B8C-83A1-F6EECF244321}">
-                <p14:modId xmlns:p14="http://schemas.microsoft.com/office/powerpoint/2010/main" val="800157848"/>
+                <p14:modId xmlns:p14="http://schemas.microsoft.com/office/powerpoint/2010/main" val="2778994129"/>
               </p:ext>
             </p:extLst>
           </p:nvPr>
@@ -13725,7 +13669,7 @@
                           <a:effectLst/>
                           <a:latin typeface="Calibri" panose="020F0502020204030204" pitchFamily="34" charset="0"/>
                         </a:rPr>
-                        <a:t>10000</a:t>
+                        <a:t>20000</a:t>
                       </a:r>
                     </a:p>
                   </a:txBody>
@@ -13879,7 +13823,7 @@
                   <a:srgbClr val="FFFF00"/>
                 </a:highlight>
               </a:rPr>
-              <a:t>: 62 * $10,000 = $620,000</a:t>
+              <a:t>: 62 * $20,000 = $1,240,000</a:t>
             </a:r>
           </a:p>
         </p:txBody>
@@ -13943,7 +13887,7 @@
         <p:spPr>
           <a:xfrm>
             <a:off x="9769642" y="5515170"/>
-            <a:ext cx="2125579" cy="369332"/>
+            <a:ext cx="2263202" cy="369332"/>
           </a:xfrm>
           <a:prstGeom prst="rect">
             <a:avLst/>
@@ -13958,7 +13902,7 @@
           <a:p>
             <a:r>
               <a:rPr lang="en-MY" dirty="0"/>
-              <a:t>Total cost: $881,000</a:t>
+              <a:t>Total cost: $1,501,000</a:t>
             </a:r>
           </a:p>
         </p:txBody>
@@ -14098,35 +14042,6 @@
       </p:grpSpPr>
       <p:pic>
         <p:nvPicPr>
-          <p:cNvPr id="5" name="Picture 4">
-            <a:extLst>
-              <a:ext uri="{FF2B5EF4-FFF2-40B4-BE49-F238E27FC236}">
-                <a16:creationId xmlns:a16="http://schemas.microsoft.com/office/drawing/2014/main" id="{F622CBA6-A132-4355-AEA1-6B460D9F66E7}"/>
-              </a:ext>
-            </a:extLst>
-          </p:cNvPr>
-          <p:cNvPicPr>
-            <a:picLocks noChangeAspect="1"/>
-          </p:cNvPicPr>
-          <p:nvPr/>
-        </p:nvPicPr>
-        <p:blipFill rotWithShape="1">
-          <a:blip r:embed="rId2"/>
-          <a:srcRect l="3050" t="6294" r="18362" b="6294"/>
-          <a:stretch/>
-        </p:blipFill>
-        <p:spPr>
-          <a:xfrm>
-            <a:off x="65315" y="998375"/>
-            <a:ext cx="5299788" cy="5103845"/>
-          </a:xfrm>
-          <a:prstGeom prst="rect">
-            <a:avLst/>
-          </a:prstGeom>
-        </p:spPr>
-      </p:pic>
-      <p:pic>
-        <p:nvPicPr>
           <p:cNvPr id="6" name="Picture 5">
             <a:extLst>
               <a:ext uri="{FF2B5EF4-FFF2-40B4-BE49-F238E27FC236}">
@@ -14140,7 +14055,7 @@
           <p:nvPr/>
         </p:nvPicPr>
         <p:blipFill rotWithShape="1">
-          <a:blip r:embed="rId3"/>
+          <a:blip r:embed="rId2"/>
           <a:srcRect l="3109" t="6528" r="19127" b="6528"/>
           <a:stretch/>
         </p:blipFill>
@@ -14148,6 +14063,35 @@
           <a:xfrm>
             <a:off x="6095999" y="998375"/>
             <a:ext cx="5380653" cy="5132720"/>
+          </a:xfrm>
+          <a:prstGeom prst="rect">
+            <a:avLst/>
+          </a:prstGeom>
+        </p:spPr>
+      </p:pic>
+      <p:pic>
+        <p:nvPicPr>
+          <p:cNvPr id="2" name="Picture 1">
+            <a:extLst>
+              <a:ext uri="{FF2B5EF4-FFF2-40B4-BE49-F238E27FC236}">
+                <a16:creationId xmlns:a16="http://schemas.microsoft.com/office/drawing/2014/main" id="{8CAC23AA-9F60-4AE3-8B08-42A0F6F143B4}"/>
+              </a:ext>
+            </a:extLst>
+          </p:cNvPr>
+          <p:cNvPicPr>
+            <a:picLocks noChangeAspect="1"/>
+          </p:cNvPicPr>
+          <p:nvPr/>
+        </p:nvPicPr>
+        <p:blipFill rotWithShape="1">
+          <a:blip r:embed="rId3"/>
+          <a:srcRect l="1442" t="6485" r="18104" b="6919"/>
+          <a:stretch/>
+        </p:blipFill>
+        <p:spPr>
+          <a:xfrm>
+            <a:off x="329681" y="998375"/>
+            <a:ext cx="5380653" cy="5149774"/>
           </a:xfrm>
           <a:prstGeom prst="rect">
             <a:avLst/>
@@ -14215,10 +14159,10 @@
       </p:pic>
       <p:pic>
         <p:nvPicPr>
-          <p:cNvPr id="6" name="Picture 5">
+          <p:cNvPr id="2" name="Picture 1">
             <a:extLst>
               <a:ext uri="{FF2B5EF4-FFF2-40B4-BE49-F238E27FC236}">
-                <a16:creationId xmlns:a16="http://schemas.microsoft.com/office/drawing/2014/main" id="{2EE7A4C9-CAC3-425F-A644-98BFD6213376}"/>
+                <a16:creationId xmlns:a16="http://schemas.microsoft.com/office/drawing/2014/main" id="{3A202B60-63BA-45AB-90BF-78579BF146F4}"/>
               </a:ext>
             </a:extLst>
           </p:cNvPr>
@@ -14229,13 +14173,13 @@
         </p:nvPicPr>
         <p:blipFill rotWithShape="1">
           <a:blip r:embed="rId3"/>
-          <a:srcRect l="3133" t="5280" r="18416" b="6541"/>
+          <a:srcRect l="4402" t="5866" r="18808" b="6041"/>
           <a:stretch/>
         </p:blipFill>
         <p:spPr>
           <a:xfrm>
-            <a:off x="6298163" y="821092"/>
-            <a:ext cx="5384700" cy="5346443"/>
+            <a:off x="6301945" y="919694"/>
+            <a:ext cx="5105383" cy="4942264"/>
           </a:xfrm>
           <a:prstGeom prst="rect">
             <a:avLst/>

</xml_diff>

<commit_message>
for q2_fraud_detection, adding standardscaler to scale down data
</commit_message>
<xml_diff>
--- a/q2_fraud_detection/results/confusion_matrices.pptx
+++ b/q2_fraud_detection/results/confusion_matrices.pptx
@@ -266,7 +266,7 @@
           <a:p>
             <a:fld id="{02D6A8D5-80ED-4BA4-89C7-1F55AC1402EC}" type="datetimeFigureOut">
               <a:rPr lang="en-MY" smtClean="0"/>
-              <a:t>21/8/2020</a:t>
+              <a:t>24/8/2020</a:t>
             </a:fld>
             <a:endParaRPr lang="en-MY"/>
           </a:p>
@@ -466,7 +466,7 @@
           <a:p>
             <a:fld id="{02D6A8D5-80ED-4BA4-89C7-1F55AC1402EC}" type="datetimeFigureOut">
               <a:rPr lang="en-MY" smtClean="0"/>
-              <a:t>21/8/2020</a:t>
+              <a:t>24/8/2020</a:t>
             </a:fld>
             <a:endParaRPr lang="en-MY"/>
           </a:p>
@@ -676,7 +676,7 @@
           <a:p>
             <a:fld id="{02D6A8D5-80ED-4BA4-89C7-1F55AC1402EC}" type="datetimeFigureOut">
               <a:rPr lang="en-MY" smtClean="0"/>
-              <a:t>21/8/2020</a:t>
+              <a:t>24/8/2020</a:t>
             </a:fld>
             <a:endParaRPr lang="en-MY"/>
           </a:p>
@@ -876,7 +876,7 @@
           <a:p>
             <a:fld id="{02D6A8D5-80ED-4BA4-89C7-1F55AC1402EC}" type="datetimeFigureOut">
               <a:rPr lang="en-MY" smtClean="0"/>
-              <a:t>21/8/2020</a:t>
+              <a:t>24/8/2020</a:t>
             </a:fld>
             <a:endParaRPr lang="en-MY"/>
           </a:p>
@@ -1152,7 +1152,7 @@
           <a:p>
             <a:fld id="{02D6A8D5-80ED-4BA4-89C7-1F55AC1402EC}" type="datetimeFigureOut">
               <a:rPr lang="en-MY" smtClean="0"/>
-              <a:t>21/8/2020</a:t>
+              <a:t>24/8/2020</a:t>
             </a:fld>
             <a:endParaRPr lang="en-MY"/>
           </a:p>
@@ -1420,7 +1420,7 @@
           <a:p>
             <a:fld id="{02D6A8D5-80ED-4BA4-89C7-1F55AC1402EC}" type="datetimeFigureOut">
               <a:rPr lang="en-MY" smtClean="0"/>
-              <a:t>21/8/2020</a:t>
+              <a:t>24/8/2020</a:t>
             </a:fld>
             <a:endParaRPr lang="en-MY"/>
           </a:p>
@@ -1835,7 +1835,7 @@
           <a:p>
             <a:fld id="{02D6A8D5-80ED-4BA4-89C7-1F55AC1402EC}" type="datetimeFigureOut">
               <a:rPr lang="en-MY" smtClean="0"/>
-              <a:t>21/8/2020</a:t>
+              <a:t>24/8/2020</a:t>
             </a:fld>
             <a:endParaRPr lang="en-MY"/>
           </a:p>
@@ -1977,7 +1977,7 @@
           <a:p>
             <a:fld id="{02D6A8D5-80ED-4BA4-89C7-1F55AC1402EC}" type="datetimeFigureOut">
               <a:rPr lang="en-MY" smtClean="0"/>
-              <a:t>21/8/2020</a:t>
+              <a:t>24/8/2020</a:t>
             </a:fld>
             <a:endParaRPr lang="en-MY"/>
           </a:p>
@@ -2090,7 +2090,7 @@
           <a:p>
             <a:fld id="{02D6A8D5-80ED-4BA4-89C7-1F55AC1402EC}" type="datetimeFigureOut">
               <a:rPr lang="en-MY" smtClean="0"/>
-              <a:t>21/8/2020</a:t>
+              <a:t>24/8/2020</a:t>
             </a:fld>
             <a:endParaRPr lang="en-MY"/>
           </a:p>
@@ -2403,7 +2403,7 @@
           <a:p>
             <a:fld id="{02D6A8D5-80ED-4BA4-89C7-1F55AC1402EC}" type="datetimeFigureOut">
               <a:rPr lang="en-MY" smtClean="0"/>
-              <a:t>21/8/2020</a:t>
+              <a:t>24/8/2020</a:t>
             </a:fld>
             <a:endParaRPr lang="en-MY"/>
           </a:p>
@@ -2692,7 +2692,7 @@
           <a:p>
             <a:fld id="{02D6A8D5-80ED-4BA4-89C7-1F55AC1402EC}" type="datetimeFigureOut">
               <a:rPr lang="en-MY" smtClean="0"/>
-              <a:t>21/8/2020</a:t>
+              <a:t>24/8/2020</a:t>
             </a:fld>
             <a:endParaRPr lang="en-MY"/>
           </a:p>
@@ -2935,7 +2935,7 @@
           <a:p>
             <a:fld id="{02D6A8D5-80ED-4BA4-89C7-1F55AC1402EC}" type="datetimeFigureOut">
               <a:rPr lang="en-MY" smtClean="0"/>
-              <a:t>21/8/2020</a:t>
+              <a:t>24/8/2020</a:t>
             </a:fld>
             <a:endParaRPr lang="en-MY"/>
           </a:p>
@@ -3432,7 +3432,7 @@
           <p:nvPr>
             <p:extLst>
               <p:ext uri="{D42A27DB-BD31-4B8C-83A1-F6EECF244321}">
-                <p14:modId xmlns:p14="http://schemas.microsoft.com/office/powerpoint/2010/main" val="1883473755"/>
+                <p14:modId xmlns:p14="http://schemas.microsoft.com/office/powerpoint/2010/main" val="709381649"/>
               </p:ext>
             </p:extLst>
           </p:nvPr>
@@ -4442,7 +4442,7 @@
                     <a:p>
                       <a:pPr algn="l" fontAlgn="b"/>
                       <a:r>
-                        <a:rPr lang="en-MY" sz="800" b="0" i="0" u="none" strike="noStrike">
+                        <a:rPr lang="en-MY" sz="900" b="0" i="0" u="none" strike="noStrike">
                           <a:solidFill>
                             <a:srgbClr val="000000"/>
                           </a:solidFill>
@@ -4499,7 +4499,7 @@
                     <a:p>
                       <a:pPr algn="r" fontAlgn="b"/>
                       <a:r>
-                        <a:rPr lang="en-MY" sz="800" b="0" i="0" u="none" strike="noStrike">
+                        <a:rPr lang="en-MY" sz="900" b="0" i="0" u="none" strike="noStrike">
                           <a:solidFill>
                             <a:srgbClr val="000000"/>
                           </a:solidFill>
@@ -4556,14 +4556,14 @@
                     <a:p>
                       <a:pPr algn="r" fontAlgn="b"/>
                       <a:r>
-                        <a:rPr lang="en-MY" sz="800" b="0" i="0" u="none" strike="noStrike">
-                          <a:solidFill>
-                            <a:srgbClr val="000000"/>
-                          </a:solidFill>
-                          <a:effectLst/>
-                          <a:latin typeface="Calibri" panose="020F0502020204030204" pitchFamily="34" charset="0"/>
-                        </a:rPr>
-                        <a:t>0.89537</a:t>
+                        <a:rPr lang="en-MY" sz="900" b="0" i="0" u="none" strike="noStrike">
+                          <a:solidFill>
+                            <a:srgbClr val="000000"/>
+                          </a:solidFill>
+                          <a:effectLst/>
+                          <a:latin typeface="Calibri" panose="020F0502020204030204" pitchFamily="34" charset="0"/>
+                        </a:rPr>
+                        <a:t>0.90338</a:t>
                       </a:r>
                     </a:p>
                   </a:txBody>
@@ -4613,7 +4613,7 @@
                     <a:p>
                       <a:pPr algn="r" fontAlgn="b"/>
                       <a:r>
-                        <a:rPr lang="en-MY" sz="800" b="0" i="0" u="none" strike="noStrike">
+                        <a:rPr lang="en-MY" sz="900" b="0" i="0" u="none" strike="noStrike">
                           <a:solidFill>
                             <a:srgbClr val="000000"/>
                           </a:solidFill>
@@ -4670,14 +4670,14 @@
                     <a:p>
                       <a:pPr algn="r" fontAlgn="b"/>
                       <a:r>
-                        <a:rPr lang="en-MY" sz="800" b="0" i="0" u="none" strike="noStrike">
-                          <a:solidFill>
-                            <a:srgbClr val="000000"/>
-                          </a:solidFill>
-                          <a:effectLst/>
-                          <a:latin typeface="Calibri" panose="020F0502020204030204" pitchFamily="34" charset="0"/>
-                        </a:rPr>
-                        <a:t>0.958373</a:t>
+                        <a:rPr lang="en-MY" sz="900" b="0" i="0" u="none" strike="noStrike">
+                          <a:solidFill>
+                            <a:srgbClr val="000000"/>
+                          </a:solidFill>
+                          <a:effectLst/>
+                          <a:latin typeface="Calibri" panose="020F0502020204030204" pitchFamily="34" charset="0"/>
+                        </a:rPr>
+                        <a:t>0.95742</a:t>
                       </a:r>
                     </a:p>
                   </a:txBody>
@@ -4727,7 +4727,7 @@
                     <a:p>
                       <a:pPr algn="r" fontAlgn="b"/>
                       <a:r>
-                        <a:rPr lang="en-MY" sz="800" b="0" i="0" u="none" strike="noStrike">
+                        <a:rPr lang="en-MY" sz="900" b="0" i="0" u="none" strike="noStrike">
                           <a:solidFill>
                             <a:srgbClr val="000000"/>
                           </a:solidFill>
@@ -4784,14 +4784,14 @@
                     <a:p>
                       <a:pPr algn="r" fontAlgn="b"/>
                       <a:r>
-                        <a:rPr lang="en-MY" sz="800" b="0" i="0" u="none" strike="noStrike">
-                          <a:solidFill>
-                            <a:srgbClr val="000000"/>
-                          </a:solidFill>
-                          <a:effectLst/>
-                          <a:latin typeface="Calibri" panose="020F0502020204030204" pitchFamily="34" charset="0"/>
-                        </a:rPr>
-                        <a:t>0.747903</a:t>
+                        <a:rPr lang="en-MY" sz="900" b="0" i="0" u="none" strike="noStrike">
+                          <a:solidFill>
+                            <a:srgbClr val="000000"/>
+                          </a:solidFill>
+                          <a:effectLst/>
+                          <a:latin typeface="Calibri" panose="020F0502020204030204" pitchFamily="34" charset="0"/>
+                        </a:rPr>
+                        <a:t>0.748805</a:t>
                       </a:r>
                     </a:p>
                   </a:txBody>
@@ -4841,7 +4841,7 @@
                     <a:p>
                       <a:pPr algn="r" fontAlgn="b"/>
                       <a:r>
-                        <a:rPr lang="en-MY" sz="800" b="0" i="0" u="none" strike="noStrike">
+                        <a:rPr lang="en-MY" sz="900" b="0" i="0" u="none" strike="noStrike">
                           <a:solidFill>
                             <a:srgbClr val="000000"/>
                           </a:solidFill>
@@ -4898,14 +4898,14 @@
                     <a:p>
                       <a:pPr algn="r" fontAlgn="b"/>
                       <a:r>
-                        <a:rPr lang="en-MY" sz="800" b="0" i="0" u="none" strike="noStrike">
-                          <a:solidFill>
-                            <a:srgbClr val="000000"/>
-                          </a:solidFill>
-                          <a:effectLst/>
-                          <a:latin typeface="Calibri" panose="020F0502020204030204" pitchFamily="34" charset="0"/>
-                        </a:rPr>
-                        <a:t>0.768959</a:t>
+                        <a:rPr lang="en-MY" sz="900" b="0" i="0" u="none" strike="noStrike">
+                          <a:solidFill>
+                            <a:srgbClr val="000000"/>
+                          </a:solidFill>
+                          <a:effectLst/>
+                          <a:latin typeface="Calibri" panose="020F0502020204030204" pitchFamily="34" charset="0"/>
+                        </a:rPr>
+                        <a:t>0.768966</a:t>
                       </a:r>
                     </a:p>
                   </a:txBody>
@@ -4955,14 +4955,14 @@
                     <a:p>
                       <a:pPr algn="r" fontAlgn="b"/>
                       <a:r>
-                        <a:rPr lang="en-MY" sz="800" b="0" i="0" u="none" strike="noStrike">
-                          <a:solidFill>
-                            <a:srgbClr val="000000"/>
-                          </a:solidFill>
-                          <a:effectLst/>
-                          <a:latin typeface="Calibri" panose="020F0502020204030204" pitchFamily="34" charset="0"/>
-                        </a:rPr>
-                        <a:t>83</a:t>
+                        <a:rPr lang="en-MY" sz="900" b="0" i="0" u="none" strike="noStrike">
+                          <a:solidFill>
+                            <a:srgbClr val="000000"/>
+                          </a:solidFill>
+                          <a:effectLst/>
+                          <a:latin typeface="Calibri" panose="020F0502020204030204" pitchFamily="34" charset="0"/>
+                        </a:rPr>
+                        <a:t>91</a:t>
                       </a:r>
                     </a:p>
                   </a:txBody>
@@ -5012,14 +5012,14 @@
                     <a:p>
                       <a:pPr algn="r" fontAlgn="b"/>
                       <a:r>
-                        <a:rPr lang="en-MY" sz="800" b="0" i="0" u="none" strike="noStrike">
-                          <a:solidFill>
-                            <a:srgbClr val="000000"/>
-                          </a:solidFill>
-                          <a:effectLst/>
-                          <a:latin typeface="Calibri" panose="020F0502020204030204" pitchFamily="34" charset="0"/>
-                        </a:rPr>
-                        <a:t>48</a:t>
+                        <a:rPr lang="en-MY" sz="900" b="0" i="0" u="none" strike="noStrike">
+                          <a:solidFill>
+                            <a:srgbClr val="000000"/>
+                          </a:solidFill>
+                          <a:effectLst/>
+                          <a:latin typeface="Calibri" panose="020F0502020204030204" pitchFamily="34" charset="0"/>
+                        </a:rPr>
+                        <a:t>43</a:t>
                       </a:r>
                     </a:p>
                   </a:txBody>
@@ -5069,14 +5069,14 @@
                     <a:p>
                       <a:pPr algn="r" fontAlgn="b"/>
                       <a:r>
-                        <a:rPr lang="en-MY" sz="800" b="0" i="0" u="none" strike="noStrike">
-                          <a:solidFill>
-                            <a:srgbClr val="000000"/>
-                          </a:solidFill>
-                          <a:effectLst/>
-                          <a:latin typeface="Calibri" panose="020F0502020204030204" pitchFamily="34" charset="0"/>
-                        </a:rPr>
-                        <a:t>218</a:t>
+                        <a:rPr lang="en-MY" sz="900" b="0" i="0" u="none" strike="noStrike">
+                          <a:solidFill>
+                            <a:srgbClr val="000000"/>
+                          </a:solidFill>
+                          <a:effectLst/>
+                          <a:latin typeface="Calibri" panose="020F0502020204030204" pitchFamily="34" charset="0"/>
+                        </a:rPr>
+                        <a:t>223</a:t>
                       </a:r>
                     </a:p>
                   </a:txBody>
@@ -5126,14 +5126,14 @@
                     <a:p>
                       <a:pPr algn="r" fontAlgn="b"/>
                       <a:r>
-                        <a:rPr lang="en-MY" sz="800" b="0" i="0" u="none" strike="noStrike">
-                          <a:solidFill>
-                            <a:srgbClr val="000000"/>
-                          </a:solidFill>
-                          <a:effectLst/>
-                          <a:latin typeface="Calibri" panose="020F0502020204030204" pitchFamily="34" charset="0"/>
-                        </a:rPr>
-                        <a:t>-1261000</a:t>
+                        <a:rPr lang="en-MY" sz="900" b="0" i="0" u="none" strike="noStrike">
+                          <a:solidFill>
+                            <a:srgbClr val="000000"/>
+                          </a:solidFill>
+                          <a:effectLst/>
+                          <a:latin typeface="Calibri" panose="020F0502020204030204" pitchFamily="34" charset="0"/>
+                        </a:rPr>
+                        <a:t>-1174000</a:t>
                       </a:r>
                     </a:p>
                   </a:txBody>
@@ -5247,14 +5247,14 @@
                     <a:p>
                       <a:pPr algn="l" fontAlgn="b"/>
                       <a:r>
-                        <a:rPr lang="en-MY" sz="800" b="0" i="0" u="none" strike="noStrike">
-                          <a:solidFill>
-                            <a:srgbClr val="000000"/>
-                          </a:solidFill>
-                          <a:effectLst/>
-                          <a:latin typeface="Calibri" panose="020F0502020204030204" pitchFamily="34" charset="0"/>
-                        </a:rPr>
-                        <a:t>LightGBMGridSearch</a:t>
+                        <a:rPr lang="en-MY" sz="900" b="0" i="0" u="none" strike="noStrike">
+                          <a:solidFill>
+                            <a:srgbClr val="000000"/>
+                          </a:solidFill>
+                          <a:effectLst/>
+                          <a:latin typeface="Calibri" panose="020F0502020204030204" pitchFamily="34" charset="0"/>
+                        </a:rPr>
+                        <a:t>XGBoost</a:t>
                       </a:r>
                     </a:p>
                   </a:txBody>
@@ -5304,14 +5304,14 @@
                     <a:p>
                       <a:pPr algn="r" fontAlgn="b"/>
                       <a:r>
-                        <a:rPr lang="en-MY" sz="800" b="0" i="0" u="none" strike="noStrike">
-                          <a:solidFill>
-                            <a:srgbClr val="000000"/>
-                          </a:solidFill>
-                          <a:effectLst/>
-                          <a:latin typeface="Calibri" panose="020F0502020204030204" pitchFamily="34" charset="0"/>
-                        </a:rPr>
-                        <a:t>0.999957</a:t>
+                        <a:rPr lang="en-MY" sz="900" b="0" i="0" u="none" strike="noStrike">
+                          <a:solidFill>
+                            <a:srgbClr val="000000"/>
+                          </a:solidFill>
+                          <a:effectLst/>
+                          <a:latin typeface="Calibri" panose="020F0502020204030204" pitchFamily="34" charset="0"/>
+                        </a:rPr>
+                        <a:t>0.988688</a:t>
                       </a:r>
                     </a:p>
                   </a:txBody>
@@ -5361,14 +5361,14 @@
                     <a:p>
                       <a:pPr algn="r" fontAlgn="b"/>
                       <a:r>
-                        <a:rPr lang="en-MY" sz="800" b="0" i="0" u="none" strike="noStrike">
-                          <a:solidFill>
-                            <a:srgbClr val="000000"/>
-                          </a:solidFill>
-                          <a:effectLst/>
-                          <a:latin typeface="Calibri" panose="020F0502020204030204" pitchFamily="34" charset="0"/>
-                        </a:rPr>
-                        <a:t>0.893866</a:t>
+                        <a:rPr lang="en-MY" sz="900" b="0" i="0" u="none" strike="noStrike">
+                          <a:solidFill>
+                            <a:srgbClr val="000000"/>
+                          </a:solidFill>
+                          <a:effectLst/>
+                          <a:latin typeface="Calibri" panose="020F0502020204030204" pitchFamily="34" charset="0"/>
+                        </a:rPr>
+                        <a:t>0.89644</a:t>
                       </a:r>
                     </a:p>
                   </a:txBody>
@@ -5418,14 +5418,14 @@
                     <a:p>
                       <a:pPr algn="r" fontAlgn="b"/>
                       <a:r>
-                        <a:rPr lang="en-MY" sz="800" b="0" i="0" u="none" strike="noStrike">
-                          <a:solidFill>
-                            <a:srgbClr val="000000"/>
-                          </a:solidFill>
-                          <a:effectLst/>
-                          <a:latin typeface="Calibri" panose="020F0502020204030204" pitchFamily="34" charset="0"/>
-                        </a:rPr>
-                        <a:t>0.999957</a:t>
+                        <a:rPr lang="en-MY" sz="900" b="0" i="0" u="none" strike="noStrike">
+                          <a:solidFill>
+                            <a:srgbClr val="000000"/>
+                          </a:solidFill>
+                          <a:effectLst/>
+                          <a:latin typeface="Calibri" panose="020F0502020204030204" pitchFamily="34" charset="0"/>
+                        </a:rPr>
+                        <a:t>0.988688</a:t>
                       </a:r>
                     </a:p>
                   </a:txBody>
@@ -5475,14 +5475,14 @@
                     <a:p>
                       <a:pPr algn="r" fontAlgn="b"/>
                       <a:r>
-                        <a:rPr lang="en-MY" sz="800" b="0" i="0" u="none" strike="noStrike">
-                          <a:solidFill>
-                            <a:srgbClr val="000000"/>
-                          </a:solidFill>
-                          <a:effectLst/>
-                          <a:latin typeface="Calibri" panose="020F0502020204030204" pitchFamily="34" charset="0"/>
-                        </a:rPr>
-                        <a:t>0.961868</a:t>
+                        <a:rPr lang="en-MY" sz="900" b="0" i="0" u="none" strike="noStrike">
+                          <a:solidFill>
+                            <a:srgbClr val="000000"/>
+                          </a:solidFill>
+                          <a:effectLst/>
+                          <a:latin typeface="Calibri" panose="020F0502020204030204" pitchFamily="34" charset="0"/>
+                        </a:rPr>
+                        <a:t>0.963457</a:t>
                       </a:r>
                     </a:p>
                   </a:txBody>
@@ -5532,14 +5532,14 @@
                     <a:p>
                       <a:pPr algn="r" fontAlgn="b"/>
                       <a:r>
-                        <a:rPr lang="en-MY" sz="800" b="0" i="0" u="none" strike="noStrike">
-                          <a:solidFill>
-                            <a:srgbClr val="000000"/>
-                          </a:solidFill>
-                          <a:effectLst/>
-                          <a:latin typeface="Calibri" panose="020F0502020204030204" pitchFamily="34" charset="0"/>
-                        </a:rPr>
-                        <a:t>0.999914</a:t>
+                        <a:rPr lang="en-MY" sz="900" b="0" i="0" u="none" strike="noStrike">
+                          <a:solidFill>
+                            <a:srgbClr val="000000"/>
+                          </a:solidFill>
+                          <a:effectLst/>
+                          <a:latin typeface="Calibri" panose="020F0502020204030204" pitchFamily="34" charset="0"/>
+                        </a:rPr>
+                        <a:t>0.9774</a:t>
                       </a:r>
                     </a:p>
                   </a:txBody>
@@ -5589,14 +5589,14 @@
                     <a:p>
                       <a:pPr algn="r" fontAlgn="b"/>
                       <a:r>
-                        <a:rPr lang="en-MY" sz="800" b="0" i="0" u="none" strike="noStrike">
-                          <a:solidFill>
-                            <a:srgbClr val="000000"/>
-                          </a:solidFill>
-                          <a:effectLst/>
-                          <a:latin typeface="Calibri" panose="020F0502020204030204" pitchFamily="34" charset="0"/>
-                        </a:rPr>
-                        <a:t>0.762341</a:t>
+                        <a:rPr lang="en-MY" sz="900" b="0" i="0" u="none" strike="noStrike">
+                          <a:solidFill>
+                            <a:srgbClr val="000000"/>
+                          </a:solidFill>
+                          <a:effectLst/>
+                          <a:latin typeface="Calibri" panose="020F0502020204030204" pitchFamily="34" charset="0"/>
+                        </a:rPr>
+                        <a:t>0.770976</a:t>
                       </a:r>
                     </a:p>
                   </a:txBody>
@@ -5646,14 +5646,14 @@
                     <a:p>
                       <a:pPr algn="r" fontAlgn="b"/>
                       <a:r>
-                        <a:rPr lang="en-MY" sz="800" b="0" i="0" u="none" strike="noStrike">
-                          <a:solidFill>
-                            <a:srgbClr val="000000"/>
-                          </a:solidFill>
-                          <a:effectLst/>
-                          <a:latin typeface="Calibri" panose="020F0502020204030204" pitchFamily="34" charset="0"/>
-                        </a:rPr>
-                        <a:t>0.999957</a:t>
+                        <a:rPr lang="en-MY" sz="900" b="0" i="0" u="none" strike="noStrike">
+                          <a:solidFill>
+                            <a:srgbClr val="000000"/>
+                          </a:solidFill>
+                          <a:effectLst/>
+                          <a:latin typeface="Calibri" panose="020F0502020204030204" pitchFamily="34" charset="0"/>
+                        </a:rPr>
+                        <a:t>0.988649</a:t>
                       </a:r>
                     </a:p>
                   </a:txBody>
@@ -5703,14 +5703,14 @@
                     <a:p>
                       <a:pPr algn="r" fontAlgn="b"/>
                       <a:r>
-                        <a:rPr lang="en-MY" sz="800" b="0" i="0" u="none" strike="noStrike">
-                          <a:solidFill>
-                            <a:srgbClr val="000000"/>
-                          </a:solidFill>
-                          <a:effectLst/>
-                          <a:latin typeface="Calibri" panose="020F0502020204030204" pitchFamily="34" charset="0"/>
-                        </a:rPr>
-                        <a:t>0.782609</a:t>
+                        <a:rPr lang="en-MY" sz="900" b="0" i="0" u="none" strike="noStrike">
+                          <a:solidFill>
+                            <a:srgbClr val="000000"/>
+                          </a:solidFill>
+                          <a:effectLst/>
+                          <a:latin typeface="Calibri" panose="020F0502020204030204" pitchFamily="34" charset="0"/>
+                        </a:rPr>
+                        <a:t>0.790528</a:t>
                       </a:r>
                     </a:p>
                   </a:txBody>
@@ -5760,14 +5760,14 @@
                     <a:p>
                       <a:pPr algn="r" fontAlgn="b"/>
                       <a:r>
-                        <a:rPr lang="en-MY" sz="800" b="0" i="0" u="none" strike="noStrike">
-                          <a:solidFill>
-                            <a:srgbClr val="000000"/>
-                          </a:solidFill>
-                          <a:effectLst/>
-                          <a:latin typeface="Calibri" panose="020F0502020204030204" pitchFamily="34" charset="0"/>
-                        </a:rPr>
-                        <a:t>70</a:t>
+                        <a:rPr lang="en-MY" sz="900" b="0" i="0" u="none" strike="noStrike">
+                          <a:solidFill>
+                            <a:srgbClr val="000000"/>
+                          </a:solidFill>
+                          <a:effectLst/>
+                          <a:latin typeface="Calibri" panose="020F0502020204030204" pitchFamily="34" charset="0"/>
+                        </a:rPr>
+                        <a:t>66</a:t>
                       </a:r>
                     </a:p>
                   </a:txBody>
@@ -5817,14 +5817,14 @@
                     <a:p>
                       <a:pPr algn="r" fontAlgn="b"/>
                       <a:r>
-                        <a:rPr lang="en-MY" sz="800" b="0" i="0" u="none" strike="noStrike">
-                          <a:solidFill>
-                            <a:srgbClr val="000000"/>
-                          </a:solidFill>
-                          <a:effectLst/>
-                          <a:latin typeface="Calibri" panose="020F0502020204030204" pitchFamily="34" charset="0"/>
-                        </a:rPr>
-                        <a:t>50</a:t>
+                        <a:rPr lang="en-MY" sz="900" b="0" i="0" u="none" strike="noStrike">
+                          <a:solidFill>
+                            <a:srgbClr val="000000"/>
+                          </a:solidFill>
+                          <a:effectLst/>
+                          <a:latin typeface="Calibri" panose="020F0502020204030204" pitchFamily="34" charset="0"/>
+                        </a:rPr>
+                        <a:t>49</a:t>
                       </a:r>
                     </a:p>
                   </a:txBody>
@@ -5874,14 +5874,14 @@
                     <a:p>
                       <a:pPr algn="r" fontAlgn="b"/>
                       <a:r>
-                        <a:rPr lang="en-MY" sz="800" b="0" i="0" u="none" strike="noStrike">
-                          <a:solidFill>
-                            <a:srgbClr val="000000"/>
-                          </a:solidFill>
-                          <a:effectLst/>
-                          <a:latin typeface="Calibri" panose="020F0502020204030204" pitchFamily="34" charset="0"/>
-                        </a:rPr>
-                        <a:t>216</a:t>
+                        <a:rPr lang="en-MY" sz="900" b="0" i="0" u="none" strike="noStrike">
+                          <a:solidFill>
+                            <a:srgbClr val="000000"/>
+                          </a:solidFill>
+                          <a:effectLst/>
+                          <a:latin typeface="Calibri" panose="020F0502020204030204" pitchFamily="34" charset="0"/>
+                        </a:rPr>
+                        <a:t>217</a:t>
                       </a:r>
                     </a:p>
                   </a:txBody>
@@ -5931,14 +5931,14 @@
                     <a:p>
                       <a:pPr algn="r" fontAlgn="b"/>
                       <a:r>
-                        <a:rPr lang="en-MY" sz="800" b="0" i="0" u="none" strike="noStrike">
-                          <a:solidFill>
-                            <a:srgbClr val="000000"/>
-                          </a:solidFill>
-                          <a:effectLst/>
-                          <a:latin typeface="Calibri" panose="020F0502020204030204" pitchFamily="34" charset="0"/>
-                        </a:rPr>
-                        <a:t>-1286000</a:t>
+                        <a:rPr lang="en-MY" sz="900" b="0" i="0" u="none" strike="noStrike">
+                          <a:solidFill>
+                            <a:srgbClr val="000000"/>
+                          </a:solidFill>
+                          <a:effectLst/>
+                          <a:latin typeface="Calibri" panose="020F0502020204030204" pitchFamily="34" charset="0"/>
+                        </a:rPr>
+                        <a:t>-1263000</a:t>
                       </a:r>
                     </a:p>
                   </a:txBody>
@@ -6052,7 +6052,7 @@
                     <a:p>
                       <a:pPr algn="l" fontAlgn="b"/>
                       <a:r>
-                        <a:rPr lang="en-MY" sz="800" b="0" i="0" u="none" strike="noStrike">
+                        <a:rPr lang="en-MY" sz="900" b="0" i="0" u="none" strike="noStrike">
                           <a:solidFill>
                             <a:srgbClr val="000000"/>
                           </a:solidFill>
@@ -6109,14 +6109,14 @@
                     <a:p>
                       <a:pPr algn="r" fontAlgn="b"/>
                       <a:r>
-                        <a:rPr lang="en-MY" sz="800" b="0" i="0" u="none" strike="noStrike">
-                          <a:solidFill>
-                            <a:srgbClr val="000000"/>
-                          </a:solidFill>
-                          <a:effectLst/>
-                          <a:latin typeface="Calibri" panose="020F0502020204030204" pitchFamily="34" charset="0"/>
-                        </a:rPr>
-                        <a:t>0.944262</a:t>
+                        <a:rPr lang="en-MY" sz="900" b="0" i="0" u="none" strike="noStrike">
+                          <a:solidFill>
+                            <a:srgbClr val="000000"/>
+                          </a:solidFill>
+                          <a:effectLst/>
+                          <a:latin typeface="Calibri" panose="020F0502020204030204" pitchFamily="34" charset="0"/>
+                        </a:rPr>
+                        <a:t>0.96205</a:t>
                       </a:r>
                     </a:p>
                   </a:txBody>
@@ -6166,14 +6166,14 @@
                     <a:p>
                       <a:pPr algn="r" fontAlgn="b"/>
                       <a:r>
-                        <a:rPr lang="en-MY" sz="800" b="0" i="0" u="none" strike="noStrike">
-                          <a:solidFill>
-                            <a:srgbClr val="000000"/>
-                          </a:solidFill>
-                          <a:effectLst/>
-                          <a:latin typeface="Calibri" panose="020F0502020204030204" pitchFamily="34" charset="0"/>
-                        </a:rPr>
-                        <a:t>0.872693</a:t>
+                        <a:rPr lang="en-MY" sz="900" b="0" i="0" u="none" strike="noStrike">
+                          <a:solidFill>
+                            <a:srgbClr val="000000"/>
+                          </a:solidFill>
+                          <a:effectLst/>
+                          <a:latin typeface="Calibri" panose="020F0502020204030204" pitchFamily="34" charset="0"/>
+                        </a:rPr>
+                        <a:t>0.891002</a:t>
                       </a:r>
                     </a:p>
                   </a:txBody>
@@ -6223,14 +6223,14 @@
                     <a:p>
                       <a:pPr algn="r" fontAlgn="b"/>
                       <a:r>
-                        <a:rPr lang="en-MY" sz="800" b="0" i="0" u="none" strike="noStrike">
-                          <a:solidFill>
-                            <a:srgbClr val="000000"/>
-                          </a:solidFill>
-                          <a:effectLst/>
-                          <a:latin typeface="Calibri" panose="020F0502020204030204" pitchFamily="34" charset="0"/>
-                        </a:rPr>
-                        <a:t>0.944262</a:t>
+                        <a:rPr lang="en-MY" sz="900" b="0" i="0" u="none" strike="noStrike">
+                          <a:solidFill>
+                            <a:srgbClr val="000000"/>
+                          </a:solidFill>
+                          <a:effectLst/>
+                          <a:latin typeface="Calibri" panose="020F0502020204030204" pitchFamily="34" charset="0"/>
+                        </a:rPr>
+                        <a:t>0.96205</a:t>
                       </a:r>
                     </a:p>
                   </a:txBody>
@@ -6280,14 +6280,14 @@
                     <a:p>
                       <a:pPr algn="r" fontAlgn="b"/>
                       <a:r>
-                        <a:rPr lang="en-MY" sz="800" b="0" i="0" u="none" strike="noStrike">
-                          <a:solidFill>
-                            <a:srgbClr val="000000"/>
-                          </a:solidFill>
-                          <a:effectLst/>
-                          <a:latin typeface="Calibri" panose="020F0502020204030204" pitchFamily="34" charset="0"/>
-                        </a:rPr>
-                        <a:t>0.923101</a:t>
+                        <a:rPr lang="en-MY" sz="900" b="0" i="0" u="none" strike="noStrike">
+                          <a:solidFill>
+                            <a:srgbClr val="000000"/>
+                          </a:solidFill>
+                          <a:effectLst/>
+                          <a:latin typeface="Calibri" panose="020F0502020204030204" pitchFamily="34" charset="0"/>
+                        </a:rPr>
+                        <a:t>0.947251</a:t>
                       </a:r>
                     </a:p>
                   </a:txBody>
@@ -6337,14 +6337,14 @@
                     <a:p>
                       <a:pPr algn="r" fontAlgn="b"/>
                       <a:r>
-                        <a:rPr lang="en-MY" sz="800" b="0" i="0" u="none" strike="noStrike">
-                          <a:solidFill>
-                            <a:srgbClr val="000000"/>
-                          </a:solidFill>
-                          <a:effectLst/>
-                          <a:latin typeface="Calibri" panose="020F0502020204030204" pitchFamily="34" charset="0"/>
-                        </a:rPr>
-                        <a:t>0.888621</a:t>
+                        <a:rPr lang="en-MY" sz="900" b="0" i="0" u="none" strike="noStrike">
+                          <a:solidFill>
+                            <a:srgbClr val="000000"/>
+                          </a:solidFill>
+                          <a:effectLst/>
+                          <a:latin typeface="Calibri" panose="020F0502020204030204" pitchFamily="34" charset="0"/>
+                        </a:rPr>
+                        <a:t>0.924218</a:t>
                       </a:r>
                     </a:p>
                   </a:txBody>
@@ -6394,14 +6394,14 @@
                     <a:p>
                       <a:pPr algn="r" fontAlgn="b"/>
                       <a:r>
-                        <a:rPr lang="en-MY" sz="800" b="0" i="0" u="none" strike="noStrike">
-                          <a:solidFill>
-                            <a:srgbClr val="000000"/>
-                          </a:solidFill>
-                          <a:effectLst/>
-                          <a:latin typeface="Calibri" panose="020F0502020204030204" pitchFamily="34" charset="0"/>
-                        </a:rPr>
-                        <a:t>0.61726</a:t>
+                        <a:rPr lang="en-MY" sz="900" b="0" i="0" u="none" strike="noStrike">
+                          <a:solidFill>
+                            <a:srgbClr val="000000"/>
+                          </a:solidFill>
+                          <a:effectLst/>
+                          <a:latin typeface="Calibri" panose="020F0502020204030204" pitchFamily="34" charset="0"/>
+                        </a:rPr>
+                        <a:t>0.702565</a:t>
                       </a:r>
                     </a:p>
                   </a:txBody>
@@ -6451,14 +6451,14 @@
                     <a:p>
                       <a:pPr algn="r" fontAlgn="b"/>
                       <a:r>
-                        <a:rPr lang="en-MY" sz="800" b="0" i="0" u="none" strike="noStrike">
-                          <a:solidFill>
-                            <a:srgbClr val="000000"/>
-                          </a:solidFill>
-                          <a:effectLst/>
-                          <a:latin typeface="Calibri" panose="020F0502020204030204" pitchFamily="34" charset="0"/>
-                        </a:rPr>
-                        <a:t>0.943848</a:t>
+                        <a:rPr lang="en-MY" sz="900" b="0" i="0" u="none" strike="noStrike">
+                          <a:solidFill>
+                            <a:srgbClr val="000000"/>
+                          </a:solidFill>
+                          <a:effectLst/>
+                          <a:latin typeface="Calibri" panose="020F0502020204030204" pitchFamily="34" charset="0"/>
+                        </a:rPr>
+                        <a:t>0.961744</a:t>
                       </a:r>
                     </a:p>
                   </a:txBody>
@@ -6508,14 +6508,14 @@
                     <a:p>
                       <a:pPr algn="r" fontAlgn="b"/>
                       <a:r>
-                        <a:rPr lang="en-MY" sz="800" b="0" i="0" u="none" strike="noStrike">
-                          <a:solidFill>
-                            <a:srgbClr val="000000"/>
-                          </a:solidFill>
-                          <a:effectLst/>
-                          <a:latin typeface="Calibri" panose="020F0502020204030204" pitchFamily="34" charset="0"/>
-                        </a:rPr>
-                        <a:t>0.64095</a:t>
+                        <a:rPr lang="en-MY" sz="900" b="0" i="0" u="none" strike="noStrike">
+                          <a:solidFill>
+                            <a:srgbClr val="000000"/>
+                          </a:solidFill>
+                          <a:effectLst/>
+                          <a:latin typeface="Calibri" panose="020F0502020204030204" pitchFamily="34" charset="0"/>
+                        </a:rPr>
+                        <a:t>0.725166</a:t>
                       </a:r>
                     </a:p>
                   </a:txBody>
@@ -6565,14 +6565,14 @@
                     <a:p>
                       <a:pPr algn="r" fontAlgn="b"/>
                       <a:r>
-                        <a:rPr lang="en-MY" sz="800" b="0" i="0" u="none" strike="noStrike">
-                          <a:solidFill>
-                            <a:srgbClr val="000000"/>
-                          </a:solidFill>
-                          <a:effectLst/>
-                          <a:latin typeface="Calibri" panose="020F0502020204030204" pitchFamily="34" charset="0"/>
-                        </a:rPr>
-                        <a:t>192</a:t>
+                        <a:rPr lang="en-MY" sz="900" b="0" i="0" u="none" strike="noStrike">
+                          <a:solidFill>
+                            <a:srgbClr val="000000"/>
+                          </a:solidFill>
+                          <a:effectLst/>
+                          <a:latin typeface="Calibri" panose="020F0502020204030204" pitchFamily="34" charset="0"/>
+                        </a:rPr>
+                        <a:t>119</a:t>
                       </a:r>
                     </a:p>
                   </a:txBody>
@@ -6622,14 +6622,14 @@
                     <a:p>
                       <a:pPr algn="r" fontAlgn="b"/>
                       <a:r>
-                        <a:rPr lang="en-MY" sz="800" b="0" i="0" u="none" strike="noStrike">
-                          <a:solidFill>
-                            <a:srgbClr val="000000"/>
-                          </a:solidFill>
-                          <a:effectLst/>
-                          <a:latin typeface="Calibri" panose="020F0502020204030204" pitchFamily="34" charset="0"/>
-                        </a:rPr>
-                        <a:t>50</a:t>
+                        <a:rPr lang="en-MY" sz="900" b="0" i="0" u="none" strike="noStrike">
+                          <a:solidFill>
+                            <a:srgbClr val="000000"/>
+                          </a:solidFill>
+                          <a:effectLst/>
+                          <a:latin typeface="Calibri" panose="020F0502020204030204" pitchFamily="34" charset="0"/>
+                        </a:rPr>
+                        <a:t>47</a:t>
                       </a:r>
                     </a:p>
                   </a:txBody>
@@ -6679,14 +6679,14 @@
                     <a:p>
                       <a:pPr algn="r" fontAlgn="b"/>
                       <a:r>
-                        <a:rPr lang="en-MY" sz="800" b="0" i="0" u="none" strike="noStrike">
-                          <a:solidFill>
-                            <a:srgbClr val="000000"/>
-                          </a:solidFill>
-                          <a:effectLst/>
-                          <a:latin typeface="Calibri" panose="020F0502020204030204" pitchFamily="34" charset="0"/>
-                        </a:rPr>
-                        <a:t>216</a:t>
+                        <a:rPr lang="en-MY" sz="900" b="0" i="0" u="none" strike="noStrike">
+                          <a:solidFill>
+                            <a:srgbClr val="000000"/>
+                          </a:solidFill>
+                          <a:effectLst/>
+                          <a:latin typeface="Calibri" panose="020F0502020204030204" pitchFamily="34" charset="0"/>
+                        </a:rPr>
+                        <a:t>219</a:t>
                       </a:r>
                     </a:p>
                   </a:txBody>
@@ -6736,14 +6736,14 @@
                     <a:p>
                       <a:pPr algn="r" fontAlgn="b"/>
                       <a:r>
-                        <a:rPr lang="en-MY" sz="800" b="0" i="0" u="none" strike="noStrike">
-                          <a:solidFill>
-                            <a:srgbClr val="000000"/>
-                          </a:solidFill>
-                          <a:effectLst/>
-                          <a:latin typeface="Calibri" panose="020F0502020204030204" pitchFamily="34" charset="0"/>
-                        </a:rPr>
-                        <a:t>-1408000</a:t>
+                        <a:rPr lang="en-MY" sz="900" b="0" i="0" u="none" strike="noStrike">
+                          <a:solidFill>
+                            <a:srgbClr val="000000"/>
+                          </a:solidFill>
+                          <a:effectLst/>
+                          <a:latin typeface="Calibri" panose="020F0502020204030204" pitchFamily="34" charset="0"/>
+                        </a:rPr>
+                        <a:t>-1278000</a:t>
                       </a:r>
                     </a:p>
                   </a:txBody>
@@ -6857,14 +6857,14 @@
                     <a:p>
                       <a:pPr algn="l" fontAlgn="b"/>
                       <a:r>
-                        <a:rPr lang="en-MY" sz="800" b="0" i="0" u="none" strike="noStrike">
-                          <a:solidFill>
-                            <a:srgbClr val="000000"/>
-                          </a:solidFill>
-                          <a:effectLst/>
-                          <a:latin typeface="Calibri" panose="020F0502020204030204" pitchFamily="34" charset="0"/>
-                        </a:rPr>
-                        <a:t>XGBoost</a:t>
+                        <a:rPr lang="en-MY" sz="900" b="0" i="0" u="none" strike="noStrike">
+                          <a:solidFill>
+                            <a:srgbClr val="000000"/>
+                          </a:solidFill>
+                          <a:effectLst/>
+                          <a:latin typeface="Calibri" panose="020F0502020204030204" pitchFamily="34" charset="0"/>
+                        </a:rPr>
+                        <a:t>LightGBMGridSearch</a:t>
                       </a:r>
                     </a:p>
                   </a:txBody>
@@ -6914,14 +6914,14 @@
                     <a:p>
                       <a:pPr algn="r" fontAlgn="b"/>
                       <a:r>
-                        <a:rPr lang="en-MY" sz="800" b="0" i="0" u="none" strike="noStrike">
-                          <a:solidFill>
-                            <a:srgbClr val="000000"/>
-                          </a:solidFill>
-                          <a:effectLst/>
-                          <a:latin typeface="Calibri" panose="020F0502020204030204" pitchFamily="34" charset="0"/>
-                        </a:rPr>
-                        <a:t>0.980701</a:t>
+                        <a:rPr lang="en-MY" sz="900" b="0" i="0" u="none" strike="noStrike">
+                          <a:solidFill>
+                            <a:srgbClr val="000000"/>
+                          </a:solidFill>
+                          <a:effectLst/>
+                          <a:latin typeface="Calibri" panose="020F0502020204030204" pitchFamily="34" charset="0"/>
+                        </a:rPr>
+                        <a:t>0.999914</a:t>
                       </a:r>
                     </a:p>
                   </a:txBody>
@@ -6971,14 +6971,14 @@
                     <a:p>
                       <a:pPr algn="r" fontAlgn="b"/>
                       <a:r>
-                        <a:rPr lang="en-MY" sz="800" b="0" i="0" u="none" strike="noStrike">
-                          <a:solidFill>
-                            <a:srgbClr val="000000"/>
-                          </a:solidFill>
-                          <a:effectLst/>
-                          <a:latin typeface="Calibri" panose="020F0502020204030204" pitchFamily="34" charset="0"/>
-                        </a:rPr>
-                        <a:t>0.874228</a:t>
+                        <a:rPr lang="en-MY" sz="900" b="0" i="0" u="none" strike="noStrike">
+                          <a:solidFill>
+                            <a:srgbClr val="000000"/>
+                          </a:solidFill>
+                          <a:effectLst/>
+                          <a:latin typeface="Calibri" panose="020F0502020204030204" pitchFamily="34" charset="0"/>
+                        </a:rPr>
+                        <a:t>0.892537</a:t>
                       </a:r>
                     </a:p>
                   </a:txBody>
@@ -7028,14 +7028,14 @@
                     <a:p>
                       <a:pPr algn="r" fontAlgn="b"/>
                       <a:r>
-                        <a:rPr lang="en-MY" sz="800" b="0" i="0" u="none" strike="noStrike">
-                          <a:solidFill>
-                            <a:srgbClr val="000000"/>
-                          </a:solidFill>
-                          <a:effectLst/>
-                          <a:latin typeface="Calibri" panose="020F0502020204030204" pitchFamily="34" charset="0"/>
-                        </a:rPr>
-                        <a:t>0.980701</a:t>
+                        <a:rPr lang="en-MY" sz="900" b="0" i="0" u="none" strike="noStrike">
+                          <a:solidFill>
+                            <a:srgbClr val="000000"/>
+                          </a:solidFill>
+                          <a:effectLst/>
+                          <a:latin typeface="Calibri" panose="020F0502020204030204" pitchFamily="34" charset="0"/>
+                        </a:rPr>
+                        <a:t>0.999914</a:t>
                       </a:r>
                     </a:p>
                   </a:txBody>
@@ -7085,14 +7085,14 @@
                     <a:p>
                       <a:pPr algn="r" fontAlgn="b"/>
                       <a:r>
-                        <a:rPr lang="en-MY" sz="800" b="0" i="0" u="none" strike="noStrike">
-                          <a:solidFill>
-                            <a:srgbClr val="000000"/>
-                          </a:solidFill>
-                          <a:effectLst/>
-                          <a:latin typeface="Calibri" panose="020F0502020204030204" pitchFamily="34" charset="0"/>
-                        </a:rPr>
-                        <a:t>0.941532</a:t>
+                        <a:rPr lang="en-MY" sz="900" b="0" i="0" u="none" strike="noStrike">
+                          <a:solidFill>
+                            <a:srgbClr val="000000"/>
+                          </a:solidFill>
+                          <a:effectLst/>
+                          <a:latin typeface="Calibri" panose="020F0502020204030204" pitchFamily="34" charset="0"/>
+                        </a:rPr>
+                        <a:t>0.965682</a:t>
                       </a:r>
                     </a:p>
                   </a:txBody>
@@ -7142,14 +7142,14 @@
                     <a:p>
                       <a:pPr algn="r" fontAlgn="b"/>
                       <a:r>
-                        <a:rPr lang="en-MY" sz="800" b="0" i="0" u="none" strike="noStrike">
-                          <a:solidFill>
-                            <a:srgbClr val="000000"/>
-                          </a:solidFill>
-                          <a:effectLst/>
-                          <a:latin typeface="Calibri" panose="020F0502020204030204" pitchFamily="34" charset="0"/>
-                        </a:rPr>
-                        <a:t>0.961405</a:t>
+                        <a:rPr lang="en-MY" sz="900" b="0" i="0" u="none" strike="noStrike">
+                          <a:solidFill>
+                            <a:srgbClr val="000000"/>
+                          </a:solidFill>
+                          <a:effectLst/>
+                          <a:latin typeface="Calibri" panose="020F0502020204030204" pitchFamily="34" charset="0"/>
+                        </a:rPr>
+                        <a:t>0.999827</a:t>
                       </a:r>
                     </a:p>
                   </a:txBody>
@@ -7199,14 +7199,14 @@
                     <a:p>
                       <a:pPr algn="r" fontAlgn="b"/>
                       <a:r>
-                        <a:rPr lang="en-MY" sz="800" b="0" i="0" u="none" strike="noStrike">
-                          <a:solidFill>
-                            <a:srgbClr val="000000"/>
-                          </a:solidFill>
-                          <a:effectLst/>
-                          <a:latin typeface="Calibri" panose="020F0502020204030204" pitchFamily="34" charset="0"/>
-                        </a:rPr>
-                        <a:t>0.670685</a:t>
+                        <a:rPr lang="en-MY" sz="900" b="0" i="0" u="none" strike="noStrike">
+                          <a:solidFill>
+                            <a:srgbClr val="000000"/>
+                          </a:solidFill>
+                          <a:effectLst/>
+                          <a:latin typeface="Calibri" panose="020F0502020204030204" pitchFamily="34" charset="0"/>
+                        </a:rPr>
+                        <a:t>0.779778</a:t>
                       </a:r>
                     </a:p>
                   </a:txBody>
@@ -7256,14 +7256,14 @@
                     <a:p>
                       <a:pPr algn="r" fontAlgn="b"/>
                       <a:r>
-                        <a:rPr lang="en-MY" sz="800" b="0" i="0" u="none" strike="noStrike">
-                          <a:solidFill>
-                            <a:srgbClr val="000000"/>
-                          </a:solidFill>
-                          <a:effectLst/>
-                          <a:latin typeface="Calibri" panose="020F0502020204030204" pitchFamily="34" charset="0"/>
-                        </a:rPr>
-                        <a:t>0.980724</a:t>
+                        <a:rPr lang="en-MY" sz="900" b="0" i="0" u="none" strike="noStrike">
+                          <a:solidFill>
+                            <a:srgbClr val="000000"/>
+                          </a:solidFill>
+                          <a:effectLst/>
+                          <a:latin typeface="Calibri" panose="020F0502020204030204" pitchFamily="34" charset="0"/>
+                        </a:rPr>
+                        <a:t>0.999914</a:t>
                       </a:r>
                     </a:p>
                   </a:txBody>
@@ -7313,14 +7313,14 @@
                     <a:p>
                       <a:pPr algn="r" fontAlgn="b"/>
                       <a:r>
-                        <a:rPr lang="en-MY" sz="800" b="0" i="0" u="none" strike="noStrike">
-                          <a:solidFill>
-                            <a:srgbClr val="000000"/>
-                          </a:solidFill>
-                          <a:effectLst/>
-                          <a:latin typeface="Calibri" panose="020F0502020204030204" pitchFamily="34" charset="0"/>
-                        </a:rPr>
-                        <a:t>0.69637</a:t>
+                        <a:rPr lang="en-MY" sz="900" b="0" i="0" u="none" strike="noStrike">
+                          <a:solidFill>
+                            <a:srgbClr val="000000"/>
+                          </a:solidFill>
+                          <a:effectLst/>
+                          <a:latin typeface="Calibri" panose="020F0502020204030204" pitchFamily="34" charset="0"/>
+                        </a:rPr>
+                        <a:t>0.798507</a:t>
                       </a:r>
                     </a:p>
                   </a:txBody>
@@ -7370,14 +7370,14 @@
                     <a:p>
                       <a:pPr algn="r" fontAlgn="b"/>
                       <a:r>
-                        <a:rPr lang="en-MY" sz="800" b="0" i="0" u="none" strike="noStrike">
-                          <a:solidFill>
-                            <a:srgbClr val="000000"/>
-                          </a:solidFill>
-                          <a:effectLst/>
-                          <a:latin typeface="Calibri" panose="020F0502020204030204" pitchFamily="34" charset="0"/>
-                        </a:rPr>
-                        <a:t>129</a:t>
+                        <a:rPr lang="en-MY" sz="900" b="0" i="0" u="none" strike="noStrike">
+                          <a:solidFill>
+                            <a:srgbClr val="000000"/>
+                          </a:solidFill>
+                          <a:effectLst/>
+                          <a:latin typeface="Calibri" panose="020F0502020204030204" pitchFamily="34" charset="0"/>
+                        </a:rPr>
+                        <a:t>56</a:t>
                       </a:r>
                     </a:p>
                   </a:txBody>
@@ -7427,14 +7427,14 @@
                     <a:p>
                       <a:pPr algn="r" fontAlgn="b"/>
                       <a:r>
-                        <a:rPr lang="en-MY" sz="800" b="0" i="0" u="none" strike="noStrike">
-                          <a:solidFill>
-                            <a:srgbClr val="000000"/>
-                          </a:solidFill>
-                          <a:effectLst/>
-                          <a:latin typeface="Calibri" panose="020F0502020204030204" pitchFamily="34" charset="0"/>
-                        </a:rPr>
-                        <a:t>55</a:t>
+                        <a:rPr lang="en-MY" sz="900" b="0" i="0" u="none" strike="noStrike">
+                          <a:solidFill>
+                            <a:srgbClr val="000000"/>
+                          </a:solidFill>
+                          <a:effectLst/>
+                          <a:latin typeface="Calibri" panose="020F0502020204030204" pitchFamily="34" charset="0"/>
+                        </a:rPr>
+                        <a:t>52</a:t>
                       </a:r>
                     </a:p>
                   </a:txBody>
@@ -7484,14 +7484,14 @@
                     <a:p>
                       <a:pPr algn="r" fontAlgn="b"/>
                       <a:r>
-                        <a:rPr lang="en-MY" sz="800" b="0" i="0" u="none" strike="noStrike">
-                          <a:solidFill>
-                            <a:srgbClr val="000000"/>
-                          </a:solidFill>
-                          <a:effectLst/>
-                          <a:latin typeface="Calibri" panose="020F0502020204030204" pitchFamily="34" charset="0"/>
-                        </a:rPr>
-                        <a:t>211</a:t>
+                        <a:rPr lang="en-MY" sz="900" b="0" i="0" u="none" strike="noStrike">
+                          <a:solidFill>
+                            <a:srgbClr val="000000"/>
+                          </a:solidFill>
+                          <a:effectLst/>
+                          <a:latin typeface="Calibri" panose="020F0502020204030204" pitchFamily="34" charset="0"/>
+                        </a:rPr>
+                        <a:t>214</a:t>
                       </a:r>
                     </a:p>
                   </a:txBody>
@@ -7541,14 +7541,14 @@
                     <a:p>
                       <a:pPr algn="r" fontAlgn="b"/>
                       <a:r>
-                        <a:rPr lang="en-MY" sz="800" b="0" i="0" u="none" strike="noStrike">
-                          <a:solidFill>
-                            <a:srgbClr val="000000"/>
-                          </a:solidFill>
-                          <a:effectLst/>
-                          <a:latin typeface="Calibri" panose="020F0502020204030204" pitchFamily="34" charset="0"/>
-                        </a:rPr>
-                        <a:t>-1440000</a:t>
+                        <a:rPr lang="en-MY" sz="900" b="0" i="0" u="none" strike="noStrike">
+                          <a:solidFill>
+                            <a:srgbClr val="000000"/>
+                          </a:solidFill>
+                          <a:effectLst/>
+                          <a:latin typeface="Calibri" panose="020F0502020204030204" pitchFamily="34" charset="0"/>
+                        </a:rPr>
+                        <a:t>-1310000</a:t>
                       </a:r>
                     </a:p>
                   </a:txBody>
@@ -7662,14 +7662,14 @@
                     <a:p>
                       <a:pPr algn="l" fontAlgn="b"/>
                       <a:r>
-                        <a:rPr lang="en-MY" sz="800" b="0" i="0" u="none" strike="noStrike">
-                          <a:solidFill>
-                            <a:srgbClr val="000000"/>
-                          </a:solidFill>
-                          <a:effectLst/>
-                          <a:latin typeface="Calibri" panose="020F0502020204030204" pitchFamily="34" charset="0"/>
-                        </a:rPr>
-                        <a:t>LightGBMGridSearchPolyNomial</a:t>
+                        <a:rPr lang="en-MY" sz="900" b="0" i="0" u="none" strike="noStrike">
+                          <a:solidFill>
+                            <a:srgbClr val="000000"/>
+                          </a:solidFill>
+                          <a:effectLst/>
+                          <a:latin typeface="Calibri" panose="020F0502020204030204" pitchFamily="34" charset="0"/>
+                        </a:rPr>
+                        <a:t>RandomForestGridSearch</a:t>
                       </a:r>
                     </a:p>
                   </a:txBody>
@@ -7719,14 +7719,14 @@
                     <a:p>
                       <a:pPr algn="r" fontAlgn="b"/>
                       <a:r>
-                        <a:rPr lang="en-MY" sz="800" b="0" i="0" u="none" strike="noStrike">
-                          <a:solidFill>
-                            <a:srgbClr val="000000"/>
-                          </a:solidFill>
-                          <a:effectLst/>
-                          <a:latin typeface="Calibri" panose="020F0502020204030204" pitchFamily="34" charset="0"/>
-                        </a:rPr>
-                        <a:t>1</a:t>
+                        <a:rPr lang="en-MY" sz="900" b="0" i="0" u="none" strike="noStrike">
+                          <a:solidFill>
+                            <a:srgbClr val="000000"/>
+                          </a:solidFill>
+                          <a:effectLst/>
+                          <a:latin typeface="Calibri" panose="020F0502020204030204" pitchFamily="34" charset="0"/>
+                        </a:rPr>
+                        <a:t>0.90139</a:t>
                       </a:r>
                     </a:p>
                   </a:txBody>
@@ -7776,14 +7776,14 @@
                     <a:p>
                       <a:pPr algn="r" fontAlgn="b"/>
                       <a:r>
-                        <a:rPr lang="en-MY" sz="800" b="0" i="0" u="none" strike="noStrike">
-                          <a:solidFill>
-                            <a:srgbClr val="000000"/>
-                          </a:solidFill>
-                          <a:effectLst/>
-                          <a:latin typeface="Calibri" panose="020F0502020204030204" pitchFamily="34" charset="0"/>
-                        </a:rPr>
-                        <a:t>0.873566</a:t>
+                        <a:rPr lang="en-MY" sz="900" b="0" i="0" u="none" strike="noStrike">
+                          <a:solidFill>
+                            <a:srgbClr val="000000"/>
+                          </a:solidFill>
+                          <a:effectLst/>
+                          <a:latin typeface="Calibri" panose="020F0502020204030204" pitchFamily="34" charset="0"/>
+                        </a:rPr>
+                        <a:t>0.862974</a:t>
                       </a:r>
                     </a:p>
                   </a:txBody>
@@ -7833,14 +7833,14 @@
                     <a:p>
                       <a:pPr algn="r" fontAlgn="b"/>
                       <a:r>
-                        <a:rPr lang="en-MY" sz="800" b="0" i="0" u="none" strike="noStrike">
-                          <a:solidFill>
-                            <a:srgbClr val="000000"/>
-                          </a:solidFill>
-                          <a:effectLst/>
-                          <a:latin typeface="Calibri" panose="020F0502020204030204" pitchFamily="34" charset="0"/>
-                        </a:rPr>
-                        <a:t>1</a:t>
+                        <a:rPr lang="en-MY" sz="900" b="0" i="0" u="none" strike="noStrike">
+                          <a:solidFill>
+                            <a:srgbClr val="000000"/>
+                          </a:solidFill>
+                          <a:effectLst/>
+                          <a:latin typeface="Calibri" panose="020F0502020204030204" pitchFamily="34" charset="0"/>
+                        </a:rPr>
+                        <a:t>0.90139</a:t>
                       </a:r>
                     </a:p>
                   </a:txBody>
@@ -7890,14 +7890,14 @@
                     <a:p>
                       <a:pPr algn="r" fontAlgn="b"/>
                       <a:r>
-                        <a:rPr lang="en-MY" sz="800" b="0" i="0" u="none" strike="noStrike">
-                          <a:solidFill>
-                            <a:srgbClr val="000000"/>
-                          </a:solidFill>
-                          <a:effectLst/>
-                          <a:latin typeface="Calibri" panose="020F0502020204030204" pitchFamily="34" charset="0"/>
-                        </a:rPr>
-                        <a:t>0.962186</a:t>
+                        <a:rPr lang="en-MY" sz="900" b="0" i="0" u="none" strike="noStrike">
+                          <a:solidFill>
+                            <a:srgbClr val="000000"/>
+                          </a:solidFill>
+                          <a:effectLst/>
+                          <a:latin typeface="Calibri" panose="020F0502020204030204" pitchFamily="34" charset="0"/>
+                        </a:rPr>
+                        <a:t>0.905307</a:t>
                       </a:r>
                     </a:p>
                   </a:txBody>
@@ -7947,14 +7947,14 @@
                     <a:p>
                       <a:pPr algn="r" fontAlgn="b"/>
                       <a:r>
-                        <a:rPr lang="en-MY" sz="800" b="0" i="0" u="none" strike="noStrike">
-                          <a:solidFill>
-                            <a:srgbClr val="000000"/>
-                          </a:solidFill>
-                          <a:effectLst/>
-                          <a:latin typeface="Calibri" panose="020F0502020204030204" pitchFamily="34" charset="0"/>
-                        </a:rPr>
-                        <a:t>1</a:t>
+                        <a:rPr lang="en-MY" sz="900" b="0" i="0" u="none" strike="noStrike">
+                          <a:solidFill>
+                            <a:srgbClr val="000000"/>
+                          </a:solidFill>
+                          <a:effectLst/>
+                          <a:latin typeface="Calibri" panose="020F0502020204030204" pitchFamily="34" charset="0"/>
+                        </a:rPr>
+                        <a:t>0.803661</a:t>
                       </a:r>
                     </a:p>
                   </a:txBody>
@@ -8004,14 +8004,14 @@
                     <a:p>
                       <a:pPr algn="r" fontAlgn="b"/>
                       <a:r>
-                        <a:rPr lang="en-MY" sz="800" b="0" i="0" u="none" strike="noStrike">
-                          <a:solidFill>
-                            <a:srgbClr val="000000"/>
-                          </a:solidFill>
-                          <a:effectLst/>
-                          <a:latin typeface="Calibri" panose="020F0502020204030204" pitchFamily="34" charset="0"/>
-                        </a:rPr>
-                        <a:t>0.753601</a:t>
+                        <a:rPr lang="en-MY" sz="900" b="0" i="0" u="none" strike="noStrike">
+                          <a:solidFill>
+                            <a:srgbClr val="000000"/>
+                          </a:solidFill>
+                          <a:effectLst/>
+                          <a:latin typeface="Calibri" panose="020F0502020204030204" pitchFamily="34" charset="0"/>
+                        </a:rPr>
+                        <a:t>0.569573</a:t>
                       </a:r>
                     </a:p>
                   </a:txBody>
@@ -8061,14 +8061,14 @@
                     <a:p>
                       <a:pPr algn="r" fontAlgn="b"/>
                       <a:r>
-                        <a:rPr lang="en-MY" sz="800" b="0" i="0" u="none" strike="noStrike">
-                          <a:solidFill>
-                            <a:srgbClr val="000000"/>
-                          </a:solidFill>
-                          <a:effectLst/>
-                          <a:latin typeface="Calibri" panose="020F0502020204030204" pitchFamily="34" charset="0"/>
-                        </a:rPr>
-                        <a:t>1</a:t>
+                        <a:rPr lang="en-MY" sz="900" b="0" i="0" u="none" strike="noStrike">
+                          <a:solidFill>
+                            <a:srgbClr val="000000"/>
+                          </a:solidFill>
+                          <a:effectLst/>
+                          <a:latin typeface="Calibri" panose="020F0502020204030204" pitchFamily="34" charset="0"/>
+                        </a:rPr>
+                        <a:t>0.899027</a:t>
                       </a:r>
                     </a:p>
                   </a:txBody>
@@ -8118,14 +8118,14 @@
                     <a:p>
                       <a:pPr algn="r" fontAlgn="b"/>
                       <a:r>
-                        <a:rPr lang="en-MY" sz="800" b="0" i="0" u="none" strike="noStrike">
-                          <a:solidFill>
-                            <a:srgbClr val="000000"/>
-                          </a:solidFill>
-                          <a:effectLst/>
-                          <a:latin typeface="Calibri" panose="020F0502020204030204" pitchFamily="34" charset="0"/>
-                        </a:rPr>
-                        <a:t>0.774194</a:t>
+                        <a:rPr lang="en-MY" sz="900" b="0" i="0" u="none" strike="noStrike">
+                          <a:solidFill>
+                            <a:srgbClr val="000000"/>
+                          </a:solidFill>
+                          <a:effectLst/>
+                          <a:latin typeface="Calibri" panose="020F0502020204030204" pitchFamily="34" charset="0"/>
+                        </a:rPr>
+                        <a:t>0.591781</a:t>
                       </a:r>
                     </a:p>
                   </a:txBody>
@@ -8175,14 +8175,14 @@
                     <a:p>
                       <a:pPr algn="r" fontAlgn="b"/>
                       <a:r>
-                        <a:rPr lang="en-MY" sz="800" b="0" i="0" u="none" strike="noStrike">
-                          <a:solidFill>
-                            <a:srgbClr val="000000"/>
-                          </a:solidFill>
-                          <a:effectLst/>
-                          <a:latin typeface="Calibri" panose="020F0502020204030204" pitchFamily="34" charset="0"/>
-                        </a:rPr>
-                        <a:t>57</a:t>
+                        <a:rPr lang="en-MY" sz="900" b="0" i="0" u="none" strike="noStrike">
+                          <a:solidFill>
+                            <a:srgbClr val="000000"/>
+                          </a:solidFill>
+                          <a:effectLst/>
+                          <a:latin typeface="Calibri" panose="020F0502020204030204" pitchFamily="34" charset="0"/>
+                        </a:rPr>
+                        <a:t>248</a:t>
                       </a:r>
                     </a:p>
                   </a:txBody>
@@ -8232,14 +8232,14 @@
                     <a:p>
                       <a:pPr algn="r" fontAlgn="b"/>
                       <a:r>
-                        <a:rPr lang="en-MY" sz="800" b="0" i="0" u="none" strike="noStrike">
-                          <a:solidFill>
-                            <a:srgbClr val="000000"/>
-                          </a:solidFill>
-                          <a:effectLst/>
-                          <a:latin typeface="Calibri" panose="020F0502020204030204" pitchFamily="34" charset="0"/>
-                        </a:rPr>
-                        <a:t>62</a:t>
+                        <a:rPr lang="en-MY" sz="900" b="0" i="0" u="none" strike="noStrike">
+                          <a:solidFill>
+                            <a:srgbClr val="000000"/>
+                          </a:solidFill>
+                          <a:effectLst/>
+                          <a:latin typeface="Calibri" panose="020F0502020204030204" pitchFamily="34" charset="0"/>
+                        </a:rPr>
+                        <a:t>50</a:t>
                       </a:r>
                     </a:p>
                   </a:txBody>
@@ -8289,14 +8289,14 @@
                     <a:p>
                       <a:pPr algn="r" fontAlgn="b"/>
                       <a:r>
-                        <a:rPr lang="en-MY" sz="800" b="0" i="0" u="none" strike="noStrike">
-                          <a:solidFill>
-                            <a:srgbClr val="000000"/>
-                          </a:solidFill>
-                          <a:effectLst/>
-                          <a:latin typeface="Calibri" panose="020F0502020204030204" pitchFamily="34" charset="0"/>
-                        </a:rPr>
-                        <a:t>204</a:t>
+                        <a:rPr lang="en-MY" sz="900" b="0" i="0" u="none" strike="noStrike">
+                          <a:solidFill>
+                            <a:srgbClr val="000000"/>
+                          </a:solidFill>
+                          <a:effectLst/>
+                          <a:latin typeface="Calibri" panose="020F0502020204030204" pitchFamily="34" charset="0"/>
+                        </a:rPr>
+                        <a:t>216</a:t>
                       </a:r>
                     </a:p>
                   </a:txBody>
@@ -8346,14 +8346,14 @@
                     <a:p>
                       <a:pPr algn="r" fontAlgn="b"/>
                       <a:r>
-                        <a:rPr lang="en-MY" sz="800" b="0" i="0" u="none" strike="noStrike">
-                          <a:solidFill>
-                            <a:srgbClr val="000000"/>
-                          </a:solidFill>
-                          <a:effectLst/>
-                          <a:latin typeface="Calibri" panose="020F0502020204030204" pitchFamily="34" charset="0"/>
-                        </a:rPr>
-                        <a:t>-1501000</a:t>
+                        <a:rPr lang="en-MY" sz="900" b="0" i="0" u="none" strike="noStrike">
+                          <a:solidFill>
+                            <a:srgbClr val="000000"/>
+                          </a:solidFill>
+                          <a:effectLst/>
+                          <a:latin typeface="Calibri" panose="020F0502020204030204" pitchFamily="34" charset="0"/>
+                        </a:rPr>
+                        <a:t>-1464000</a:t>
                       </a:r>
                     </a:p>
                   </a:txBody>
@@ -8467,14 +8467,14 @@
                     <a:p>
                       <a:pPr algn="l" fontAlgn="b"/>
                       <a:r>
-                        <a:rPr lang="en-MY" sz="800" b="0" i="0" u="none" strike="noStrike">
-                          <a:solidFill>
-                            <a:srgbClr val="000000"/>
-                          </a:solidFill>
-                          <a:effectLst/>
-                          <a:latin typeface="Calibri" panose="020F0502020204030204" pitchFamily="34" charset="0"/>
-                        </a:rPr>
-                        <a:t>XGBoostGridSearch</a:t>
+                        <a:rPr lang="en-MY" sz="900" b="0" i="0" u="none" strike="noStrike">
+                          <a:solidFill>
+                            <a:srgbClr val="000000"/>
+                          </a:solidFill>
+                          <a:effectLst/>
+                          <a:latin typeface="Calibri" panose="020F0502020204030204" pitchFamily="34" charset="0"/>
+                        </a:rPr>
+                        <a:t>LightGBMGridSearchPolyNomial</a:t>
                       </a:r>
                     </a:p>
                   </a:txBody>
@@ -8524,14 +8524,14 @@
                     <a:p>
                       <a:pPr algn="r" fontAlgn="b"/>
                       <a:r>
-                        <a:rPr lang="en-MY" sz="800" b="0" i="0" u="none" strike="noStrike">
-                          <a:solidFill>
-                            <a:srgbClr val="000000"/>
-                          </a:solidFill>
-                          <a:effectLst/>
-                          <a:latin typeface="Calibri" panose="020F0502020204030204" pitchFamily="34" charset="0"/>
-                        </a:rPr>
-                        <a:t>0.868578</a:t>
+                        <a:rPr lang="en-MY" sz="900" b="0" i="0" u="none" strike="noStrike">
+                          <a:solidFill>
+                            <a:srgbClr val="000000"/>
+                          </a:solidFill>
+                          <a:effectLst/>
+                          <a:latin typeface="Calibri" panose="020F0502020204030204" pitchFamily="34" charset="0"/>
+                        </a:rPr>
+                        <a:t>1</a:t>
                       </a:r>
                     </a:p>
                   </a:txBody>
@@ -8581,14 +8581,14 @@
                     <a:p>
                       <a:pPr algn="r" fontAlgn="b"/>
                       <a:r>
-                        <a:rPr lang="en-MY" sz="800" b="0" i="0" u="none" strike="noStrike">
-                          <a:solidFill>
-                            <a:srgbClr val="000000"/>
-                          </a:solidFill>
-                          <a:effectLst/>
-                          <a:latin typeface="Calibri" panose="020F0502020204030204" pitchFamily="34" charset="0"/>
-                        </a:rPr>
-                        <a:t>0.840269</a:t>
+                        <a:rPr lang="en-MY" sz="900" b="0" i="0" u="none" strike="noStrike">
+                          <a:solidFill>
+                            <a:srgbClr val="000000"/>
+                          </a:solidFill>
+                          <a:effectLst/>
+                          <a:latin typeface="Calibri" panose="020F0502020204030204" pitchFamily="34" charset="0"/>
+                        </a:rPr>
+                        <a:t>0.873566</a:t>
                       </a:r>
                     </a:p>
                   </a:txBody>
@@ -8638,14 +8638,14 @@
                     <a:p>
                       <a:pPr algn="r" fontAlgn="b"/>
                       <a:r>
-                        <a:rPr lang="en-MY" sz="800" b="0" i="0" u="none" strike="noStrike">
-                          <a:solidFill>
-                            <a:srgbClr val="000000"/>
-                          </a:solidFill>
-                          <a:effectLst/>
-                          <a:latin typeface="Calibri" panose="020F0502020204030204" pitchFamily="34" charset="0"/>
-                        </a:rPr>
-                        <a:t>0.868578</a:t>
+                        <a:rPr lang="en-MY" sz="900" b="0" i="0" u="none" strike="noStrike">
+                          <a:solidFill>
+                            <a:srgbClr val="000000"/>
+                          </a:solidFill>
+                          <a:effectLst/>
+                          <a:latin typeface="Calibri" panose="020F0502020204030204" pitchFamily="34" charset="0"/>
+                        </a:rPr>
+                        <a:t>1</a:t>
                       </a:r>
                     </a:p>
                   </a:txBody>
@@ -8695,14 +8695,14 @@
                     <a:p>
                       <a:pPr algn="r" fontAlgn="b"/>
                       <a:r>
-                        <a:rPr lang="en-MY" sz="800" b="0" i="0" u="none" strike="noStrike">
-                          <a:solidFill>
-                            <a:srgbClr val="000000"/>
-                          </a:solidFill>
-                          <a:effectLst/>
-                          <a:latin typeface="Calibri" panose="020F0502020204030204" pitchFamily="34" charset="0"/>
-                        </a:rPr>
-                        <a:t>0.866857</a:t>
+                        <a:rPr lang="en-MY" sz="900" b="0" i="0" u="none" strike="noStrike">
+                          <a:solidFill>
+                            <a:srgbClr val="000000"/>
+                          </a:solidFill>
+                          <a:effectLst/>
+                          <a:latin typeface="Calibri" panose="020F0502020204030204" pitchFamily="34" charset="0"/>
+                        </a:rPr>
+                        <a:t>0.962186</a:t>
                       </a:r>
                     </a:p>
                   </a:txBody>
@@ -8752,14 +8752,14 @@
                     <a:p>
                       <a:pPr algn="r" fontAlgn="b"/>
                       <a:r>
-                        <a:rPr lang="en-MY" sz="800" b="0" i="0" u="none" strike="noStrike">
-                          <a:solidFill>
-                            <a:srgbClr val="000000"/>
-                          </a:solidFill>
-                          <a:effectLst/>
-                          <a:latin typeface="Calibri" panose="020F0502020204030204" pitchFamily="34" charset="0"/>
-                        </a:rPr>
-                        <a:t>0.737251</a:t>
+                        <a:rPr lang="en-MY" sz="900" b="0" i="0" u="none" strike="noStrike">
+                          <a:solidFill>
+                            <a:srgbClr val="000000"/>
+                          </a:solidFill>
+                          <a:effectLst/>
+                          <a:latin typeface="Calibri" panose="020F0502020204030204" pitchFamily="34" charset="0"/>
+                        </a:rPr>
+                        <a:t>1</a:t>
                       </a:r>
                     </a:p>
                   </a:txBody>
@@ -8809,14 +8809,14 @@
                     <a:p>
                       <a:pPr algn="r" fontAlgn="b"/>
                       <a:r>
-                        <a:rPr lang="en-MY" sz="800" b="0" i="0" u="none" strike="noStrike">
-                          <a:solidFill>
-                            <a:srgbClr val="000000"/>
-                          </a:solidFill>
-                          <a:effectLst/>
-                          <a:latin typeface="Calibri" panose="020F0502020204030204" pitchFamily="34" charset="0"/>
-                        </a:rPr>
-                        <a:t>0.487272</a:t>
+                        <a:rPr lang="en-MY" sz="900" b="0" i="0" u="none" strike="noStrike">
+                          <a:solidFill>
+                            <a:srgbClr val="000000"/>
+                          </a:solidFill>
+                          <a:effectLst/>
+                          <a:latin typeface="Calibri" panose="020F0502020204030204" pitchFamily="34" charset="0"/>
+                        </a:rPr>
+                        <a:t>0.753601</a:t>
                       </a:r>
                     </a:p>
                   </a:txBody>
@@ -8866,14 +8866,14 @@
                     <a:p>
                       <a:pPr algn="r" fontAlgn="b"/>
                       <a:r>
-                        <a:rPr lang="en-MY" sz="800" b="0" i="0" u="none" strike="noStrike">
-                          <a:solidFill>
-                            <a:srgbClr val="000000"/>
-                          </a:solidFill>
-                          <a:effectLst/>
-                          <a:latin typeface="Calibri" panose="020F0502020204030204" pitchFamily="34" charset="0"/>
-                        </a:rPr>
-                        <a:t>0.867514</a:t>
+                        <a:rPr lang="en-MY" sz="900" b="0" i="0" u="none" strike="noStrike">
+                          <a:solidFill>
+                            <a:srgbClr val="000000"/>
+                          </a:solidFill>
+                          <a:effectLst/>
+                          <a:latin typeface="Calibri" panose="020F0502020204030204" pitchFamily="34" charset="0"/>
+                        </a:rPr>
+                        <a:t>1</a:t>
                       </a:r>
                     </a:p>
                   </a:txBody>
@@ -8923,14 +8923,14 @@
                     <a:p>
                       <a:pPr algn="r" fontAlgn="b"/>
                       <a:r>
-                        <a:rPr lang="en-MY" sz="800" b="0" i="0" u="none" strike="noStrike">
-                          <a:solidFill>
-                            <a:srgbClr val="000000"/>
-                          </a:solidFill>
-                          <a:effectLst/>
-                          <a:latin typeface="Calibri" panose="020F0502020204030204" pitchFamily="34" charset="0"/>
-                        </a:rPr>
-                        <a:t>0.506478</a:t>
+                        <a:rPr lang="en-MY" sz="900" b="0" i="0" u="none" strike="noStrike">
+                          <a:solidFill>
+                            <a:srgbClr val="000000"/>
+                          </a:solidFill>
+                          <a:effectLst/>
+                          <a:latin typeface="Calibri" panose="020F0502020204030204" pitchFamily="34" charset="0"/>
+                        </a:rPr>
+                        <a:t>0.774194</a:t>
                       </a:r>
                     </a:p>
                   </a:txBody>
@@ -8980,14 +8980,14 @@
                     <a:p>
                       <a:pPr algn="r" fontAlgn="b"/>
                       <a:r>
-                        <a:rPr lang="en-MY" sz="800" b="0" i="0" u="none" strike="noStrike">
-                          <a:solidFill>
-                            <a:srgbClr val="000000"/>
-                          </a:solidFill>
-                          <a:effectLst/>
-                          <a:latin typeface="Calibri" panose="020F0502020204030204" pitchFamily="34" charset="0"/>
-                        </a:rPr>
-                        <a:t>368</a:t>
+                        <a:rPr lang="en-MY" sz="900" b="0" i="0" u="none" strike="noStrike">
+                          <a:solidFill>
+                            <a:srgbClr val="000000"/>
+                          </a:solidFill>
+                          <a:effectLst/>
+                          <a:latin typeface="Calibri" panose="020F0502020204030204" pitchFamily="34" charset="0"/>
+                        </a:rPr>
+                        <a:t>57</a:t>
                       </a:r>
                     </a:p>
                   </a:txBody>
@@ -9037,14 +9037,14 @@
                     <a:p>
                       <a:pPr algn="r" fontAlgn="b"/>
                       <a:r>
-                        <a:rPr lang="en-MY" sz="800" b="0" i="0" u="none" strike="noStrike">
-                          <a:solidFill>
-                            <a:srgbClr val="000000"/>
-                          </a:solidFill>
-                          <a:effectLst/>
-                          <a:latin typeface="Calibri" panose="020F0502020204030204" pitchFamily="34" charset="0"/>
-                        </a:rPr>
-                        <a:t>51</a:t>
+                        <a:rPr lang="en-MY" sz="900" b="0" i="0" u="none" strike="noStrike">
+                          <a:solidFill>
+                            <a:srgbClr val="000000"/>
+                          </a:solidFill>
+                          <a:effectLst/>
+                          <a:latin typeface="Calibri" panose="020F0502020204030204" pitchFamily="34" charset="0"/>
+                        </a:rPr>
+                        <a:t>62</a:t>
                       </a:r>
                     </a:p>
                   </a:txBody>
@@ -9094,14 +9094,14 @@
                     <a:p>
                       <a:pPr algn="r" fontAlgn="b"/>
                       <a:r>
-                        <a:rPr lang="en-MY" sz="800" b="0" i="0" u="none" strike="noStrike">
-                          <a:solidFill>
-                            <a:srgbClr val="000000"/>
-                          </a:solidFill>
-                          <a:effectLst/>
-                          <a:latin typeface="Calibri" panose="020F0502020204030204" pitchFamily="34" charset="0"/>
-                        </a:rPr>
-                        <a:t>215</a:t>
+                        <a:rPr lang="en-MY" sz="900" b="0" i="0" u="none" strike="noStrike">
+                          <a:solidFill>
+                            <a:srgbClr val="000000"/>
+                          </a:solidFill>
+                          <a:effectLst/>
+                          <a:latin typeface="Calibri" panose="020F0502020204030204" pitchFamily="34" charset="0"/>
+                        </a:rPr>
+                        <a:t>204</a:t>
                       </a:r>
                     </a:p>
                   </a:txBody>
@@ -9151,14 +9151,14 @@
                     <a:p>
                       <a:pPr algn="r" fontAlgn="b"/>
                       <a:r>
-                        <a:rPr lang="en-MY" sz="800" b="0" i="0" u="none" strike="noStrike">
-                          <a:solidFill>
-                            <a:srgbClr val="000000"/>
-                          </a:solidFill>
-                          <a:effectLst/>
-                          <a:latin typeface="Calibri" panose="020F0502020204030204" pitchFamily="34" charset="0"/>
-                        </a:rPr>
-                        <a:t>-1603000</a:t>
+                        <a:rPr lang="en-MY" sz="900" b="0" i="0" u="none" strike="noStrike">
+                          <a:solidFill>
+                            <a:srgbClr val="000000"/>
+                          </a:solidFill>
+                          <a:effectLst/>
+                          <a:latin typeface="Calibri" panose="020F0502020204030204" pitchFamily="34" charset="0"/>
+                        </a:rPr>
+                        <a:t>-1501000</a:t>
                       </a:r>
                     </a:p>
                   </a:txBody>
@@ -9272,14 +9272,14 @@
                     <a:p>
                       <a:pPr algn="l" fontAlgn="b"/>
                       <a:r>
-                        <a:rPr lang="en-MY" sz="800" b="0" i="0" u="none" strike="noStrike">
-                          <a:solidFill>
-                            <a:srgbClr val="000000"/>
-                          </a:solidFill>
-                          <a:effectLst/>
-                          <a:latin typeface="Calibri" panose="020F0502020204030204" pitchFamily="34" charset="0"/>
-                        </a:rPr>
-                        <a:t>RandomForestGridSearch</a:t>
+                        <a:rPr lang="en-MY" sz="900" b="0" i="0" u="none" strike="noStrike">
+                          <a:solidFill>
+                            <a:srgbClr val="000000"/>
+                          </a:solidFill>
+                          <a:effectLst/>
+                          <a:latin typeface="Calibri" panose="020F0502020204030204" pitchFamily="34" charset="0"/>
+                        </a:rPr>
+                        <a:t>XGBoostGridSearch</a:t>
                       </a:r>
                     </a:p>
                   </a:txBody>
@@ -9329,14 +9329,14 @@
                     <a:p>
                       <a:pPr algn="r" fontAlgn="b"/>
                       <a:r>
-                        <a:rPr lang="en-MY" sz="800" b="0" i="0" u="none" strike="noStrike">
-                          <a:solidFill>
-                            <a:srgbClr val="000000"/>
-                          </a:solidFill>
-                          <a:effectLst/>
-                          <a:latin typeface="Calibri" panose="020F0502020204030204" pitchFamily="34" charset="0"/>
-                        </a:rPr>
-                        <a:t>0.884164</a:t>
+                        <a:rPr lang="en-MY" sz="900" b="0" i="0" u="none" strike="noStrike">
+                          <a:solidFill>
+                            <a:srgbClr val="000000"/>
+                          </a:solidFill>
+                          <a:effectLst/>
+                          <a:latin typeface="Calibri" panose="020F0502020204030204" pitchFamily="34" charset="0"/>
+                        </a:rPr>
+                        <a:t>0.870693</a:t>
                       </a:r>
                     </a:p>
                   </a:txBody>
@@ -9386,14 +9386,14 @@
                     <a:p>
                       <a:pPr algn="r" fontAlgn="b"/>
                       <a:r>
-                        <a:rPr lang="en-MY" sz="800" b="0" i="0" u="none" strike="noStrike">
-                          <a:solidFill>
-                            <a:srgbClr val="000000"/>
-                          </a:solidFill>
-                          <a:effectLst/>
-                          <a:latin typeface="Calibri" panose="020F0502020204030204" pitchFamily="34" charset="0"/>
-                        </a:rPr>
-                        <a:t>0.828008</a:t>
+                        <a:rPr lang="en-MY" sz="900" b="0" i="0" u="none" strike="noStrike">
+                          <a:solidFill>
+                            <a:srgbClr val="000000"/>
+                          </a:solidFill>
+                          <a:effectLst/>
+                          <a:latin typeface="Calibri" panose="020F0502020204030204" pitchFamily="34" charset="0"/>
+                        </a:rPr>
+                        <a:t>0.834718</a:t>
                       </a:r>
                     </a:p>
                   </a:txBody>
@@ -9443,14 +9443,14 @@
                     <a:p>
                       <a:pPr algn="r" fontAlgn="b"/>
                       <a:r>
-                        <a:rPr lang="en-MY" sz="800" b="0" i="0" u="none" strike="noStrike">
-                          <a:solidFill>
-                            <a:srgbClr val="000000"/>
-                          </a:solidFill>
-                          <a:effectLst/>
-                          <a:latin typeface="Calibri" panose="020F0502020204030204" pitchFamily="34" charset="0"/>
-                        </a:rPr>
-                        <a:t>0.884164</a:t>
+                        <a:rPr lang="en-MY" sz="900" b="0" i="0" u="none" strike="noStrike">
+                          <a:solidFill>
+                            <a:srgbClr val="000000"/>
+                          </a:solidFill>
+                          <a:effectLst/>
+                          <a:latin typeface="Calibri" panose="020F0502020204030204" pitchFamily="34" charset="0"/>
+                        </a:rPr>
+                        <a:t>0.870693</a:t>
                       </a:r>
                     </a:p>
                   </a:txBody>
@@ -9500,14 +9500,14 @@
                     <a:p>
                       <a:pPr algn="r" fontAlgn="b"/>
                       <a:r>
-                        <a:rPr lang="en-MY" sz="800" b="0" i="0" u="none" strike="noStrike">
-                          <a:solidFill>
-                            <a:srgbClr val="000000"/>
-                          </a:solidFill>
-                          <a:effectLst/>
-                          <a:latin typeface="Calibri" panose="020F0502020204030204" pitchFamily="34" charset="0"/>
-                        </a:rPr>
-                        <a:t>0.869399</a:t>
+                        <a:rPr lang="en-MY" sz="900" b="0" i="0" u="none" strike="noStrike">
+                          <a:solidFill>
+                            <a:srgbClr val="000000"/>
+                          </a:solidFill>
+                          <a:effectLst/>
+                          <a:latin typeface="Calibri" panose="020F0502020204030204" pitchFamily="34" charset="0"/>
+                        </a:rPr>
+                        <a:t>0.875437</a:t>
                       </a:r>
                     </a:p>
                   </a:txBody>
@@ -9557,14 +9557,14 @@
                     <a:p>
                       <a:pPr algn="r" fontAlgn="b"/>
                       <a:r>
-                        <a:rPr lang="en-MY" sz="800" b="0" i="0" u="none" strike="noStrike">
-                          <a:solidFill>
-                            <a:srgbClr val="000000"/>
-                          </a:solidFill>
-                          <a:effectLst/>
-                          <a:latin typeface="Calibri" panose="020F0502020204030204" pitchFamily="34" charset="0"/>
-                        </a:rPr>
-                        <a:t>0.768405</a:t>
+                        <a:rPr lang="en-MY" sz="900" b="0" i="0" u="none" strike="noStrike">
+                          <a:solidFill>
+                            <a:srgbClr val="000000"/>
+                          </a:solidFill>
+                          <a:effectLst/>
+                          <a:latin typeface="Calibri" panose="020F0502020204030204" pitchFamily="34" charset="0"/>
+                        </a:rPr>
+                        <a:t>0.742191</a:t>
                       </a:r>
                     </a:p>
                   </a:txBody>
@@ -9614,14 +9614,14 @@
                     <a:p>
                       <a:pPr algn="r" fontAlgn="b"/>
                       <a:r>
-                        <a:rPr lang="en-MY" sz="800" b="0" i="0" u="none" strike="noStrike">
-                          <a:solidFill>
-                            <a:srgbClr val="000000"/>
-                          </a:solidFill>
-                          <a:effectLst/>
-                          <a:latin typeface="Calibri" panose="020F0502020204030204" pitchFamily="34" charset="0"/>
-                        </a:rPr>
-                        <a:t>0.477462</a:t>
+                        <a:rPr lang="en-MY" sz="900" b="0" i="0" u="none" strike="noStrike">
+                          <a:solidFill>
+                            <a:srgbClr val="000000"/>
+                          </a:solidFill>
+                          <a:effectLst/>
+                          <a:latin typeface="Calibri" panose="020F0502020204030204" pitchFamily="34" charset="0"/>
+                        </a:rPr>
+                        <a:t>0.492475</a:t>
                       </a:r>
                     </a:p>
                   </a:txBody>
@@ -9671,14 +9671,14 @@
                     <a:p>
                       <a:pPr algn="r" fontAlgn="b"/>
                       <a:r>
-                        <a:rPr lang="en-MY" sz="800" b="0" i="0" u="none" strike="noStrike">
-                          <a:solidFill>
-                            <a:srgbClr val="000000"/>
-                          </a:solidFill>
-                          <a:effectLst/>
-                          <a:latin typeface="Calibri" panose="020F0502020204030204" pitchFamily="34" charset="0"/>
-                        </a:rPr>
-                        <a:t>0.883333</a:t>
+                        <a:rPr lang="en-MY" sz="900" b="0" i="0" u="none" strike="noStrike">
+                          <a:solidFill>
+                            <a:srgbClr val="000000"/>
+                          </a:solidFill>
+                          <a:effectLst/>
+                          <a:latin typeface="Calibri" panose="020F0502020204030204" pitchFamily="34" charset="0"/>
+                        </a:rPr>
+                        <a:t>0.867613</a:t>
                       </a:r>
                     </a:p>
                   </a:txBody>
@@ -9728,14 +9728,14 @@
                     <a:p>
                       <a:pPr algn="r" fontAlgn="b"/>
                       <a:r>
-                        <a:rPr lang="en-MY" sz="800" b="0" i="0" u="none" strike="noStrike">
-                          <a:solidFill>
-                            <a:srgbClr val="000000"/>
-                          </a:solidFill>
-                          <a:effectLst/>
-                          <a:latin typeface="Calibri" panose="020F0502020204030204" pitchFamily="34" charset="0"/>
-                        </a:rPr>
-                        <a:t>0.501818</a:t>
+                        <a:rPr lang="en-MY" sz="900" b="0" i="0" u="none" strike="noStrike">
+                          <a:solidFill>
+                            <a:srgbClr val="000000"/>
+                          </a:solidFill>
+                          <a:effectLst/>
+                          <a:latin typeface="Calibri" panose="020F0502020204030204" pitchFamily="34" charset="0"/>
+                        </a:rPr>
+                        <a:t>0.516049</a:t>
                       </a:r>
                     </a:p>
                   </a:txBody>
@@ -9785,14 +9785,14 @@
                     <a:p>
                       <a:pPr algn="r" fontAlgn="b"/>
                       <a:r>
-                        <a:rPr lang="en-MY" sz="800" b="0" i="0" u="none" strike="noStrike">
-                          <a:solidFill>
-                            <a:srgbClr val="000000"/>
-                          </a:solidFill>
-                          <a:effectLst/>
-                          <a:latin typeface="Calibri" panose="020F0502020204030204" pitchFamily="34" charset="0"/>
-                        </a:rPr>
-                        <a:t>352</a:t>
+                        <a:rPr lang="en-MY" sz="900" b="0" i="0" u="none" strike="noStrike">
+                          <a:solidFill>
+                            <a:srgbClr val="000000"/>
+                          </a:solidFill>
+                          <a:effectLst/>
+                          <a:latin typeface="Calibri" panose="020F0502020204030204" pitchFamily="34" charset="0"/>
+                        </a:rPr>
+                        <a:t>335</a:t>
                       </a:r>
                     </a:p>
                   </a:txBody>
@@ -9842,14 +9842,14 @@
                     <a:p>
                       <a:pPr algn="r" fontAlgn="b"/>
                       <a:r>
-                        <a:rPr lang="en-MY" sz="800" b="0" i="0" u="none" strike="noStrike">
-                          <a:solidFill>
-                            <a:srgbClr val="000000"/>
-                          </a:solidFill>
-                          <a:effectLst/>
-                          <a:latin typeface="Calibri" panose="020F0502020204030204" pitchFamily="34" charset="0"/>
-                        </a:rPr>
-                        <a:t>59</a:t>
+                        <a:rPr lang="en-MY" sz="900" b="0" i="0" u="none" strike="noStrike">
+                          <a:solidFill>
+                            <a:srgbClr val="000000"/>
+                          </a:solidFill>
+                          <a:effectLst/>
+                          <a:latin typeface="Calibri" panose="020F0502020204030204" pitchFamily="34" charset="0"/>
+                        </a:rPr>
+                        <a:t>57</a:t>
                       </a:r>
                     </a:p>
                   </a:txBody>
@@ -9899,14 +9899,14 @@
                     <a:p>
                       <a:pPr algn="r" fontAlgn="b"/>
                       <a:r>
-                        <a:rPr lang="en-MY" sz="800" b="0" i="0" u="none" strike="noStrike">
-                          <a:solidFill>
-                            <a:srgbClr val="000000"/>
-                          </a:solidFill>
-                          <a:effectLst/>
-                          <a:latin typeface="Calibri" panose="020F0502020204030204" pitchFamily="34" charset="0"/>
-                        </a:rPr>
-                        <a:t>207</a:t>
+                        <a:rPr lang="en-MY" sz="900" b="0" i="0" u="none" strike="noStrike">
+                          <a:solidFill>
+                            <a:srgbClr val="000000"/>
+                          </a:solidFill>
+                          <a:effectLst/>
+                          <a:latin typeface="Calibri" panose="020F0502020204030204" pitchFamily="34" charset="0"/>
+                        </a:rPr>
+                        <a:t>209</a:t>
                       </a:r>
                     </a:p>
                   </a:txBody>
@@ -9956,14 +9956,14 @@
                     <a:p>
                       <a:pPr algn="r" fontAlgn="b"/>
                       <a:r>
-                        <a:rPr lang="en-MY" sz="800" b="0" i="0" u="none" strike="noStrike">
-                          <a:solidFill>
-                            <a:srgbClr val="000000"/>
-                          </a:solidFill>
-                          <a:effectLst/>
-                          <a:latin typeface="Calibri" panose="020F0502020204030204" pitchFamily="34" charset="0"/>
-                        </a:rPr>
-                        <a:t>-1739000</a:t>
+                        <a:rPr lang="en-MY" sz="900" b="0" i="0" u="none" strike="noStrike">
+                          <a:solidFill>
+                            <a:srgbClr val="000000"/>
+                          </a:solidFill>
+                          <a:effectLst/>
+                          <a:latin typeface="Calibri" panose="020F0502020204030204" pitchFamily="34" charset="0"/>
+                        </a:rPr>
+                        <a:t>-1684000</a:t>
                       </a:r>
                     </a:p>
                   </a:txBody>
@@ -10077,7 +10077,7 @@
                     <a:p>
                       <a:pPr algn="l" fontAlgn="b"/>
                       <a:r>
-                        <a:rPr lang="en-MY" sz="800" b="0" i="0" u="none" strike="noStrike">
+                        <a:rPr lang="en-MY" sz="900" b="0" i="0" u="none" strike="noStrike">
                           <a:solidFill>
                             <a:srgbClr val="000000"/>
                           </a:solidFill>
@@ -10134,7 +10134,7 @@
                     <a:p>
                       <a:pPr algn="r" fontAlgn="b"/>
                       <a:r>
-                        <a:rPr lang="en-MY" sz="800" b="0" i="0" u="none" strike="noStrike">
+                        <a:rPr lang="en-MY" sz="900" b="0" i="0" u="none" strike="noStrike">
                           <a:solidFill>
                             <a:srgbClr val="000000"/>
                           </a:solidFill>
@@ -10191,14 +10191,14 @@
                     <a:p>
                       <a:pPr algn="r" fontAlgn="b"/>
                       <a:r>
-                        <a:rPr lang="en-MY" sz="800" b="0" i="0" u="none" strike="noStrike">
-                          <a:solidFill>
-                            <a:srgbClr val="000000"/>
-                          </a:solidFill>
-                          <a:effectLst/>
-                          <a:latin typeface="Calibri" panose="020F0502020204030204" pitchFamily="34" charset="0"/>
-                        </a:rPr>
-                        <a:t>0.837991</a:t>
+                        <a:rPr lang="en-MY" sz="900" b="0" i="0" u="none" strike="noStrike">
+                          <a:solidFill>
+                            <a:srgbClr val="000000"/>
+                          </a:solidFill>
+                          <a:effectLst/>
+                          <a:latin typeface="Calibri" panose="020F0502020204030204" pitchFamily="34" charset="0"/>
+                        </a:rPr>
+                        <a:t>0.846263</a:t>
                       </a:r>
                     </a:p>
                   </a:txBody>
@@ -10248,7 +10248,7 @@
                     <a:p>
                       <a:pPr algn="r" fontAlgn="b"/>
                       <a:r>
-                        <a:rPr lang="en-MY" sz="800" b="0" i="0" u="none" strike="noStrike">
+                        <a:rPr lang="en-MY" sz="900" b="0" i="0" u="none" strike="noStrike">
                           <a:solidFill>
                             <a:srgbClr val="000000"/>
                           </a:solidFill>
@@ -10305,14 +10305,14 @@
                     <a:p>
                       <a:pPr algn="r" fontAlgn="b"/>
                       <a:r>
-                        <a:rPr lang="en-MY" sz="800" b="0" i="0" u="none" strike="noStrike">
-                          <a:solidFill>
-                            <a:srgbClr val="000000"/>
-                          </a:solidFill>
-                          <a:effectLst/>
-                          <a:latin typeface="Calibri" panose="020F0502020204030204" pitchFamily="34" charset="0"/>
-                        </a:rPr>
-                        <a:t>0.915793</a:t>
+                        <a:rPr lang="en-MY" sz="900" b="0" i="0" u="none" strike="noStrike">
+                          <a:solidFill>
+                            <a:srgbClr val="000000"/>
+                          </a:solidFill>
+                          <a:effectLst/>
+                          <a:latin typeface="Calibri" panose="020F0502020204030204" pitchFamily="34" charset="0"/>
+                        </a:rPr>
+                        <a:t>0.92469</a:t>
                       </a:r>
                     </a:p>
                   </a:txBody>
@@ -10362,7 +10362,7 @@
                     <a:p>
                       <a:pPr algn="r" fontAlgn="b"/>
                       <a:r>
-                        <a:rPr lang="en-MY" sz="800" b="0" i="0" u="none" strike="noStrike">
+                        <a:rPr lang="en-MY" sz="900" b="0" i="0" u="none" strike="noStrike">
                           <a:solidFill>
                             <a:srgbClr val="000000"/>
                           </a:solidFill>
@@ -10419,14 +10419,14 @@
                     <a:p>
                       <a:pPr algn="r" fontAlgn="b"/>
                       <a:r>
-                        <a:rPr lang="en-MY" sz="800" b="0" i="0" u="none" strike="noStrike">
-                          <a:solidFill>
-                            <a:srgbClr val="000000"/>
-                          </a:solidFill>
-                          <a:effectLst/>
-                          <a:latin typeface="Calibri" panose="020F0502020204030204" pitchFamily="34" charset="0"/>
-                        </a:rPr>
-                        <a:t>0.567577</a:t>
+                        <a:rPr lang="en-MY" sz="900" b="0" i="0" u="none" strike="noStrike">
+                          <a:solidFill>
+                            <a:srgbClr val="000000"/>
+                          </a:solidFill>
+                          <a:effectLst/>
+                          <a:latin typeface="Calibri" panose="020F0502020204030204" pitchFamily="34" charset="0"/>
+                        </a:rPr>
+                        <a:t>0.597381</a:t>
                       </a:r>
                     </a:p>
                   </a:txBody>
@@ -10476,7 +10476,7 @@
                     <a:p>
                       <a:pPr algn="r" fontAlgn="b"/>
                       <a:r>
-                        <a:rPr lang="en-MY" sz="800" b="0" i="0" u="none" strike="noStrike">
+                        <a:rPr lang="en-MY" sz="900" b="0" i="0" u="none" strike="noStrike">
                           <a:solidFill>
                             <a:srgbClr val="000000"/>
                           </a:solidFill>
@@ -10533,14 +10533,14 @@
                     <a:p>
                       <a:pPr algn="r" fontAlgn="b"/>
                       <a:r>
-                        <a:rPr lang="en-MY" sz="800" b="0" i="0" u="none" strike="noStrike">
-                          <a:solidFill>
-                            <a:srgbClr val="000000"/>
-                          </a:solidFill>
-                          <a:effectLst/>
-                          <a:latin typeface="Calibri" panose="020F0502020204030204" pitchFamily="34" charset="0"/>
-                        </a:rPr>
-                        <a:t>0.599092</a:t>
+                        <a:rPr lang="en-MY" sz="900" b="0" i="0" u="none" strike="noStrike">
+                          <a:solidFill>
+                            <a:srgbClr val="000000"/>
+                          </a:solidFill>
+                          <a:effectLst/>
+                          <a:latin typeface="Calibri" panose="020F0502020204030204" pitchFamily="34" charset="0"/>
+                        </a:rPr>
+                        <a:t>0.627943</a:t>
                       </a:r>
                     </a:p>
                   </a:txBody>
@@ -10590,14 +10590,14 @@
                     <a:p>
                       <a:pPr algn="r" fontAlgn="b"/>
                       <a:r>
-                        <a:rPr lang="en-MY" sz="800" b="0" i="0" u="none" strike="noStrike">
-                          <a:solidFill>
-                            <a:srgbClr val="000000"/>
-                          </a:solidFill>
-                          <a:effectLst/>
-                          <a:latin typeface="Calibri" panose="020F0502020204030204" pitchFamily="34" charset="0"/>
-                        </a:rPr>
-                        <a:t>197</a:t>
+                        <a:rPr lang="en-MY" sz="900" b="0" i="0" u="none" strike="noStrike">
+                          <a:solidFill>
+                            <a:srgbClr val="000000"/>
+                          </a:solidFill>
+                          <a:effectLst/>
+                          <a:latin typeface="Calibri" panose="020F0502020204030204" pitchFamily="34" charset="0"/>
+                        </a:rPr>
+                        <a:t>171</a:t>
                       </a:r>
                     </a:p>
                   </a:txBody>
@@ -10647,14 +10647,14 @@
                     <a:p>
                       <a:pPr algn="r" fontAlgn="b"/>
                       <a:r>
-                        <a:rPr lang="en-MY" sz="800" b="0" i="0" u="none" strike="noStrike">
-                          <a:solidFill>
-                            <a:srgbClr val="000000"/>
-                          </a:solidFill>
-                          <a:effectLst/>
-                          <a:latin typeface="Calibri" panose="020F0502020204030204" pitchFamily="34" charset="0"/>
-                        </a:rPr>
-                        <a:t>68</a:t>
+                        <a:rPr lang="en-MY" sz="900" b="0" i="0" u="none" strike="noStrike">
+                          <a:solidFill>
+                            <a:srgbClr val="000000"/>
+                          </a:solidFill>
+                          <a:effectLst/>
+                          <a:latin typeface="Calibri" panose="020F0502020204030204" pitchFamily="34" charset="0"/>
+                        </a:rPr>
+                        <a:t>66</a:t>
                       </a:r>
                     </a:p>
                   </a:txBody>
@@ -10704,14 +10704,14 @@
                     <a:p>
                       <a:pPr algn="r" fontAlgn="b"/>
                       <a:r>
-                        <a:rPr lang="en-MY" sz="800" b="0" i="0" u="none" strike="noStrike">
-                          <a:solidFill>
-                            <a:srgbClr val="000000"/>
-                          </a:solidFill>
-                          <a:effectLst/>
-                          <a:latin typeface="Calibri" panose="020F0502020204030204" pitchFamily="34" charset="0"/>
-                        </a:rPr>
-                        <a:t>198</a:t>
+                        <a:rPr lang="en-MY" sz="900" b="0" i="0" u="none" strike="noStrike">
+                          <a:solidFill>
+                            <a:srgbClr val="000000"/>
+                          </a:solidFill>
+                          <a:effectLst/>
+                          <a:latin typeface="Calibri" panose="020F0502020204030204" pitchFamily="34" charset="0"/>
+                        </a:rPr>
+                        <a:t>200</a:t>
                       </a:r>
                     </a:p>
                   </a:txBody>
@@ -10761,14 +10761,14 @@
                     <a:p>
                       <a:pPr algn="r" fontAlgn="b"/>
                       <a:r>
-                        <a:rPr lang="en-MY" sz="800" b="0" i="0" u="none" strike="noStrike">
-                          <a:solidFill>
-                            <a:srgbClr val="000000"/>
-                          </a:solidFill>
-                          <a:effectLst/>
-                          <a:latin typeface="Calibri" panose="020F0502020204030204" pitchFamily="34" charset="0"/>
-                        </a:rPr>
-                        <a:t>-1755000</a:t>
+                        <a:rPr lang="en-MY" sz="900" b="0" i="0" u="none" strike="noStrike">
+                          <a:solidFill>
+                            <a:srgbClr val="000000"/>
+                          </a:solidFill>
+                          <a:effectLst/>
+                          <a:latin typeface="Calibri" panose="020F0502020204030204" pitchFamily="34" charset="0"/>
+                        </a:rPr>
+                        <a:t>-1691000</a:t>
                       </a:r>
                     </a:p>
                   </a:txBody>
@@ -10882,7 +10882,7 @@
                     <a:p>
                       <a:pPr algn="l" fontAlgn="b"/>
                       <a:r>
-                        <a:rPr lang="en-MY" sz="800" b="0" i="0" u="none" strike="noStrike">
+                        <a:rPr lang="en-MY" sz="900" b="0" i="0" u="none" strike="noStrike">
                           <a:solidFill>
                             <a:srgbClr val="000000"/>
                           </a:solidFill>
@@ -10939,7 +10939,7 @@
                     <a:p>
                       <a:pPr algn="r" fontAlgn="b"/>
                       <a:r>
-                        <a:rPr lang="en-MY" sz="800" b="0" i="0" u="none" strike="noStrike">
+                        <a:rPr lang="en-MY" sz="900" b="0" i="0" u="none" strike="noStrike">
                           <a:solidFill>
                             <a:srgbClr val="000000"/>
                           </a:solidFill>
@@ -10996,7 +10996,7 @@
                     <a:p>
                       <a:pPr algn="r" fontAlgn="b"/>
                       <a:r>
-                        <a:rPr lang="en-MY" sz="800" b="0" i="0" u="none" strike="noStrike">
+                        <a:rPr lang="en-MY" sz="900" b="0" i="0" u="none" strike="noStrike">
                           <a:solidFill>
                             <a:srgbClr val="000000"/>
                           </a:solidFill>
@@ -11053,7 +11053,7 @@
                     <a:p>
                       <a:pPr algn="r" fontAlgn="b"/>
                       <a:r>
-                        <a:rPr lang="en-MY" sz="800" b="0" i="0" u="none" strike="noStrike">
+                        <a:rPr lang="en-MY" sz="900" b="0" i="0" u="none" strike="noStrike">
                           <a:solidFill>
                             <a:srgbClr val="000000"/>
                           </a:solidFill>
@@ -11110,7 +11110,7 @@
                     <a:p>
                       <a:pPr algn="r" fontAlgn="b"/>
                       <a:r>
-                        <a:rPr lang="en-MY" sz="800" b="0" i="0" u="none" strike="noStrike">
+                        <a:rPr lang="en-MY" sz="900" b="0" i="0" u="none" strike="noStrike">
                           <a:solidFill>
                             <a:srgbClr val="000000"/>
                           </a:solidFill>
@@ -11167,7 +11167,7 @@
                     <a:p>
                       <a:pPr algn="r" fontAlgn="b"/>
                       <a:r>
-                        <a:rPr lang="en-MY" sz="800" b="0" i="0" u="none" strike="noStrike">
+                        <a:rPr lang="en-MY" sz="900" b="0" i="0" u="none" strike="noStrike">
                           <a:solidFill>
                             <a:srgbClr val="000000"/>
                           </a:solidFill>
@@ -11224,7 +11224,7 @@
                     <a:p>
                       <a:pPr algn="r" fontAlgn="b"/>
                       <a:r>
-                        <a:rPr lang="en-MY" sz="800" b="0" i="0" u="none" strike="noStrike">
+                        <a:rPr lang="en-MY" sz="900" b="0" i="0" u="none" strike="noStrike">
                           <a:solidFill>
                             <a:srgbClr val="000000"/>
                           </a:solidFill>
@@ -11281,7 +11281,7 @@
                     <a:p>
                       <a:pPr algn="r" fontAlgn="b"/>
                       <a:r>
-                        <a:rPr lang="en-MY" sz="800" b="0" i="0" u="none" strike="noStrike">
+                        <a:rPr lang="en-MY" sz="900" b="0" i="0" u="none" strike="noStrike">
                           <a:solidFill>
                             <a:srgbClr val="000000"/>
                           </a:solidFill>
@@ -11338,7 +11338,7 @@
                     <a:p>
                       <a:pPr algn="r" fontAlgn="b"/>
                       <a:r>
-                        <a:rPr lang="en-MY" sz="800" b="0" i="0" u="none" strike="noStrike">
+                        <a:rPr lang="en-MY" sz="900" b="0" i="0" u="none" strike="noStrike">
                           <a:solidFill>
                             <a:srgbClr val="000000"/>
                           </a:solidFill>
@@ -11395,7 +11395,7 @@
                     <a:p>
                       <a:pPr algn="r" fontAlgn="b"/>
                       <a:r>
-                        <a:rPr lang="en-MY" sz="800" b="0" i="0" u="none" strike="noStrike">
+                        <a:rPr lang="en-MY" sz="900" b="0" i="0" u="none" strike="noStrike">
                           <a:solidFill>
                             <a:srgbClr val="000000"/>
                           </a:solidFill>
@@ -11452,7 +11452,7 @@
                     <a:p>
                       <a:pPr algn="r" fontAlgn="b"/>
                       <a:r>
-                        <a:rPr lang="en-MY" sz="800" b="0" i="0" u="none" strike="noStrike">
+                        <a:rPr lang="en-MY" sz="900" b="0" i="0" u="none" strike="noStrike">
                           <a:solidFill>
                             <a:srgbClr val="000000"/>
                           </a:solidFill>
@@ -11509,7 +11509,7 @@
                     <a:p>
                       <a:pPr algn="r" fontAlgn="b"/>
                       <a:r>
-                        <a:rPr lang="en-MY" sz="800" b="0" i="0" u="none" strike="noStrike">
+                        <a:rPr lang="en-MY" sz="900" b="0" i="0" u="none" strike="noStrike">
                           <a:solidFill>
                             <a:srgbClr val="000000"/>
                           </a:solidFill>
@@ -11566,7 +11566,7 @@
                     <a:p>
                       <a:pPr algn="r" fontAlgn="b"/>
                       <a:r>
-                        <a:rPr lang="en-MY" sz="800" b="0" i="0" u="none" strike="noStrike">
+                        <a:rPr lang="en-MY" sz="900" b="0" i="0" u="none" strike="noStrike">
                           <a:solidFill>
                             <a:srgbClr val="000000"/>
                           </a:solidFill>
@@ -11687,7 +11687,7 @@
                     <a:p>
                       <a:pPr algn="l" fontAlgn="b"/>
                       <a:r>
-                        <a:rPr lang="en-MY" sz="800" b="0" i="0" u="none" strike="noStrike">
+                        <a:rPr lang="en-MY" sz="900" b="0" i="0" u="none" strike="noStrike">
                           <a:solidFill>
                             <a:srgbClr val="000000"/>
                           </a:solidFill>
@@ -11744,14 +11744,14 @@
                     <a:p>
                       <a:pPr algn="r" fontAlgn="b"/>
                       <a:r>
-                        <a:rPr lang="en-MY" sz="800" b="0" i="0" u="none" strike="noStrike">
-                          <a:solidFill>
-                            <a:srgbClr val="000000"/>
-                          </a:solidFill>
-                          <a:effectLst/>
-                          <a:latin typeface="Calibri" panose="020F0502020204030204" pitchFamily="34" charset="0"/>
-                        </a:rPr>
-                        <a:t>0.5</a:t>
+                        <a:rPr lang="en-MY" sz="900" b="0" i="0" u="none" strike="noStrike">
+                          <a:solidFill>
+                            <a:srgbClr val="000000"/>
+                          </a:solidFill>
+                          <a:effectLst/>
+                          <a:latin typeface="Calibri" panose="020F0502020204030204" pitchFamily="34" charset="0"/>
+                        </a:rPr>
+                        <a:t>0.636301</a:t>
                       </a:r>
                     </a:p>
                   </a:txBody>
@@ -11801,14 +11801,14 @@
                     <a:p>
                       <a:pPr algn="r" fontAlgn="b"/>
                       <a:r>
-                        <a:rPr lang="en-MY" sz="800" b="0" i="0" u="none" strike="noStrike">
-                          <a:solidFill>
-                            <a:srgbClr val="000000"/>
-                          </a:solidFill>
-                          <a:effectLst/>
-                          <a:latin typeface="Calibri" panose="020F0502020204030204" pitchFamily="34" charset="0"/>
-                        </a:rPr>
-                        <a:t>0.5</a:t>
+                        <a:rPr lang="en-MY" sz="900" b="0" i="0" u="none" strike="noStrike">
+                          <a:solidFill>
+                            <a:srgbClr val="000000"/>
+                          </a:solidFill>
+                          <a:effectLst/>
+                          <a:latin typeface="Calibri" panose="020F0502020204030204" pitchFamily="34" charset="0"/>
+                        </a:rPr>
+                        <a:t>0.615586</a:t>
                       </a:r>
                     </a:p>
                   </a:txBody>
@@ -11858,14 +11858,14 @@
                     <a:p>
                       <a:pPr algn="r" fontAlgn="b"/>
                       <a:r>
-                        <a:rPr lang="en-MY" sz="800" b="0" i="0" u="none" strike="noStrike">
-                          <a:solidFill>
-                            <a:srgbClr val="000000"/>
-                          </a:solidFill>
-                          <a:effectLst/>
-                          <a:latin typeface="Calibri" panose="020F0502020204030204" pitchFamily="34" charset="0"/>
-                        </a:rPr>
-                        <a:t>0.5</a:t>
+                        <a:rPr lang="en-MY" sz="900" b="0" i="0" u="none" strike="noStrike">
+                          <a:solidFill>
+                            <a:srgbClr val="000000"/>
+                          </a:solidFill>
+                          <a:effectLst/>
+                          <a:latin typeface="Calibri" panose="020F0502020204030204" pitchFamily="34" charset="0"/>
+                        </a:rPr>
+                        <a:t>0.636301</a:t>
                       </a:r>
                     </a:p>
                   </a:txBody>
@@ -11915,14 +11915,14 @@
                     <a:p>
                       <a:pPr algn="r" fontAlgn="b"/>
                       <a:r>
-                        <a:rPr lang="en-MY" sz="800" b="0" i="0" u="none" strike="noStrike">
-                          <a:solidFill>
-                            <a:srgbClr val="000000"/>
-                          </a:solidFill>
-                          <a:effectLst/>
-                          <a:latin typeface="Calibri" panose="020F0502020204030204" pitchFamily="34" charset="0"/>
-                        </a:rPr>
-                        <a:t>0.084525</a:t>
+                        <a:rPr lang="en-MY" sz="900" b="0" i="0" u="none" strike="noStrike">
+                          <a:solidFill>
+                            <a:srgbClr val="000000"/>
+                          </a:solidFill>
+                          <a:effectLst/>
+                          <a:latin typeface="Calibri" panose="020F0502020204030204" pitchFamily="34" charset="0"/>
+                        </a:rPr>
+                        <a:t>0.721004</a:t>
                       </a:r>
                     </a:p>
                   </a:txBody>
@@ -11972,14 +11972,14 @@
                     <a:p>
                       <a:pPr algn="r" fontAlgn="b"/>
                       <a:r>
-                        <a:rPr lang="en-MY" sz="800" b="0" i="0" u="none" strike="noStrike">
-                          <a:solidFill>
-                            <a:srgbClr val="000000"/>
-                          </a:solidFill>
-                          <a:effectLst/>
-                          <a:latin typeface="Calibri" panose="020F0502020204030204" pitchFamily="34" charset="0"/>
-                        </a:rPr>
-                        <a:t>0</a:t>
+                        <a:rPr lang="en-MY" sz="900" b="0" i="0" u="none" strike="noStrike">
+                          <a:solidFill>
+                            <a:srgbClr val="000000"/>
+                          </a:solidFill>
+                          <a:effectLst/>
+                          <a:latin typeface="Calibri" panose="020F0502020204030204" pitchFamily="34" charset="0"/>
+                        </a:rPr>
+                        <a:t>0.279573</a:t>
                       </a:r>
                     </a:p>
                   </a:txBody>
@@ -12029,14 +12029,14 @@
                     <a:p>
                       <a:pPr algn="r" fontAlgn="b"/>
                       <a:r>
-                        <a:rPr lang="en-MY" sz="800" b="0" i="0" u="none" strike="noStrike">
-                          <a:solidFill>
-                            <a:srgbClr val="000000"/>
-                          </a:solidFill>
-                          <a:effectLst/>
-                          <a:latin typeface="Calibri" panose="020F0502020204030204" pitchFamily="34" charset="0"/>
-                        </a:rPr>
-                        <a:t>0</a:t>
+                        <a:rPr lang="en-MY" sz="900" b="0" i="0" u="none" strike="noStrike">
+                          <a:solidFill>
+                            <a:srgbClr val="000000"/>
+                          </a:solidFill>
+                          <a:effectLst/>
+                          <a:latin typeface="Calibri" panose="020F0502020204030204" pitchFamily="34" charset="0"/>
+                        </a:rPr>
+                        <a:t>0.143681</a:t>
                       </a:r>
                     </a:p>
                   </a:txBody>
@@ -12086,14 +12086,14 @@
                     <a:p>
                       <a:pPr algn="r" fontAlgn="b"/>
                       <a:r>
-                        <a:rPr lang="en-MY" sz="800" b="0" i="0" u="none" strike="noStrike">
-                          <a:solidFill>
-                            <a:srgbClr val="000000"/>
-                          </a:solidFill>
-                          <a:effectLst/>
-                          <a:latin typeface="Calibri" panose="020F0502020204030204" pitchFamily="34" charset="0"/>
-                        </a:rPr>
-                        <a:t>0.666667</a:t>
+                        <a:rPr lang="en-MY" sz="900" b="0" i="0" u="none" strike="noStrike">
+                          <a:solidFill>
+                            <a:srgbClr val="000000"/>
+                          </a:solidFill>
+                          <a:effectLst/>
+                          <a:latin typeface="Calibri" panose="020F0502020204030204" pitchFamily="34" charset="0"/>
+                        </a:rPr>
+                        <a:t>0.590909</a:t>
                       </a:r>
                     </a:p>
                   </a:txBody>
@@ -12143,14 +12143,14 @@
                     <a:p>
                       <a:pPr algn="r" fontAlgn="b"/>
                       <a:r>
-                        <a:rPr lang="en-MY" sz="800" b="0" i="0" u="none" strike="noStrike">
-                          <a:solidFill>
-                            <a:srgbClr val="000000"/>
-                          </a:solidFill>
-                          <a:effectLst/>
-                          <a:latin typeface="Calibri" panose="020F0502020204030204" pitchFamily="34" charset="0"/>
-                        </a:rPr>
-                        <a:t>0.155875</a:t>
+                        <a:rPr lang="en-MY" sz="900" b="0" i="0" u="none" strike="noStrike">
+                          <a:solidFill>
+                            <a:srgbClr val="000000"/>
+                          </a:solidFill>
+                          <a:effectLst/>
+                          <a:latin typeface="Calibri" panose="020F0502020204030204" pitchFamily="34" charset="0"/>
+                        </a:rPr>
+                        <a:t>0.228471</a:t>
                       </a:r>
                     </a:p>
                   </a:txBody>
@@ -12200,14 +12200,14 @@
                     <a:p>
                       <a:pPr algn="r" fontAlgn="b"/>
                       <a:r>
-                        <a:rPr lang="en-MY" sz="800" b="0" i="0" u="none" strike="noStrike">
-                          <a:solidFill>
-                            <a:srgbClr val="000000"/>
-                          </a:solidFill>
-                          <a:effectLst/>
-                          <a:latin typeface="Calibri" panose="020F0502020204030204" pitchFamily="34" charset="0"/>
-                        </a:rPr>
-                        <a:t>2881</a:t>
+                        <a:rPr lang="en-MY" sz="900" b="0" i="0" u="none" strike="noStrike">
+                          <a:solidFill>
+                            <a:srgbClr val="000000"/>
+                          </a:solidFill>
+                          <a:effectLst/>
+                          <a:latin typeface="Calibri" panose="020F0502020204030204" pitchFamily="34" charset="0"/>
+                        </a:rPr>
+                        <a:t>742</a:t>
                       </a:r>
                     </a:p>
                   </a:txBody>
@@ -12257,14 +12257,14 @@
                     <a:p>
                       <a:pPr algn="r" fontAlgn="b"/>
                       <a:r>
-                        <a:rPr lang="en-MY" sz="800" b="0" i="0" u="none" strike="noStrike">
-                          <a:solidFill>
-                            <a:srgbClr val="000000"/>
-                          </a:solidFill>
-                          <a:effectLst/>
-                          <a:latin typeface="Calibri" panose="020F0502020204030204" pitchFamily="34" charset="0"/>
-                        </a:rPr>
-                        <a:t>0</a:t>
+                        <a:rPr lang="en-MY" sz="900" b="0" i="0" u="none" strike="noStrike">
+                          <a:solidFill>
+                            <a:srgbClr val="000000"/>
+                          </a:solidFill>
+                          <a:effectLst/>
+                          <a:latin typeface="Calibri" panose="020F0502020204030204" pitchFamily="34" charset="0"/>
+                        </a:rPr>
+                        <a:t>136</a:t>
                       </a:r>
                     </a:p>
                   </a:txBody>
@@ -12314,14 +12314,14 @@
                     <a:p>
                       <a:pPr algn="r" fontAlgn="b"/>
                       <a:r>
-                        <a:rPr lang="en-MY" sz="800" b="0" i="0" u="none" strike="noStrike">
-                          <a:solidFill>
-                            <a:srgbClr val="000000"/>
-                          </a:solidFill>
-                          <a:effectLst/>
-                          <a:latin typeface="Calibri" panose="020F0502020204030204" pitchFamily="34" charset="0"/>
-                        </a:rPr>
-                        <a:t>266</a:t>
+                        <a:rPr lang="en-MY" sz="900" b="0" i="0" u="none" strike="noStrike">
+                          <a:solidFill>
+                            <a:srgbClr val="000000"/>
+                          </a:solidFill>
+                          <a:effectLst/>
+                          <a:latin typeface="Calibri" panose="020F0502020204030204" pitchFamily="34" charset="0"/>
+                        </a:rPr>
+                        <a:t>130</a:t>
                       </a:r>
                     </a:p>
                   </a:txBody>
@@ -12371,14 +12371,14 @@
                     <a:p>
                       <a:pPr algn="r" fontAlgn="b"/>
                       <a:r>
-                        <a:rPr lang="en-MY" sz="800" b="0" i="0" u="none" strike="noStrike">
-                          <a:solidFill>
-                            <a:srgbClr val="000000"/>
-                          </a:solidFill>
-                          <a:effectLst/>
-                          <a:latin typeface="Calibri" panose="020F0502020204030204" pitchFamily="34" charset="0"/>
-                        </a:rPr>
-                        <a:t>-3147000</a:t>
+                        <a:rPr lang="en-MY" sz="900" b="0" i="0" u="none" strike="noStrike">
+                          <a:solidFill>
+                            <a:srgbClr val="000000"/>
+                          </a:solidFill>
+                          <a:effectLst/>
+                          <a:latin typeface="Calibri" panose="020F0502020204030204" pitchFamily="34" charset="0"/>
+                        </a:rPr>
+                        <a:t>-3592000</a:t>
                       </a:r>
                     </a:p>
                   </a:txBody>
@@ -12492,7 +12492,7 @@
                     <a:p>
                       <a:pPr algn="l" fontAlgn="b"/>
                       <a:r>
-                        <a:rPr lang="en-MY" sz="800" b="0" i="0" u="none" strike="noStrike">
+                        <a:rPr lang="en-MY" sz="900" b="0" i="0" u="none" strike="noStrike">
                           <a:solidFill>
                             <a:srgbClr val="000000"/>
                           </a:solidFill>
@@ -12549,14 +12549,14 @@
                     <a:p>
                       <a:pPr algn="r" fontAlgn="b"/>
                       <a:r>
-                        <a:rPr lang="en-MY" sz="800" b="0" i="0" u="none" strike="noStrike">
-                          <a:solidFill>
-                            <a:srgbClr val="000000"/>
-                          </a:solidFill>
-                          <a:effectLst/>
-                          <a:latin typeface="Calibri" panose="020F0502020204030204" pitchFamily="34" charset="0"/>
-                        </a:rPr>
-                        <a:t>0.513125</a:t>
+                        <a:rPr lang="en-MY" sz="900" b="0" i="0" u="none" strike="noStrike">
+                          <a:solidFill>
+                            <a:srgbClr val="000000"/>
+                          </a:solidFill>
+                          <a:effectLst/>
+                          <a:latin typeface="Calibri" panose="020F0502020204030204" pitchFamily="34" charset="0"/>
+                        </a:rPr>
+                        <a:t>0.544081</a:t>
                       </a:r>
                     </a:p>
                   </a:txBody>
@@ -12606,14 +12606,14 @@
                     <a:p>
                       <a:pPr algn="r" fontAlgn="b"/>
                       <a:r>
-                        <a:rPr lang="en-MY" sz="800" b="0" i="0" u="none" strike="noStrike">
-                          <a:solidFill>
-                            <a:srgbClr val="000000"/>
-                          </a:solidFill>
-                          <a:effectLst/>
-                          <a:latin typeface="Calibri" panose="020F0502020204030204" pitchFamily="34" charset="0"/>
-                        </a:rPr>
-                        <a:t>0.515064</a:t>
+                        <a:rPr lang="en-MY" sz="900" b="0" i="0" u="none" strike="noStrike">
+                          <a:solidFill>
+                            <a:srgbClr val="000000"/>
+                          </a:solidFill>
+                          <a:effectLst/>
+                          <a:latin typeface="Calibri" panose="020F0502020204030204" pitchFamily="34" charset="0"/>
+                        </a:rPr>
+                        <a:t>0.552167</a:t>
                       </a:r>
                     </a:p>
                   </a:txBody>
@@ -12663,14 +12663,14 @@
                     <a:p>
                       <a:pPr algn="r" fontAlgn="b"/>
                       <a:r>
-                        <a:rPr lang="en-MY" sz="800" b="0" i="0" u="none" strike="noStrike">
-                          <a:solidFill>
-                            <a:srgbClr val="000000"/>
-                          </a:solidFill>
-                          <a:effectLst/>
-                          <a:latin typeface="Calibri" panose="020F0502020204030204" pitchFamily="34" charset="0"/>
-                        </a:rPr>
-                        <a:t>0.513125</a:t>
+                        <a:rPr lang="en-MY" sz="900" b="0" i="0" u="none" strike="noStrike">
+                          <a:solidFill>
+                            <a:srgbClr val="000000"/>
+                          </a:solidFill>
+                          <a:effectLst/>
+                          <a:latin typeface="Calibri" panose="020F0502020204030204" pitchFamily="34" charset="0"/>
+                        </a:rPr>
+                        <a:t>0.544081</a:t>
                       </a:r>
                     </a:p>
                   </a:txBody>
@@ -12720,14 +12720,14 @@
                     <a:p>
                       <a:pPr algn="r" fontAlgn="b"/>
                       <a:r>
-                        <a:rPr lang="en-MY" sz="800" b="0" i="0" u="none" strike="noStrike">
-                          <a:solidFill>
-                            <a:srgbClr val="000000"/>
-                          </a:solidFill>
-                          <a:effectLst/>
-                          <a:latin typeface="Calibri" panose="020F0502020204030204" pitchFamily="34" charset="0"/>
-                        </a:rPr>
-                        <a:t>0.902447</a:t>
+                        <a:rPr lang="en-MY" sz="900" b="0" i="0" u="none" strike="noStrike">
+                          <a:solidFill>
+                            <a:srgbClr val="000000"/>
+                          </a:solidFill>
+                          <a:effectLst/>
+                          <a:latin typeface="Calibri" panose="020F0502020204030204" pitchFamily="34" charset="0"/>
+                        </a:rPr>
+                        <a:t>0.911026</a:t>
                       </a:r>
                     </a:p>
                   </a:txBody>
@@ -12777,14 +12777,14 @@
                     <a:p>
                       <a:pPr algn="r" fontAlgn="b"/>
                       <a:r>
-                        <a:rPr lang="en-MY" sz="800" b="0" i="0" u="none" strike="noStrike">
-                          <a:solidFill>
-                            <a:srgbClr val="000000"/>
-                          </a:solidFill>
-                          <a:effectLst/>
-                          <a:latin typeface="Calibri" panose="020F0502020204030204" pitchFamily="34" charset="0"/>
-                        </a:rPr>
-                        <a:t>0.070285</a:t>
+                        <a:rPr lang="en-MY" sz="900" b="0" i="0" u="none" strike="noStrike">
+                          <a:solidFill>
+                            <a:srgbClr val="000000"/>
+                          </a:solidFill>
+                          <a:effectLst/>
+                          <a:latin typeface="Calibri" panose="020F0502020204030204" pitchFamily="34" charset="0"/>
+                        </a:rPr>
+                        <a:t>0.178507</a:t>
                       </a:r>
                     </a:p>
                   </a:txBody>
@@ -12834,14 +12834,14 @@
                     <a:p>
                       <a:pPr algn="r" fontAlgn="b"/>
                       <a:r>
-                        <a:rPr lang="en-MY" sz="800" b="0" i="0" u="none" strike="noStrike">
-                          <a:solidFill>
-                            <a:srgbClr val="000000"/>
-                          </a:solidFill>
-                          <a:effectLst/>
-                          <a:latin typeface="Calibri" panose="020F0502020204030204" pitchFamily="34" charset="0"/>
-                        </a:rPr>
-                        <a:t>0.05806</a:t>
+                        <a:rPr lang="en-MY" sz="900" b="0" i="0" u="none" strike="noStrike">
+                          <a:solidFill>
+                            <a:srgbClr val="000000"/>
+                          </a:solidFill>
+                          <a:effectLst/>
+                          <a:latin typeface="Calibri" panose="020F0502020204030204" pitchFamily="34" charset="0"/>
+                        </a:rPr>
+                        <a:t>0.186678</a:t>
                       </a:r>
                     </a:p>
                   </a:txBody>
@@ -12891,14 +12891,14 @@
                     <a:p>
                       <a:pPr algn="r" fontAlgn="b"/>
                       <a:r>
-                        <a:rPr lang="en-MY" sz="800" b="0" i="0" u="none" strike="noStrike">
-                          <a:solidFill>
-                            <a:srgbClr val="000000"/>
-                          </a:solidFill>
-                          <a:effectLst/>
-                          <a:latin typeface="Calibri" panose="020F0502020204030204" pitchFamily="34" charset="0"/>
-                        </a:rPr>
-                        <a:t>0.091956</a:t>
+                        <a:rPr lang="en-MY" sz="900" b="0" i="0" u="none" strike="noStrike">
+                          <a:solidFill>
+                            <a:srgbClr val="000000"/>
+                          </a:solidFill>
+                          <a:effectLst/>
+                          <a:latin typeface="Calibri" panose="020F0502020204030204" pitchFamily="34" charset="0"/>
+                        </a:rPr>
+                        <a:t>0.193401</a:t>
                       </a:r>
                     </a:p>
                   </a:txBody>
@@ -12948,14 +12948,14 @@
                     <a:p>
                       <a:pPr algn="r" fontAlgn="b"/>
                       <a:r>
-                        <a:rPr lang="en-MY" sz="800" b="0" i="0" u="none" strike="noStrike">
-                          <a:solidFill>
-                            <a:srgbClr val="000000"/>
-                          </a:solidFill>
-                          <a:effectLst/>
-                          <a:latin typeface="Calibri" panose="020F0502020204030204" pitchFamily="34" charset="0"/>
-                        </a:rPr>
-                        <a:t>0.078078</a:t>
+                        <a:rPr lang="en-MY" sz="900" b="0" i="0" u="none" strike="noStrike">
+                          <a:solidFill>
+                            <a:srgbClr val="000000"/>
+                          </a:solidFill>
+                          <a:effectLst/>
+                          <a:latin typeface="Calibri" panose="020F0502020204030204" pitchFamily="34" charset="0"/>
+                        </a:rPr>
+                        <a:t>0.186047</a:t>
                       </a:r>
                     </a:p>
                   </a:txBody>
@@ -13005,14 +13005,14 @@
                     <a:p>
                       <a:pPr algn="r" fontAlgn="b"/>
                       <a:r>
-                        <a:rPr lang="en-MY" sz="800" b="0" i="0" u="none" strike="noStrike">
-                          <a:solidFill>
-                            <a:srgbClr val="000000"/>
-                          </a:solidFill>
-                          <a:effectLst/>
-                          <a:latin typeface="Calibri" panose="020F0502020204030204" pitchFamily="34" charset="0"/>
-                        </a:rPr>
-                        <a:t>54</a:t>
+                        <a:rPr lang="en-MY" sz="900" b="0" i="0" u="none" strike="noStrike">
+                          <a:solidFill>
+                            <a:srgbClr val="000000"/>
+                          </a:solidFill>
+                          <a:effectLst/>
+                          <a:latin typeface="Calibri" panose="020F0502020204030204" pitchFamily="34" charset="0"/>
+                        </a:rPr>
+                        <a:t>46</a:t>
                       </a:r>
                     </a:p>
                   </a:txBody>
@@ -13062,14 +13062,14 @@
                     <a:p>
                       <a:pPr algn="r" fontAlgn="b"/>
                       <a:r>
-                        <a:rPr lang="en-MY" sz="800" b="0" i="0" u="none" strike="noStrike">
-                          <a:solidFill>
-                            <a:srgbClr val="000000"/>
-                          </a:solidFill>
-                          <a:effectLst/>
-                          <a:latin typeface="Calibri" panose="020F0502020204030204" pitchFamily="34" charset="0"/>
-                        </a:rPr>
-                        <a:t>253</a:t>
+                        <a:rPr lang="en-MY" sz="900" b="0" i="0" u="none" strike="noStrike">
+                          <a:solidFill>
+                            <a:srgbClr val="000000"/>
+                          </a:solidFill>
+                          <a:effectLst/>
+                          <a:latin typeface="Calibri" panose="020F0502020204030204" pitchFamily="34" charset="0"/>
+                        </a:rPr>
+                        <a:t>234</a:t>
                       </a:r>
                     </a:p>
                   </a:txBody>
@@ -13119,14 +13119,14 @@
                     <a:p>
                       <a:pPr algn="r" fontAlgn="b"/>
                       <a:r>
-                        <a:rPr lang="en-MY" sz="800" b="0" i="0" u="none" strike="noStrike">
-                          <a:solidFill>
-                            <a:srgbClr val="000000"/>
-                          </a:solidFill>
-                          <a:effectLst/>
-                          <a:latin typeface="Calibri" panose="020F0502020204030204" pitchFamily="34" charset="0"/>
-                        </a:rPr>
-                        <a:t>13</a:t>
+                        <a:rPr lang="en-MY" sz="900" b="0" i="0" u="none" strike="noStrike">
+                          <a:solidFill>
+                            <a:srgbClr val="000000"/>
+                          </a:solidFill>
+                          <a:effectLst/>
+                          <a:latin typeface="Calibri" panose="020F0502020204030204" pitchFamily="34" charset="0"/>
+                        </a:rPr>
+                        <a:t>32</a:t>
                       </a:r>
                     </a:p>
                   </a:txBody>
@@ -13176,14 +13176,14 @@
                     <a:p>
                       <a:pPr algn="r" fontAlgn="b"/>
                       <a:r>
-                        <a:rPr lang="en-MY" sz="800" b="0" i="0" u="none" strike="noStrike" dirty="0">
-                          <a:solidFill>
-                            <a:srgbClr val="000000"/>
-                          </a:solidFill>
-                          <a:effectLst/>
-                          <a:latin typeface="Calibri" panose="020F0502020204030204" pitchFamily="34" charset="0"/>
-                        </a:rPr>
-                        <a:t>-5127000</a:t>
+                        <a:rPr lang="en-MY" sz="900" b="0" i="0" u="none" strike="noStrike" dirty="0">
+                          <a:solidFill>
+                            <a:srgbClr val="000000"/>
+                          </a:solidFill>
+                          <a:effectLst/>
+                          <a:latin typeface="Calibri" panose="020F0502020204030204" pitchFamily="34" charset="0"/>
+                        </a:rPr>
+                        <a:t>-4758000</a:t>
                       </a:r>
                     </a:p>
                   </a:txBody>
@@ -14042,10 +14042,10 @@
       </p:grpSpPr>
       <p:pic>
         <p:nvPicPr>
-          <p:cNvPr id="6" name="Picture 5">
+          <p:cNvPr id="3" name="Picture 2">
             <a:extLst>
               <a:ext uri="{FF2B5EF4-FFF2-40B4-BE49-F238E27FC236}">
-                <a16:creationId xmlns:a16="http://schemas.microsoft.com/office/drawing/2014/main" id="{755F698F-7A58-4A12-A89A-8725D81119AB}"/>
+                <a16:creationId xmlns:a16="http://schemas.microsoft.com/office/drawing/2014/main" id="{EA15C286-30B8-43DD-A106-6EFDB4623BB3}"/>
               </a:ext>
             </a:extLst>
           </p:cNvPr>
@@ -14056,13 +14056,13 @@
         </p:nvPicPr>
         <p:blipFill rotWithShape="1">
           <a:blip r:embed="rId2"/>
-          <a:srcRect l="3109" t="6528" r="19127" b="6528"/>
+          <a:srcRect l="3332" t="5304" r="17717" b="6533"/>
           <a:stretch/>
         </p:blipFill>
         <p:spPr>
           <a:xfrm>
-            <a:off x="6095999" y="998375"/>
-            <a:ext cx="5380653" cy="5132720"/>
+            <a:off x="6214187" y="998374"/>
+            <a:ext cx="5380652" cy="5157497"/>
           </a:xfrm>
           <a:prstGeom prst="rect">
             <a:avLst/>
@@ -14071,10 +14071,10 @@
       </p:pic>
       <p:pic>
         <p:nvPicPr>
-          <p:cNvPr id="2" name="Picture 1">
+          <p:cNvPr id="4" name="Picture 3">
             <a:extLst>
               <a:ext uri="{FF2B5EF4-FFF2-40B4-BE49-F238E27FC236}">
-                <a16:creationId xmlns:a16="http://schemas.microsoft.com/office/drawing/2014/main" id="{8CAC23AA-9F60-4AE3-8B08-42A0F6F143B4}"/>
+                <a16:creationId xmlns:a16="http://schemas.microsoft.com/office/drawing/2014/main" id="{F610B6BB-08B0-4294-B2AC-8C50B71171CA}"/>
               </a:ext>
             </a:extLst>
           </p:cNvPr>
@@ -14085,13 +14085,13 @@
         </p:nvPicPr>
         <p:blipFill rotWithShape="1">
           <a:blip r:embed="rId3"/>
-          <a:srcRect l="1442" t="6485" r="18104" b="6919"/>
+          <a:srcRect l="3479" t="7463" r="18701" b="6334"/>
           <a:stretch/>
         </p:blipFill>
         <p:spPr>
           <a:xfrm>
-            <a:off x="329681" y="998375"/>
-            <a:ext cx="5380653" cy="5149774"/>
+            <a:off x="532991" y="1414217"/>
+            <a:ext cx="5025597" cy="4803318"/>
           </a:xfrm>
           <a:prstGeom prst="rect">
             <a:avLst/>
@@ -14130,10 +14130,10 @@
       </p:grpSpPr>
       <p:pic>
         <p:nvPicPr>
-          <p:cNvPr id="5" name="Picture 4">
+          <p:cNvPr id="4" name="Picture 3">
             <a:extLst>
               <a:ext uri="{FF2B5EF4-FFF2-40B4-BE49-F238E27FC236}">
-                <a16:creationId xmlns:a16="http://schemas.microsoft.com/office/drawing/2014/main" id="{8E038FE5-2A0C-43DB-A752-3187CE0FA932}"/>
+                <a16:creationId xmlns:a16="http://schemas.microsoft.com/office/drawing/2014/main" id="{46678AA7-5960-44AF-9E78-D644801EDD43}"/>
               </a:ext>
             </a:extLst>
           </p:cNvPr>
@@ -14144,13 +14144,13 @@
         </p:nvPicPr>
         <p:blipFill rotWithShape="1">
           <a:blip r:embed="rId2"/>
-          <a:srcRect l="3446" t="5992" r="18603" b="6883"/>
+          <a:srcRect l="3425" t="5707" r="17448" b="7184"/>
           <a:stretch/>
         </p:blipFill>
         <p:spPr>
           <a:xfrm>
-            <a:off x="205276" y="821092"/>
-            <a:ext cx="5398084" cy="5281127"/>
+            <a:off x="5887615" y="821092"/>
+            <a:ext cx="5542385" cy="5346819"/>
           </a:xfrm>
           <a:prstGeom prst="rect">
             <a:avLst/>
@@ -14159,10 +14159,10 @@
       </p:pic>
       <p:pic>
         <p:nvPicPr>
-          <p:cNvPr id="2" name="Picture 1">
+          <p:cNvPr id="6" name="Picture 5">
             <a:extLst>
               <a:ext uri="{FF2B5EF4-FFF2-40B4-BE49-F238E27FC236}">
-                <a16:creationId xmlns:a16="http://schemas.microsoft.com/office/drawing/2014/main" id="{3A202B60-63BA-45AB-90BF-78579BF146F4}"/>
+                <a16:creationId xmlns:a16="http://schemas.microsoft.com/office/drawing/2014/main" id="{E476669D-FFC3-4C98-B088-BFD4E8770284}"/>
               </a:ext>
             </a:extLst>
           </p:cNvPr>
@@ -14173,13 +14173,13 @@
         </p:nvPicPr>
         <p:blipFill rotWithShape="1">
           <a:blip r:embed="rId3"/>
-          <a:srcRect l="4402" t="5866" r="18808" b="6041"/>
+          <a:srcRect l="2130" t="6540" r="19297" b="6540"/>
           <a:stretch/>
         </p:blipFill>
         <p:spPr>
           <a:xfrm>
-            <a:off x="6301945" y="919694"/>
-            <a:ext cx="5105383" cy="4942264"/>
+            <a:off x="220436" y="952094"/>
+            <a:ext cx="5396110" cy="5215817"/>
           </a:xfrm>
           <a:prstGeom prst="rect">
             <a:avLst/>
@@ -14218,10 +14218,10 @@
       </p:grpSpPr>
       <p:pic>
         <p:nvPicPr>
-          <p:cNvPr id="4" name="Picture 3">
+          <p:cNvPr id="3" name="Picture 2">
             <a:extLst>
               <a:ext uri="{FF2B5EF4-FFF2-40B4-BE49-F238E27FC236}">
-                <a16:creationId xmlns:a16="http://schemas.microsoft.com/office/drawing/2014/main" id="{5D1BCEB6-A0F6-4AD7-B7EB-3146C10A19AB}"/>
+                <a16:creationId xmlns:a16="http://schemas.microsoft.com/office/drawing/2014/main" id="{5F9D95AB-38B2-48C3-9DB3-4E3FA7663E07}"/>
               </a:ext>
             </a:extLst>
           </p:cNvPr>
@@ -14232,13 +14232,13 @@
         </p:nvPicPr>
         <p:blipFill rotWithShape="1">
           <a:blip r:embed="rId2"/>
-          <a:srcRect l="3915" t="6856" r="19356" b="6441"/>
+          <a:srcRect l="2073" t="5571" r="17487" b="7211"/>
           <a:stretch/>
         </p:blipFill>
         <p:spPr>
           <a:xfrm>
-            <a:off x="120315" y="1010653"/>
-            <a:ext cx="5181600" cy="5021179"/>
+            <a:off x="6005804" y="916936"/>
+            <a:ext cx="5461518" cy="5218471"/>
           </a:xfrm>
           <a:prstGeom prst="rect">
             <a:avLst/>
@@ -14247,10 +14247,10 @@
       </p:pic>
       <p:pic>
         <p:nvPicPr>
-          <p:cNvPr id="5" name="Picture 4">
+          <p:cNvPr id="6" name="Picture 5">
             <a:extLst>
               <a:ext uri="{FF2B5EF4-FFF2-40B4-BE49-F238E27FC236}">
-                <a16:creationId xmlns:a16="http://schemas.microsoft.com/office/drawing/2014/main" id="{DCC13894-6836-40B7-B623-D7C434EF77F9}"/>
+                <a16:creationId xmlns:a16="http://schemas.microsoft.com/office/drawing/2014/main" id="{BB57F50E-4291-445B-9C1A-87C97DD31613}"/>
               </a:ext>
             </a:extLst>
           </p:cNvPr>
@@ -14261,13 +14261,13 @@
         </p:nvPicPr>
         <p:blipFill rotWithShape="1">
           <a:blip r:embed="rId3"/>
-          <a:srcRect l="528" t="7034" r="17777" b="6064"/>
+          <a:srcRect t="4827" r="18789" b="6257"/>
           <a:stretch/>
         </p:blipFill>
         <p:spPr>
           <a:xfrm>
-            <a:off x="5975684" y="826167"/>
-            <a:ext cx="5470358" cy="5264389"/>
+            <a:off x="349704" y="808264"/>
+            <a:ext cx="5275489" cy="5327143"/>
           </a:xfrm>
           <a:prstGeom prst="rect">
             <a:avLst/>
@@ -14306,35 +14306,6 @@
       </p:grpSpPr>
       <p:pic>
         <p:nvPicPr>
-          <p:cNvPr id="4" name="Picture 3">
-            <a:extLst>
-              <a:ext uri="{FF2B5EF4-FFF2-40B4-BE49-F238E27FC236}">
-                <a16:creationId xmlns:a16="http://schemas.microsoft.com/office/drawing/2014/main" id="{631FD449-72CD-48B1-B367-BA430FBB81B0}"/>
-              </a:ext>
-            </a:extLst>
-          </p:cNvPr>
-          <p:cNvPicPr>
-            <a:picLocks noChangeAspect="1"/>
-          </p:cNvPicPr>
-          <p:nvPr/>
-        </p:nvPicPr>
-        <p:blipFill rotWithShape="1">
-          <a:blip r:embed="rId2"/>
-          <a:srcRect l="3061" t="7503" r="19048" b="5742"/>
-          <a:stretch/>
-        </p:blipFill>
-        <p:spPr>
-          <a:xfrm>
-            <a:off x="251926" y="1007706"/>
-            <a:ext cx="5178489" cy="5057192"/>
-          </a:xfrm>
-          <a:prstGeom prst="rect">
-            <a:avLst/>
-          </a:prstGeom>
-        </p:spPr>
-      </p:pic>
-      <p:pic>
-        <p:nvPicPr>
           <p:cNvPr id="5" name="Picture 4">
             <a:extLst>
               <a:ext uri="{FF2B5EF4-FFF2-40B4-BE49-F238E27FC236}">
@@ -14348,7 +14319,7 @@
           <p:nvPr/>
         </p:nvPicPr>
         <p:blipFill rotWithShape="1">
-          <a:blip r:embed="rId3"/>
+          <a:blip r:embed="rId2"/>
           <a:srcRect l="4545" t="5720" r="18139" b="6454"/>
           <a:stretch/>
         </p:blipFill>
@@ -14356,6 +14327,35 @@
           <a:xfrm>
             <a:off x="5868955" y="793102"/>
             <a:ext cx="5376562" cy="5202563"/>
+          </a:xfrm>
+          <a:prstGeom prst="rect">
+            <a:avLst/>
+          </a:prstGeom>
+        </p:spPr>
+      </p:pic>
+      <p:pic>
+        <p:nvPicPr>
+          <p:cNvPr id="2" name="Picture 1">
+            <a:extLst>
+              <a:ext uri="{FF2B5EF4-FFF2-40B4-BE49-F238E27FC236}">
+                <a16:creationId xmlns:a16="http://schemas.microsoft.com/office/drawing/2014/main" id="{FE276A77-D86C-4986-A998-B0CA821F97F6}"/>
+              </a:ext>
+            </a:extLst>
+          </p:cNvPr>
+          <p:cNvPicPr>
+            <a:picLocks noChangeAspect="1"/>
+          </p:cNvPicPr>
+          <p:nvPr/>
+        </p:nvPicPr>
+        <p:blipFill rotWithShape="1">
+          <a:blip r:embed="rId3"/>
+          <a:srcRect l="4145" t="5937" r="18430" b="6823"/>
+          <a:stretch/>
+        </p:blipFill>
+        <p:spPr>
+          <a:xfrm>
+            <a:off x="391885" y="961053"/>
+            <a:ext cx="5103376" cy="4935893"/>
           </a:xfrm>
           <a:prstGeom prst="rect">
             <a:avLst/>
@@ -14394,10 +14394,10 @@
       </p:grpSpPr>
       <p:pic>
         <p:nvPicPr>
-          <p:cNvPr id="4" name="Picture 3">
+          <p:cNvPr id="2" name="Picture 1">
             <a:extLst>
               <a:ext uri="{FF2B5EF4-FFF2-40B4-BE49-F238E27FC236}">
-                <a16:creationId xmlns:a16="http://schemas.microsoft.com/office/drawing/2014/main" id="{B7C1ABAE-ED5D-44C8-99A7-3D562E67FB99}"/>
+                <a16:creationId xmlns:a16="http://schemas.microsoft.com/office/drawing/2014/main" id="{10338506-BFB5-4A59-93C2-F638605DA3F9}"/>
               </a:ext>
             </a:extLst>
           </p:cNvPr>
@@ -14408,13 +14408,13 @@
         </p:nvPicPr>
         <p:blipFill rotWithShape="1">
           <a:blip r:embed="rId2"/>
-          <a:srcRect l="4525" t="7193" r="18210" b="5926"/>
+          <a:srcRect l="1587" t="6536" r="17334" b="5902"/>
           <a:stretch/>
         </p:blipFill>
         <p:spPr>
           <a:xfrm>
-            <a:off x="335902" y="979714"/>
-            <a:ext cx="5365102" cy="5122507"/>
+            <a:off x="429208" y="1159138"/>
+            <a:ext cx="5243804" cy="5029201"/>
           </a:xfrm>
           <a:prstGeom prst="rect">
             <a:avLst/>
@@ -14423,10 +14423,10 @@
       </p:pic>
       <p:pic>
         <p:nvPicPr>
-          <p:cNvPr id="6" name="Picture 5">
+          <p:cNvPr id="3" name="Picture 2">
             <a:extLst>
               <a:ext uri="{FF2B5EF4-FFF2-40B4-BE49-F238E27FC236}">
-                <a16:creationId xmlns:a16="http://schemas.microsoft.com/office/drawing/2014/main" id="{94E3144E-C8CF-49EF-8CBB-E5274C60CC9D}"/>
+                <a16:creationId xmlns:a16="http://schemas.microsoft.com/office/drawing/2014/main" id="{DF623CBF-9B3C-456F-98A1-6584730353C1}"/>
               </a:ext>
             </a:extLst>
           </p:cNvPr>
@@ -14437,13 +14437,13 @@
         </p:nvPicPr>
         <p:blipFill rotWithShape="1">
           <a:blip r:embed="rId3"/>
-          <a:srcRect l="3016" t="6348" r="18752" b="6348"/>
+          <a:srcRect l="903" t="6123" r="18009" b="6436"/>
           <a:stretch/>
         </p:blipFill>
         <p:spPr>
           <a:xfrm>
-            <a:off x="6096000" y="979714"/>
-            <a:ext cx="5455298" cy="5208625"/>
+            <a:off x="6096000" y="1159138"/>
+            <a:ext cx="5337110" cy="5197151"/>
           </a:xfrm>
           <a:prstGeom prst="rect">
             <a:avLst/>

</xml_diff>